<commit_message>
Updated slide 4, direction of arrows
</commit_message>
<xml_diff>
--- a/doc/bis-pos-doc.pptx
+++ b/doc/bis-pos-doc.pptx
@@ -137,7 +137,7 @@
           <p:cNvPr id="2" name="Title 1">
             <a:extLst>
               <a:ext uri="{FF2B5EF4-FFF2-40B4-BE49-F238E27FC236}">
-                <a16:creationId xmlns:a16="http://schemas.microsoft.com/office/drawing/2014/main" xmlns="" id="{F96EF631-5FC2-446F-BE90-CF17B4E7EF90}"/>
+                <a16:creationId xmlns="" xmlns:a16="http://schemas.microsoft.com/office/drawing/2014/main" id="{F96EF631-5FC2-446F-BE90-CF17B4E7EF90}"/>
               </a:ext>
             </a:extLst>
           </p:cNvPr>
@@ -175,7 +175,7 @@
           <p:cNvPr id="3" name="Subtitle 2">
             <a:extLst>
               <a:ext uri="{FF2B5EF4-FFF2-40B4-BE49-F238E27FC236}">
-                <a16:creationId xmlns:a16="http://schemas.microsoft.com/office/drawing/2014/main" xmlns="" id="{479C8FE8-DEBA-476B-ADEC-36320E590D6C}"/>
+                <a16:creationId xmlns="" xmlns:a16="http://schemas.microsoft.com/office/drawing/2014/main" id="{479C8FE8-DEBA-476B-ADEC-36320E590D6C}"/>
               </a:ext>
             </a:extLst>
           </p:cNvPr>
@@ -246,7 +246,7 @@
           <p:cNvPr id="4" name="Date Placeholder 3">
             <a:extLst>
               <a:ext uri="{FF2B5EF4-FFF2-40B4-BE49-F238E27FC236}">
-                <a16:creationId xmlns:a16="http://schemas.microsoft.com/office/drawing/2014/main" xmlns="" id="{F2DE9071-8F45-4F53-87A7-A06569C3C0D7}"/>
+                <a16:creationId xmlns="" xmlns:a16="http://schemas.microsoft.com/office/drawing/2014/main" id="{F2DE9071-8F45-4F53-87A7-A06569C3C0D7}"/>
               </a:ext>
             </a:extLst>
           </p:cNvPr>
@@ -275,7 +275,7 @@
           <p:cNvPr id="5" name="Footer Placeholder 4">
             <a:extLst>
               <a:ext uri="{FF2B5EF4-FFF2-40B4-BE49-F238E27FC236}">
-                <a16:creationId xmlns:a16="http://schemas.microsoft.com/office/drawing/2014/main" xmlns="" id="{37CBE4B5-A934-4654-B959-418DB35CBF92}"/>
+                <a16:creationId xmlns="" xmlns:a16="http://schemas.microsoft.com/office/drawing/2014/main" id="{37CBE4B5-A934-4654-B959-418DB35CBF92}"/>
               </a:ext>
             </a:extLst>
           </p:cNvPr>
@@ -300,7 +300,7 @@
           <p:cNvPr id="6" name="Slide Number Placeholder 5">
             <a:extLst>
               <a:ext uri="{FF2B5EF4-FFF2-40B4-BE49-F238E27FC236}">
-                <a16:creationId xmlns:a16="http://schemas.microsoft.com/office/drawing/2014/main" xmlns="" id="{A172DFD6-3B4D-4455-BC69-B757EA3CF6AB}"/>
+                <a16:creationId xmlns="" xmlns:a16="http://schemas.microsoft.com/office/drawing/2014/main" id="{A172DFD6-3B4D-4455-BC69-B757EA3CF6AB}"/>
               </a:ext>
             </a:extLst>
           </p:cNvPr>
@@ -359,7 +359,7 @@
           <p:cNvPr id="2" name="Title 1">
             <a:extLst>
               <a:ext uri="{FF2B5EF4-FFF2-40B4-BE49-F238E27FC236}">
-                <a16:creationId xmlns:a16="http://schemas.microsoft.com/office/drawing/2014/main" xmlns="" id="{B5315822-FAC5-4FA8-A21D-4E83D2918F05}"/>
+                <a16:creationId xmlns="" xmlns:a16="http://schemas.microsoft.com/office/drawing/2014/main" id="{B5315822-FAC5-4FA8-A21D-4E83D2918F05}"/>
               </a:ext>
             </a:extLst>
           </p:cNvPr>
@@ -388,7 +388,7 @@
           <p:cNvPr id="3" name="Vertical Text Placeholder 2">
             <a:extLst>
               <a:ext uri="{FF2B5EF4-FFF2-40B4-BE49-F238E27FC236}">
-                <a16:creationId xmlns:a16="http://schemas.microsoft.com/office/drawing/2014/main" xmlns="" id="{9BA9137D-96DD-4AD2-985F-CFE8016F8381}"/>
+                <a16:creationId xmlns="" xmlns:a16="http://schemas.microsoft.com/office/drawing/2014/main" id="{9BA9137D-96DD-4AD2-985F-CFE8016F8381}"/>
               </a:ext>
             </a:extLst>
           </p:cNvPr>
@@ -446,7 +446,7 @@
           <p:cNvPr id="4" name="Date Placeholder 3">
             <a:extLst>
               <a:ext uri="{FF2B5EF4-FFF2-40B4-BE49-F238E27FC236}">
-                <a16:creationId xmlns:a16="http://schemas.microsoft.com/office/drawing/2014/main" xmlns="" id="{DC412755-E11C-4D28-9081-0818F5963D19}"/>
+                <a16:creationId xmlns="" xmlns:a16="http://schemas.microsoft.com/office/drawing/2014/main" id="{DC412755-E11C-4D28-9081-0818F5963D19}"/>
               </a:ext>
             </a:extLst>
           </p:cNvPr>
@@ -475,7 +475,7 @@
           <p:cNvPr id="5" name="Footer Placeholder 4">
             <a:extLst>
               <a:ext uri="{FF2B5EF4-FFF2-40B4-BE49-F238E27FC236}">
-                <a16:creationId xmlns:a16="http://schemas.microsoft.com/office/drawing/2014/main" xmlns="" id="{E3649C68-839A-45C3-890A-4C6ACB163B29}"/>
+                <a16:creationId xmlns="" xmlns:a16="http://schemas.microsoft.com/office/drawing/2014/main" id="{E3649C68-839A-45C3-890A-4C6ACB163B29}"/>
               </a:ext>
             </a:extLst>
           </p:cNvPr>
@@ -500,7 +500,7 @@
           <p:cNvPr id="6" name="Slide Number Placeholder 5">
             <a:extLst>
               <a:ext uri="{FF2B5EF4-FFF2-40B4-BE49-F238E27FC236}">
-                <a16:creationId xmlns:a16="http://schemas.microsoft.com/office/drawing/2014/main" xmlns="" id="{EC65B7EA-3D51-4934-A76A-2F29B0CF38EC}"/>
+                <a16:creationId xmlns="" xmlns:a16="http://schemas.microsoft.com/office/drawing/2014/main" id="{EC65B7EA-3D51-4934-A76A-2F29B0CF38EC}"/>
               </a:ext>
             </a:extLst>
           </p:cNvPr>
@@ -559,7 +559,7 @@
           <p:cNvPr id="2" name="Vertical Title 1">
             <a:extLst>
               <a:ext uri="{FF2B5EF4-FFF2-40B4-BE49-F238E27FC236}">
-                <a16:creationId xmlns:a16="http://schemas.microsoft.com/office/drawing/2014/main" xmlns="" id="{32E08DE2-C36A-40C9-907E-BB4751B16684}"/>
+                <a16:creationId xmlns="" xmlns:a16="http://schemas.microsoft.com/office/drawing/2014/main" id="{32E08DE2-C36A-40C9-907E-BB4751B16684}"/>
               </a:ext>
             </a:extLst>
           </p:cNvPr>
@@ -593,7 +593,7 @@
           <p:cNvPr id="3" name="Vertical Text Placeholder 2">
             <a:extLst>
               <a:ext uri="{FF2B5EF4-FFF2-40B4-BE49-F238E27FC236}">
-                <a16:creationId xmlns:a16="http://schemas.microsoft.com/office/drawing/2014/main" xmlns="" id="{CD8DB52F-B200-4F9D-BC5D-A23A63588606}"/>
+                <a16:creationId xmlns="" xmlns:a16="http://schemas.microsoft.com/office/drawing/2014/main" id="{CD8DB52F-B200-4F9D-BC5D-A23A63588606}"/>
               </a:ext>
             </a:extLst>
           </p:cNvPr>
@@ -656,7 +656,7 @@
           <p:cNvPr id="4" name="Date Placeholder 3">
             <a:extLst>
               <a:ext uri="{FF2B5EF4-FFF2-40B4-BE49-F238E27FC236}">
-                <a16:creationId xmlns:a16="http://schemas.microsoft.com/office/drawing/2014/main" xmlns="" id="{259B81F9-0EF6-403E-9A18-3FD3968D7668}"/>
+                <a16:creationId xmlns="" xmlns:a16="http://schemas.microsoft.com/office/drawing/2014/main" id="{259B81F9-0EF6-403E-9A18-3FD3968D7668}"/>
               </a:ext>
             </a:extLst>
           </p:cNvPr>
@@ -685,7 +685,7 @@
           <p:cNvPr id="5" name="Footer Placeholder 4">
             <a:extLst>
               <a:ext uri="{FF2B5EF4-FFF2-40B4-BE49-F238E27FC236}">
-                <a16:creationId xmlns:a16="http://schemas.microsoft.com/office/drawing/2014/main" xmlns="" id="{377314DB-723A-4330-A9D9-BE387BC3475C}"/>
+                <a16:creationId xmlns="" xmlns:a16="http://schemas.microsoft.com/office/drawing/2014/main" id="{377314DB-723A-4330-A9D9-BE387BC3475C}"/>
               </a:ext>
             </a:extLst>
           </p:cNvPr>
@@ -710,7 +710,7 @@
           <p:cNvPr id="6" name="Slide Number Placeholder 5">
             <a:extLst>
               <a:ext uri="{FF2B5EF4-FFF2-40B4-BE49-F238E27FC236}">
-                <a16:creationId xmlns:a16="http://schemas.microsoft.com/office/drawing/2014/main" xmlns="" id="{A34D8764-9A7D-44A2-92AB-0E1F170AB97F}"/>
+                <a16:creationId xmlns="" xmlns:a16="http://schemas.microsoft.com/office/drawing/2014/main" id="{A34D8764-9A7D-44A2-92AB-0E1F170AB97F}"/>
               </a:ext>
             </a:extLst>
           </p:cNvPr>
@@ -769,7 +769,7 @@
           <p:cNvPr id="2" name="Title 1">
             <a:extLst>
               <a:ext uri="{FF2B5EF4-FFF2-40B4-BE49-F238E27FC236}">
-                <a16:creationId xmlns:a16="http://schemas.microsoft.com/office/drawing/2014/main" xmlns="" id="{5B4EF6A2-11AB-4F8C-9BA3-874743343987}"/>
+                <a16:creationId xmlns="" xmlns:a16="http://schemas.microsoft.com/office/drawing/2014/main" id="{5B4EF6A2-11AB-4F8C-9BA3-874743343987}"/>
               </a:ext>
             </a:extLst>
           </p:cNvPr>
@@ -798,7 +798,7 @@
           <p:cNvPr id="3" name="Content Placeholder 2">
             <a:extLst>
               <a:ext uri="{FF2B5EF4-FFF2-40B4-BE49-F238E27FC236}">
-                <a16:creationId xmlns:a16="http://schemas.microsoft.com/office/drawing/2014/main" xmlns="" id="{24C842A2-1295-44A4-99AB-D6D2960ECD53}"/>
+                <a16:creationId xmlns="" xmlns:a16="http://schemas.microsoft.com/office/drawing/2014/main" id="{24C842A2-1295-44A4-99AB-D6D2960ECD53}"/>
               </a:ext>
             </a:extLst>
           </p:cNvPr>
@@ -856,7 +856,7 @@
           <p:cNvPr id="4" name="Date Placeholder 3">
             <a:extLst>
               <a:ext uri="{FF2B5EF4-FFF2-40B4-BE49-F238E27FC236}">
-                <a16:creationId xmlns:a16="http://schemas.microsoft.com/office/drawing/2014/main" xmlns="" id="{2E2A235E-B90D-4872-8D07-C3419BB513CF}"/>
+                <a16:creationId xmlns="" xmlns:a16="http://schemas.microsoft.com/office/drawing/2014/main" id="{2E2A235E-B90D-4872-8D07-C3419BB513CF}"/>
               </a:ext>
             </a:extLst>
           </p:cNvPr>
@@ -885,7 +885,7 @@
           <p:cNvPr id="5" name="Footer Placeholder 4">
             <a:extLst>
               <a:ext uri="{FF2B5EF4-FFF2-40B4-BE49-F238E27FC236}">
-                <a16:creationId xmlns:a16="http://schemas.microsoft.com/office/drawing/2014/main" xmlns="" id="{8FBEE775-7158-4490-8482-B6DE40972C4C}"/>
+                <a16:creationId xmlns="" xmlns:a16="http://schemas.microsoft.com/office/drawing/2014/main" id="{8FBEE775-7158-4490-8482-B6DE40972C4C}"/>
               </a:ext>
             </a:extLst>
           </p:cNvPr>
@@ -910,7 +910,7 @@
           <p:cNvPr id="6" name="Slide Number Placeholder 5">
             <a:extLst>
               <a:ext uri="{FF2B5EF4-FFF2-40B4-BE49-F238E27FC236}">
-                <a16:creationId xmlns:a16="http://schemas.microsoft.com/office/drawing/2014/main" xmlns="" id="{8F4FA970-B798-47DD-9FB4-72F0793FAF55}"/>
+                <a16:creationId xmlns="" xmlns:a16="http://schemas.microsoft.com/office/drawing/2014/main" id="{8F4FA970-B798-47DD-9FB4-72F0793FAF55}"/>
               </a:ext>
             </a:extLst>
           </p:cNvPr>
@@ -969,7 +969,7 @@
           <p:cNvPr id="2" name="Title 1">
             <a:extLst>
               <a:ext uri="{FF2B5EF4-FFF2-40B4-BE49-F238E27FC236}">
-                <a16:creationId xmlns:a16="http://schemas.microsoft.com/office/drawing/2014/main" xmlns="" id="{DDD1BDE8-6175-4AE7-81D7-4BB377D5E311}"/>
+                <a16:creationId xmlns="" xmlns:a16="http://schemas.microsoft.com/office/drawing/2014/main" id="{DDD1BDE8-6175-4AE7-81D7-4BB377D5E311}"/>
               </a:ext>
             </a:extLst>
           </p:cNvPr>
@@ -1007,7 +1007,7 @@
           <p:cNvPr id="3" name="Text Placeholder 2">
             <a:extLst>
               <a:ext uri="{FF2B5EF4-FFF2-40B4-BE49-F238E27FC236}">
-                <a16:creationId xmlns:a16="http://schemas.microsoft.com/office/drawing/2014/main" xmlns="" id="{0AF360CD-96A3-4069-A867-1F0E51BC9FB5}"/>
+                <a16:creationId xmlns="" xmlns:a16="http://schemas.microsoft.com/office/drawing/2014/main" id="{0AF360CD-96A3-4069-A867-1F0E51BC9FB5}"/>
               </a:ext>
             </a:extLst>
           </p:cNvPr>
@@ -1132,7 +1132,7 @@
           <p:cNvPr id="4" name="Date Placeholder 3">
             <a:extLst>
               <a:ext uri="{FF2B5EF4-FFF2-40B4-BE49-F238E27FC236}">
-                <a16:creationId xmlns:a16="http://schemas.microsoft.com/office/drawing/2014/main" xmlns="" id="{2015F0DF-9ED1-429C-B60C-D26E1F8E1520}"/>
+                <a16:creationId xmlns="" xmlns:a16="http://schemas.microsoft.com/office/drawing/2014/main" id="{2015F0DF-9ED1-429C-B60C-D26E1F8E1520}"/>
               </a:ext>
             </a:extLst>
           </p:cNvPr>
@@ -1161,7 +1161,7 @@
           <p:cNvPr id="5" name="Footer Placeholder 4">
             <a:extLst>
               <a:ext uri="{FF2B5EF4-FFF2-40B4-BE49-F238E27FC236}">
-                <a16:creationId xmlns:a16="http://schemas.microsoft.com/office/drawing/2014/main" xmlns="" id="{9E1A6DA4-F267-4CC1-B67D-7844BD294EFC}"/>
+                <a16:creationId xmlns="" xmlns:a16="http://schemas.microsoft.com/office/drawing/2014/main" id="{9E1A6DA4-F267-4CC1-B67D-7844BD294EFC}"/>
               </a:ext>
             </a:extLst>
           </p:cNvPr>
@@ -1186,7 +1186,7 @@
           <p:cNvPr id="6" name="Slide Number Placeholder 5">
             <a:extLst>
               <a:ext uri="{FF2B5EF4-FFF2-40B4-BE49-F238E27FC236}">
-                <a16:creationId xmlns:a16="http://schemas.microsoft.com/office/drawing/2014/main" xmlns="" id="{88A09BEC-65DC-42D9-AF9B-BE7C3A6CBA0F}"/>
+                <a16:creationId xmlns="" xmlns:a16="http://schemas.microsoft.com/office/drawing/2014/main" id="{88A09BEC-65DC-42D9-AF9B-BE7C3A6CBA0F}"/>
               </a:ext>
             </a:extLst>
           </p:cNvPr>
@@ -1245,7 +1245,7 @@
           <p:cNvPr id="2" name="Title 1">
             <a:extLst>
               <a:ext uri="{FF2B5EF4-FFF2-40B4-BE49-F238E27FC236}">
-                <a16:creationId xmlns:a16="http://schemas.microsoft.com/office/drawing/2014/main" xmlns="" id="{5BA3F379-AFF9-4C15-A0CD-4AD800814F20}"/>
+                <a16:creationId xmlns="" xmlns:a16="http://schemas.microsoft.com/office/drawing/2014/main" id="{5BA3F379-AFF9-4C15-A0CD-4AD800814F20}"/>
               </a:ext>
             </a:extLst>
           </p:cNvPr>
@@ -1274,7 +1274,7 @@
           <p:cNvPr id="3" name="Content Placeholder 2">
             <a:extLst>
               <a:ext uri="{FF2B5EF4-FFF2-40B4-BE49-F238E27FC236}">
-                <a16:creationId xmlns:a16="http://schemas.microsoft.com/office/drawing/2014/main" xmlns="" id="{0851FEA9-59CA-4320-AE48-87DE6EFF15F4}"/>
+                <a16:creationId xmlns="" xmlns:a16="http://schemas.microsoft.com/office/drawing/2014/main" id="{0851FEA9-59CA-4320-AE48-87DE6EFF15F4}"/>
               </a:ext>
             </a:extLst>
           </p:cNvPr>
@@ -1337,7 +1337,7 @@
           <p:cNvPr id="4" name="Content Placeholder 3">
             <a:extLst>
               <a:ext uri="{FF2B5EF4-FFF2-40B4-BE49-F238E27FC236}">
-                <a16:creationId xmlns:a16="http://schemas.microsoft.com/office/drawing/2014/main" xmlns="" id="{EBC4153E-11C3-471C-8A2D-4EB1E5DF1102}"/>
+                <a16:creationId xmlns="" xmlns:a16="http://schemas.microsoft.com/office/drawing/2014/main" id="{EBC4153E-11C3-471C-8A2D-4EB1E5DF1102}"/>
               </a:ext>
             </a:extLst>
           </p:cNvPr>
@@ -1400,7 +1400,7 @@
           <p:cNvPr id="5" name="Date Placeholder 4">
             <a:extLst>
               <a:ext uri="{FF2B5EF4-FFF2-40B4-BE49-F238E27FC236}">
-                <a16:creationId xmlns:a16="http://schemas.microsoft.com/office/drawing/2014/main" xmlns="" id="{71FA7135-5DC8-4245-9C9B-1C65B4160F3E}"/>
+                <a16:creationId xmlns="" xmlns:a16="http://schemas.microsoft.com/office/drawing/2014/main" id="{71FA7135-5DC8-4245-9C9B-1C65B4160F3E}"/>
               </a:ext>
             </a:extLst>
           </p:cNvPr>
@@ -1429,7 +1429,7 @@
           <p:cNvPr id="6" name="Footer Placeholder 5">
             <a:extLst>
               <a:ext uri="{FF2B5EF4-FFF2-40B4-BE49-F238E27FC236}">
-                <a16:creationId xmlns:a16="http://schemas.microsoft.com/office/drawing/2014/main" xmlns="" id="{68C521B6-267D-4036-A4A3-98CE554F9588}"/>
+                <a16:creationId xmlns="" xmlns:a16="http://schemas.microsoft.com/office/drawing/2014/main" id="{68C521B6-267D-4036-A4A3-98CE554F9588}"/>
               </a:ext>
             </a:extLst>
           </p:cNvPr>
@@ -1454,7 +1454,7 @@
           <p:cNvPr id="7" name="Slide Number Placeholder 6">
             <a:extLst>
               <a:ext uri="{FF2B5EF4-FFF2-40B4-BE49-F238E27FC236}">
-                <a16:creationId xmlns:a16="http://schemas.microsoft.com/office/drawing/2014/main" xmlns="" id="{C4EB498D-29FC-4950-86CE-F95CB26CD9C7}"/>
+                <a16:creationId xmlns="" xmlns:a16="http://schemas.microsoft.com/office/drawing/2014/main" id="{C4EB498D-29FC-4950-86CE-F95CB26CD9C7}"/>
               </a:ext>
             </a:extLst>
           </p:cNvPr>
@@ -1513,7 +1513,7 @@
           <p:cNvPr id="2" name="Title 1">
             <a:extLst>
               <a:ext uri="{FF2B5EF4-FFF2-40B4-BE49-F238E27FC236}">
-                <a16:creationId xmlns:a16="http://schemas.microsoft.com/office/drawing/2014/main" xmlns="" id="{1FF5669B-B5BA-4467-B073-E737E9A7CF0A}"/>
+                <a16:creationId xmlns="" xmlns:a16="http://schemas.microsoft.com/office/drawing/2014/main" id="{1FF5669B-B5BA-4467-B073-E737E9A7CF0A}"/>
               </a:ext>
             </a:extLst>
           </p:cNvPr>
@@ -1547,7 +1547,7 @@
           <p:cNvPr id="3" name="Text Placeholder 2">
             <a:extLst>
               <a:ext uri="{FF2B5EF4-FFF2-40B4-BE49-F238E27FC236}">
-                <a16:creationId xmlns:a16="http://schemas.microsoft.com/office/drawing/2014/main" xmlns="" id="{F4751580-ACA5-4D3D-886D-B8CD5EEB913C}"/>
+                <a16:creationId xmlns="" xmlns:a16="http://schemas.microsoft.com/office/drawing/2014/main" id="{F4751580-ACA5-4D3D-886D-B8CD5EEB913C}"/>
               </a:ext>
             </a:extLst>
           </p:cNvPr>
@@ -1618,7 +1618,7 @@
           <p:cNvPr id="4" name="Content Placeholder 3">
             <a:extLst>
               <a:ext uri="{FF2B5EF4-FFF2-40B4-BE49-F238E27FC236}">
-                <a16:creationId xmlns:a16="http://schemas.microsoft.com/office/drawing/2014/main" xmlns="" id="{D9B9EF48-50DF-4E47-8FE2-6BA119AACEF5}"/>
+                <a16:creationId xmlns="" xmlns:a16="http://schemas.microsoft.com/office/drawing/2014/main" id="{D9B9EF48-50DF-4E47-8FE2-6BA119AACEF5}"/>
               </a:ext>
             </a:extLst>
           </p:cNvPr>
@@ -1681,7 +1681,7 @@
           <p:cNvPr id="5" name="Text Placeholder 4">
             <a:extLst>
               <a:ext uri="{FF2B5EF4-FFF2-40B4-BE49-F238E27FC236}">
-                <a16:creationId xmlns:a16="http://schemas.microsoft.com/office/drawing/2014/main" xmlns="" id="{2E77F2AE-6CC6-4E3E-A1A7-2DB462E2493B}"/>
+                <a16:creationId xmlns="" xmlns:a16="http://schemas.microsoft.com/office/drawing/2014/main" id="{2E77F2AE-6CC6-4E3E-A1A7-2DB462E2493B}"/>
               </a:ext>
             </a:extLst>
           </p:cNvPr>
@@ -1752,7 +1752,7 @@
           <p:cNvPr id="6" name="Content Placeholder 5">
             <a:extLst>
               <a:ext uri="{FF2B5EF4-FFF2-40B4-BE49-F238E27FC236}">
-                <a16:creationId xmlns:a16="http://schemas.microsoft.com/office/drawing/2014/main" xmlns="" id="{0045D2A2-37AC-4356-9266-4621B4D36FDD}"/>
+                <a16:creationId xmlns="" xmlns:a16="http://schemas.microsoft.com/office/drawing/2014/main" id="{0045D2A2-37AC-4356-9266-4621B4D36FDD}"/>
               </a:ext>
             </a:extLst>
           </p:cNvPr>
@@ -1815,7 +1815,7 @@
           <p:cNvPr id="7" name="Date Placeholder 6">
             <a:extLst>
               <a:ext uri="{FF2B5EF4-FFF2-40B4-BE49-F238E27FC236}">
-                <a16:creationId xmlns:a16="http://schemas.microsoft.com/office/drawing/2014/main" xmlns="" id="{FF93F9BC-E5DC-4652-8BA9-68B9FB868DDE}"/>
+                <a16:creationId xmlns="" xmlns:a16="http://schemas.microsoft.com/office/drawing/2014/main" id="{FF93F9BC-E5DC-4652-8BA9-68B9FB868DDE}"/>
               </a:ext>
             </a:extLst>
           </p:cNvPr>
@@ -1844,7 +1844,7 @@
           <p:cNvPr id="8" name="Footer Placeholder 7">
             <a:extLst>
               <a:ext uri="{FF2B5EF4-FFF2-40B4-BE49-F238E27FC236}">
-                <a16:creationId xmlns:a16="http://schemas.microsoft.com/office/drawing/2014/main" xmlns="" id="{30B1A723-AF11-4A0E-8F80-839B6E6D0E02}"/>
+                <a16:creationId xmlns="" xmlns:a16="http://schemas.microsoft.com/office/drawing/2014/main" id="{30B1A723-AF11-4A0E-8F80-839B6E6D0E02}"/>
               </a:ext>
             </a:extLst>
           </p:cNvPr>
@@ -1869,7 +1869,7 @@
           <p:cNvPr id="9" name="Slide Number Placeholder 8">
             <a:extLst>
               <a:ext uri="{FF2B5EF4-FFF2-40B4-BE49-F238E27FC236}">
-                <a16:creationId xmlns:a16="http://schemas.microsoft.com/office/drawing/2014/main" xmlns="" id="{542CD643-A062-4BE0-BB72-1FA12B502FB4}"/>
+                <a16:creationId xmlns="" xmlns:a16="http://schemas.microsoft.com/office/drawing/2014/main" id="{542CD643-A062-4BE0-BB72-1FA12B502FB4}"/>
               </a:ext>
             </a:extLst>
           </p:cNvPr>
@@ -1928,7 +1928,7 @@
           <p:cNvPr id="2" name="Title 1">
             <a:extLst>
               <a:ext uri="{FF2B5EF4-FFF2-40B4-BE49-F238E27FC236}">
-                <a16:creationId xmlns:a16="http://schemas.microsoft.com/office/drawing/2014/main" xmlns="" id="{FA4C9A75-9BBE-4B9A-9384-01EF47666824}"/>
+                <a16:creationId xmlns="" xmlns:a16="http://schemas.microsoft.com/office/drawing/2014/main" id="{FA4C9A75-9BBE-4B9A-9384-01EF47666824}"/>
               </a:ext>
             </a:extLst>
           </p:cNvPr>
@@ -1957,7 +1957,7 @@
           <p:cNvPr id="3" name="Date Placeholder 2">
             <a:extLst>
               <a:ext uri="{FF2B5EF4-FFF2-40B4-BE49-F238E27FC236}">
-                <a16:creationId xmlns:a16="http://schemas.microsoft.com/office/drawing/2014/main" xmlns="" id="{975DD675-2572-44CE-89B4-7F5B4BD77B06}"/>
+                <a16:creationId xmlns="" xmlns:a16="http://schemas.microsoft.com/office/drawing/2014/main" id="{975DD675-2572-44CE-89B4-7F5B4BD77B06}"/>
               </a:ext>
             </a:extLst>
           </p:cNvPr>
@@ -1986,7 +1986,7 @@
           <p:cNvPr id="4" name="Footer Placeholder 3">
             <a:extLst>
               <a:ext uri="{FF2B5EF4-FFF2-40B4-BE49-F238E27FC236}">
-                <a16:creationId xmlns:a16="http://schemas.microsoft.com/office/drawing/2014/main" xmlns="" id="{0337F819-6B9B-4C56-9AC2-56B7772A9961}"/>
+                <a16:creationId xmlns="" xmlns:a16="http://schemas.microsoft.com/office/drawing/2014/main" id="{0337F819-6B9B-4C56-9AC2-56B7772A9961}"/>
               </a:ext>
             </a:extLst>
           </p:cNvPr>
@@ -2011,7 +2011,7 @@
           <p:cNvPr id="5" name="Slide Number Placeholder 4">
             <a:extLst>
               <a:ext uri="{FF2B5EF4-FFF2-40B4-BE49-F238E27FC236}">
-                <a16:creationId xmlns:a16="http://schemas.microsoft.com/office/drawing/2014/main" xmlns="" id="{9EAB3763-35B5-4D4C-8666-CFD03F46F98C}"/>
+                <a16:creationId xmlns="" xmlns:a16="http://schemas.microsoft.com/office/drawing/2014/main" id="{9EAB3763-35B5-4D4C-8666-CFD03F46F98C}"/>
               </a:ext>
             </a:extLst>
           </p:cNvPr>
@@ -2070,7 +2070,7 @@
           <p:cNvPr id="2" name="Date Placeholder 1">
             <a:extLst>
               <a:ext uri="{FF2B5EF4-FFF2-40B4-BE49-F238E27FC236}">
-                <a16:creationId xmlns:a16="http://schemas.microsoft.com/office/drawing/2014/main" xmlns="" id="{BC58F7ED-9401-428D-B0EE-80CED4726F1B}"/>
+                <a16:creationId xmlns="" xmlns:a16="http://schemas.microsoft.com/office/drawing/2014/main" id="{BC58F7ED-9401-428D-B0EE-80CED4726F1B}"/>
               </a:ext>
             </a:extLst>
           </p:cNvPr>
@@ -2099,7 +2099,7 @@
           <p:cNvPr id="3" name="Footer Placeholder 2">
             <a:extLst>
               <a:ext uri="{FF2B5EF4-FFF2-40B4-BE49-F238E27FC236}">
-                <a16:creationId xmlns:a16="http://schemas.microsoft.com/office/drawing/2014/main" xmlns="" id="{A661831B-702B-4241-9983-AB12BC5AA7F9}"/>
+                <a16:creationId xmlns="" xmlns:a16="http://schemas.microsoft.com/office/drawing/2014/main" id="{A661831B-702B-4241-9983-AB12BC5AA7F9}"/>
               </a:ext>
             </a:extLst>
           </p:cNvPr>
@@ -2124,7 +2124,7 @@
           <p:cNvPr id="4" name="Slide Number Placeholder 3">
             <a:extLst>
               <a:ext uri="{FF2B5EF4-FFF2-40B4-BE49-F238E27FC236}">
-                <a16:creationId xmlns:a16="http://schemas.microsoft.com/office/drawing/2014/main" xmlns="" id="{EAA325E4-E257-4234-A411-DD616A90E1E8}"/>
+                <a16:creationId xmlns="" xmlns:a16="http://schemas.microsoft.com/office/drawing/2014/main" id="{EAA325E4-E257-4234-A411-DD616A90E1E8}"/>
               </a:ext>
             </a:extLst>
           </p:cNvPr>
@@ -2183,7 +2183,7 @@
           <p:cNvPr id="2" name="Title 1">
             <a:extLst>
               <a:ext uri="{FF2B5EF4-FFF2-40B4-BE49-F238E27FC236}">
-                <a16:creationId xmlns:a16="http://schemas.microsoft.com/office/drawing/2014/main" xmlns="" id="{550A35D2-C828-49F7-9902-4A95A6A24A57}"/>
+                <a16:creationId xmlns="" xmlns:a16="http://schemas.microsoft.com/office/drawing/2014/main" id="{550A35D2-C828-49F7-9902-4A95A6A24A57}"/>
               </a:ext>
             </a:extLst>
           </p:cNvPr>
@@ -2221,7 +2221,7 @@
           <p:cNvPr id="3" name="Content Placeholder 2">
             <a:extLst>
               <a:ext uri="{FF2B5EF4-FFF2-40B4-BE49-F238E27FC236}">
-                <a16:creationId xmlns:a16="http://schemas.microsoft.com/office/drawing/2014/main" xmlns="" id="{A6692223-816C-4384-98F1-AB68315DBD99}"/>
+                <a16:creationId xmlns="" xmlns:a16="http://schemas.microsoft.com/office/drawing/2014/main" id="{A6692223-816C-4384-98F1-AB68315DBD99}"/>
               </a:ext>
             </a:extLst>
           </p:cNvPr>
@@ -2312,7 +2312,7 @@
           <p:cNvPr id="4" name="Text Placeholder 3">
             <a:extLst>
               <a:ext uri="{FF2B5EF4-FFF2-40B4-BE49-F238E27FC236}">
-                <a16:creationId xmlns:a16="http://schemas.microsoft.com/office/drawing/2014/main" xmlns="" id="{F34CEEAC-A051-4439-BA65-8DC08104C1FD}"/>
+                <a16:creationId xmlns="" xmlns:a16="http://schemas.microsoft.com/office/drawing/2014/main" id="{F34CEEAC-A051-4439-BA65-8DC08104C1FD}"/>
               </a:ext>
             </a:extLst>
           </p:cNvPr>
@@ -2383,7 +2383,7 @@
           <p:cNvPr id="5" name="Date Placeholder 4">
             <a:extLst>
               <a:ext uri="{FF2B5EF4-FFF2-40B4-BE49-F238E27FC236}">
-                <a16:creationId xmlns:a16="http://schemas.microsoft.com/office/drawing/2014/main" xmlns="" id="{0D6F54FB-165C-4B19-9DB8-92ED6257D6B3}"/>
+                <a16:creationId xmlns="" xmlns:a16="http://schemas.microsoft.com/office/drawing/2014/main" id="{0D6F54FB-165C-4B19-9DB8-92ED6257D6B3}"/>
               </a:ext>
             </a:extLst>
           </p:cNvPr>
@@ -2412,7 +2412,7 @@
           <p:cNvPr id="6" name="Footer Placeholder 5">
             <a:extLst>
               <a:ext uri="{FF2B5EF4-FFF2-40B4-BE49-F238E27FC236}">
-                <a16:creationId xmlns:a16="http://schemas.microsoft.com/office/drawing/2014/main" xmlns="" id="{C16066EA-AB7C-4169-8A10-986F1189B740}"/>
+                <a16:creationId xmlns="" xmlns:a16="http://schemas.microsoft.com/office/drawing/2014/main" id="{C16066EA-AB7C-4169-8A10-986F1189B740}"/>
               </a:ext>
             </a:extLst>
           </p:cNvPr>
@@ -2437,7 +2437,7 @@
           <p:cNvPr id="7" name="Slide Number Placeholder 6">
             <a:extLst>
               <a:ext uri="{FF2B5EF4-FFF2-40B4-BE49-F238E27FC236}">
-                <a16:creationId xmlns:a16="http://schemas.microsoft.com/office/drawing/2014/main" xmlns="" id="{4A8D13CC-6251-4591-8F91-622A9D063B7E}"/>
+                <a16:creationId xmlns="" xmlns:a16="http://schemas.microsoft.com/office/drawing/2014/main" id="{4A8D13CC-6251-4591-8F91-622A9D063B7E}"/>
               </a:ext>
             </a:extLst>
           </p:cNvPr>
@@ -2496,7 +2496,7 @@
           <p:cNvPr id="2" name="Title 1">
             <a:extLst>
               <a:ext uri="{FF2B5EF4-FFF2-40B4-BE49-F238E27FC236}">
-                <a16:creationId xmlns:a16="http://schemas.microsoft.com/office/drawing/2014/main" xmlns="" id="{95809F61-D27C-4A3A-88DE-844D8F3DA60F}"/>
+                <a16:creationId xmlns="" xmlns:a16="http://schemas.microsoft.com/office/drawing/2014/main" id="{95809F61-D27C-4A3A-88DE-844D8F3DA60F}"/>
               </a:ext>
             </a:extLst>
           </p:cNvPr>
@@ -2534,7 +2534,7 @@
           <p:cNvPr id="3" name="Picture Placeholder 2">
             <a:extLst>
               <a:ext uri="{FF2B5EF4-FFF2-40B4-BE49-F238E27FC236}">
-                <a16:creationId xmlns:a16="http://schemas.microsoft.com/office/drawing/2014/main" xmlns="" id="{A7222853-8A5B-4C5D-AC14-12D9A50A130E}"/>
+                <a16:creationId xmlns="" xmlns:a16="http://schemas.microsoft.com/office/drawing/2014/main" id="{A7222853-8A5B-4C5D-AC14-12D9A50A130E}"/>
               </a:ext>
             </a:extLst>
           </p:cNvPr>
@@ -2601,7 +2601,7 @@
           <p:cNvPr id="4" name="Text Placeholder 3">
             <a:extLst>
               <a:ext uri="{FF2B5EF4-FFF2-40B4-BE49-F238E27FC236}">
-                <a16:creationId xmlns:a16="http://schemas.microsoft.com/office/drawing/2014/main" xmlns="" id="{60403052-75FB-4741-89CE-DE25FB413BB4}"/>
+                <a16:creationId xmlns="" xmlns:a16="http://schemas.microsoft.com/office/drawing/2014/main" id="{60403052-75FB-4741-89CE-DE25FB413BB4}"/>
               </a:ext>
             </a:extLst>
           </p:cNvPr>
@@ -2672,7 +2672,7 @@
           <p:cNvPr id="5" name="Date Placeholder 4">
             <a:extLst>
               <a:ext uri="{FF2B5EF4-FFF2-40B4-BE49-F238E27FC236}">
-                <a16:creationId xmlns:a16="http://schemas.microsoft.com/office/drawing/2014/main" xmlns="" id="{86BC7775-B335-4DD0-9AB4-40FDDD4C3401}"/>
+                <a16:creationId xmlns="" xmlns:a16="http://schemas.microsoft.com/office/drawing/2014/main" id="{86BC7775-B335-4DD0-9AB4-40FDDD4C3401}"/>
               </a:ext>
             </a:extLst>
           </p:cNvPr>
@@ -2701,7 +2701,7 @@
           <p:cNvPr id="6" name="Footer Placeholder 5">
             <a:extLst>
               <a:ext uri="{FF2B5EF4-FFF2-40B4-BE49-F238E27FC236}">
-                <a16:creationId xmlns:a16="http://schemas.microsoft.com/office/drawing/2014/main" xmlns="" id="{786678D3-A3F1-454F-B40B-AB97D65E3A63}"/>
+                <a16:creationId xmlns="" xmlns:a16="http://schemas.microsoft.com/office/drawing/2014/main" id="{786678D3-A3F1-454F-B40B-AB97D65E3A63}"/>
               </a:ext>
             </a:extLst>
           </p:cNvPr>
@@ -2726,7 +2726,7 @@
           <p:cNvPr id="7" name="Slide Number Placeholder 6">
             <a:extLst>
               <a:ext uri="{FF2B5EF4-FFF2-40B4-BE49-F238E27FC236}">
-                <a16:creationId xmlns:a16="http://schemas.microsoft.com/office/drawing/2014/main" xmlns="" id="{DBB54FFA-0409-400B-B8A1-A67876A1E3EA}"/>
+                <a16:creationId xmlns="" xmlns:a16="http://schemas.microsoft.com/office/drawing/2014/main" id="{DBB54FFA-0409-400B-B8A1-A67876A1E3EA}"/>
               </a:ext>
             </a:extLst>
           </p:cNvPr>
@@ -2790,7 +2790,7 @@
           <p:cNvPr id="2" name="Title Placeholder 1">
             <a:extLst>
               <a:ext uri="{FF2B5EF4-FFF2-40B4-BE49-F238E27FC236}">
-                <a16:creationId xmlns:a16="http://schemas.microsoft.com/office/drawing/2014/main" xmlns="" id="{D7007F74-BA27-4C14-A6D7-7F4724918C5F}"/>
+                <a16:creationId xmlns="" xmlns:a16="http://schemas.microsoft.com/office/drawing/2014/main" id="{D7007F74-BA27-4C14-A6D7-7F4724918C5F}"/>
               </a:ext>
             </a:extLst>
           </p:cNvPr>
@@ -2829,7 +2829,7 @@
           <p:cNvPr id="3" name="Text Placeholder 2">
             <a:extLst>
               <a:ext uri="{FF2B5EF4-FFF2-40B4-BE49-F238E27FC236}">
-                <a16:creationId xmlns:a16="http://schemas.microsoft.com/office/drawing/2014/main" xmlns="" id="{99B2D774-4E0B-4E12-B14A-1A01B75080FC}"/>
+                <a16:creationId xmlns="" xmlns:a16="http://schemas.microsoft.com/office/drawing/2014/main" id="{99B2D774-4E0B-4E12-B14A-1A01B75080FC}"/>
               </a:ext>
             </a:extLst>
           </p:cNvPr>
@@ -2897,7 +2897,7 @@
           <p:cNvPr id="4" name="Date Placeholder 3">
             <a:extLst>
               <a:ext uri="{FF2B5EF4-FFF2-40B4-BE49-F238E27FC236}">
-                <a16:creationId xmlns:a16="http://schemas.microsoft.com/office/drawing/2014/main" xmlns="" id="{B93A4BC0-DA86-4D9A-8ECA-26D07C557666}"/>
+                <a16:creationId xmlns="" xmlns:a16="http://schemas.microsoft.com/office/drawing/2014/main" id="{B93A4BC0-DA86-4D9A-8ECA-26D07C557666}"/>
               </a:ext>
             </a:extLst>
           </p:cNvPr>
@@ -2944,7 +2944,7 @@
           <p:cNvPr id="5" name="Footer Placeholder 4">
             <a:extLst>
               <a:ext uri="{FF2B5EF4-FFF2-40B4-BE49-F238E27FC236}">
-                <a16:creationId xmlns:a16="http://schemas.microsoft.com/office/drawing/2014/main" xmlns="" id="{6A1B10C5-D9A0-4C11-8EA0-6690193E30DF}"/>
+                <a16:creationId xmlns="" xmlns:a16="http://schemas.microsoft.com/office/drawing/2014/main" id="{6A1B10C5-D9A0-4C11-8EA0-6690193E30DF}"/>
               </a:ext>
             </a:extLst>
           </p:cNvPr>
@@ -2987,7 +2987,7 @@
           <p:cNvPr id="6" name="Slide Number Placeholder 5">
             <a:extLst>
               <a:ext uri="{FF2B5EF4-FFF2-40B4-BE49-F238E27FC236}">
-                <a16:creationId xmlns:a16="http://schemas.microsoft.com/office/drawing/2014/main" xmlns="" id="{310486ED-1B14-4910-B4EA-F17DEE438B45}"/>
+                <a16:creationId xmlns="" xmlns:a16="http://schemas.microsoft.com/office/drawing/2014/main" id="{310486ED-1B14-4910-B4EA-F17DEE438B45}"/>
               </a:ext>
             </a:extLst>
           </p:cNvPr>
@@ -3355,7 +3355,7 @@
           <p:cNvPr id="5" name="Table 4">
             <a:extLst>
               <a:ext uri="{FF2B5EF4-FFF2-40B4-BE49-F238E27FC236}">
-                <a16:creationId xmlns:a16="http://schemas.microsoft.com/office/drawing/2014/main" xmlns="" id="{2A780205-6AD3-4A25-9810-EC44FD0749F4}"/>
+                <a16:creationId xmlns="" xmlns:a16="http://schemas.microsoft.com/office/drawing/2014/main" id="{2A780205-6AD3-4A25-9810-EC44FD0749F4}"/>
               </a:ext>
             </a:extLst>
           </p:cNvPr>
@@ -3384,175 +3384,175 @@
                 <a:gridCol w="464546">
                   <a:extLst>
                     <a:ext uri="{9D8B030D-6E8A-4147-A177-3AD203B41FA5}">
-                      <a16:colId xmlns:a16="http://schemas.microsoft.com/office/drawing/2014/main" xmlns="" val="1019277772"/>
+                      <a16:colId xmlns="" xmlns:a16="http://schemas.microsoft.com/office/drawing/2014/main" val="1019277772"/>
                     </a:ext>
                   </a:extLst>
                 </a:gridCol>
                 <a:gridCol w="464546">
                   <a:extLst>
                     <a:ext uri="{9D8B030D-6E8A-4147-A177-3AD203B41FA5}">
-                      <a16:colId xmlns:a16="http://schemas.microsoft.com/office/drawing/2014/main" xmlns="" val="904070617"/>
+                      <a16:colId xmlns="" xmlns:a16="http://schemas.microsoft.com/office/drawing/2014/main" val="904070617"/>
                     </a:ext>
                   </a:extLst>
                 </a:gridCol>
                 <a:gridCol w="464546">
                   <a:extLst>
                     <a:ext uri="{9D8B030D-6E8A-4147-A177-3AD203B41FA5}">
-                      <a16:colId xmlns:a16="http://schemas.microsoft.com/office/drawing/2014/main" xmlns="" val="3450995975"/>
+                      <a16:colId xmlns="" xmlns:a16="http://schemas.microsoft.com/office/drawing/2014/main" val="3450995975"/>
                     </a:ext>
                   </a:extLst>
                 </a:gridCol>
                 <a:gridCol w="464546">
                   <a:extLst>
                     <a:ext uri="{9D8B030D-6E8A-4147-A177-3AD203B41FA5}">
-                      <a16:colId xmlns:a16="http://schemas.microsoft.com/office/drawing/2014/main" xmlns="" val="84178246"/>
+                      <a16:colId xmlns="" xmlns:a16="http://schemas.microsoft.com/office/drawing/2014/main" val="84178246"/>
                     </a:ext>
                   </a:extLst>
                 </a:gridCol>
                 <a:gridCol w="464546">
                   <a:extLst>
                     <a:ext uri="{9D8B030D-6E8A-4147-A177-3AD203B41FA5}">
-                      <a16:colId xmlns:a16="http://schemas.microsoft.com/office/drawing/2014/main" xmlns="" val="3444399563"/>
+                      <a16:colId xmlns="" xmlns:a16="http://schemas.microsoft.com/office/drawing/2014/main" val="3444399563"/>
                     </a:ext>
                   </a:extLst>
                 </a:gridCol>
                 <a:gridCol w="464546">
                   <a:extLst>
                     <a:ext uri="{9D8B030D-6E8A-4147-A177-3AD203B41FA5}">
-                      <a16:colId xmlns:a16="http://schemas.microsoft.com/office/drawing/2014/main" xmlns="" val="332534161"/>
+                      <a16:colId xmlns="" xmlns:a16="http://schemas.microsoft.com/office/drawing/2014/main" val="332534161"/>
                     </a:ext>
                   </a:extLst>
                 </a:gridCol>
                 <a:gridCol w="464546">
                   <a:extLst>
                     <a:ext uri="{9D8B030D-6E8A-4147-A177-3AD203B41FA5}">
-                      <a16:colId xmlns:a16="http://schemas.microsoft.com/office/drawing/2014/main" xmlns="" val="2290736699"/>
+                      <a16:colId xmlns="" xmlns:a16="http://schemas.microsoft.com/office/drawing/2014/main" val="2290736699"/>
                     </a:ext>
                   </a:extLst>
                 </a:gridCol>
                 <a:gridCol w="464546">
                   <a:extLst>
                     <a:ext uri="{9D8B030D-6E8A-4147-A177-3AD203B41FA5}">
-                      <a16:colId xmlns:a16="http://schemas.microsoft.com/office/drawing/2014/main" xmlns="" val="19451911"/>
+                      <a16:colId xmlns="" xmlns:a16="http://schemas.microsoft.com/office/drawing/2014/main" val="19451911"/>
                     </a:ext>
                   </a:extLst>
                 </a:gridCol>
                 <a:gridCol w="464546">
                   <a:extLst>
                     <a:ext uri="{9D8B030D-6E8A-4147-A177-3AD203B41FA5}">
-                      <a16:colId xmlns:a16="http://schemas.microsoft.com/office/drawing/2014/main" xmlns="" val="308529571"/>
+                      <a16:colId xmlns="" xmlns:a16="http://schemas.microsoft.com/office/drawing/2014/main" val="308529571"/>
                     </a:ext>
                   </a:extLst>
                 </a:gridCol>
                 <a:gridCol w="464546">
                   <a:extLst>
                     <a:ext uri="{9D8B030D-6E8A-4147-A177-3AD203B41FA5}">
-                      <a16:colId xmlns:a16="http://schemas.microsoft.com/office/drawing/2014/main" xmlns="" val="1626105078"/>
+                      <a16:colId xmlns="" xmlns:a16="http://schemas.microsoft.com/office/drawing/2014/main" val="1626105078"/>
                     </a:ext>
                   </a:extLst>
                 </a:gridCol>
                 <a:gridCol w="464546">
                   <a:extLst>
                     <a:ext uri="{9D8B030D-6E8A-4147-A177-3AD203B41FA5}">
-                      <a16:colId xmlns:a16="http://schemas.microsoft.com/office/drawing/2014/main" xmlns="" val="3796810149"/>
+                      <a16:colId xmlns="" xmlns:a16="http://schemas.microsoft.com/office/drawing/2014/main" val="3796810149"/>
                     </a:ext>
                   </a:extLst>
                 </a:gridCol>
                 <a:gridCol w="464546">
                   <a:extLst>
                     <a:ext uri="{9D8B030D-6E8A-4147-A177-3AD203B41FA5}">
-                      <a16:colId xmlns:a16="http://schemas.microsoft.com/office/drawing/2014/main" xmlns="" val="1772219669"/>
+                      <a16:colId xmlns="" xmlns:a16="http://schemas.microsoft.com/office/drawing/2014/main" val="1772219669"/>
                     </a:ext>
                   </a:extLst>
                 </a:gridCol>
                 <a:gridCol w="464546">
                   <a:extLst>
                     <a:ext uri="{9D8B030D-6E8A-4147-A177-3AD203B41FA5}">
-                      <a16:colId xmlns:a16="http://schemas.microsoft.com/office/drawing/2014/main" xmlns="" val="1327067936"/>
+                      <a16:colId xmlns="" xmlns:a16="http://schemas.microsoft.com/office/drawing/2014/main" val="1327067936"/>
                     </a:ext>
                   </a:extLst>
                 </a:gridCol>
                 <a:gridCol w="464546">
                   <a:extLst>
                     <a:ext uri="{9D8B030D-6E8A-4147-A177-3AD203B41FA5}">
-                      <a16:colId xmlns:a16="http://schemas.microsoft.com/office/drawing/2014/main" xmlns="" val="57842469"/>
+                      <a16:colId xmlns="" xmlns:a16="http://schemas.microsoft.com/office/drawing/2014/main" val="57842469"/>
                     </a:ext>
                   </a:extLst>
                 </a:gridCol>
                 <a:gridCol w="464546">
                   <a:extLst>
                     <a:ext uri="{9D8B030D-6E8A-4147-A177-3AD203B41FA5}">
-                      <a16:colId xmlns:a16="http://schemas.microsoft.com/office/drawing/2014/main" xmlns="" val="2526297131"/>
+                      <a16:colId xmlns="" xmlns:a16="http://schemas.microsoft.com/office/drawing/2014/main" val="2526297131"/>
                     </a:ext>
                   </a:extLst>
                 </a:gridCol>
                 <a:gridCol w="464546">
                   <a:extLst>
                     <a:ext uri="{9D8B030D-6E8A-4147-A177-3AD203B41FA5}">
-                      <a16:colId xmlns:a16="http://schemas.microsoft.com/office/drawing/2014/main" xmlns="" val="4184108719"/>
+                      <a16:colId xmlns="" xmlns:a16="http://schemas.microsoft.com/office/drawing/2014/main" val="4184108719"/>
                     </a:ext>
                   </a:extLst>
                 </a:gridCol>
                 <a:gridCol w="464546">
                   <a:extLst>
                     <a:ext uri="{9D8B030D-6E8A-4147-A177-3AD203B41FA5}">
-                      <a16:colId xmlns:a16="http://schemas.microsoft.com/office/drawing/2014/main" xmlns="" val="2493287182"/>
+                      <a16:colId xmlns="" xmlns:a16="http://schemas.microsoft.com/office/drawing/2014/main" val="2493287182"/>
                     </a:ext>
                   </a:extLst>
                 </a:gridCol>
                 <a:gridCol w="464546">
                   <a:extLst>
                     <a:ext uri="{9D8B030D-6E8A-4147-A177-3AD203B41FA5}">
-                      <a16:colId xmlns:a16="http://schemas.microsoft.com/office/drawing/2014/main" xmlns="" val="4018964974"/>
+                      <a16:colId xmlns="" xmlns:a16="http://schemas.microsoft.com/office/drawing/2014/main" val="4018964974"/>
                     </a:ext>
                   </a:extLst>
                 </a:gridCol>
                 <a:gridCol w="464546">
                   <a:extLst>
                     <a:ext uri="{9D8B030D-6E8A-4147-A177-3AD203B41FA5}">
-                      <a16:colId xmlns:a16="http://schemas.microsoft.com/office/drawing/2014/main" xmlns="" val="3303023726"/>
+                      <a16:colId xmlns="" xmlns:a16="http://schemas.microsoft.com/office/drawing/2014/main" val="3303023726"/>
                     </a:ext>
                   </a:extLst>
                 </a:gridCol>
                 <a:gridCol w="464546">
                   <a:extLst>
                     <a:ext uri="{9D8B030D-6E8A-4147-A177-3AD203B41FA5}">
-                      <a16:colId xmlns:a16="http://schemas.microsoft.com/office/drawing/2014/main" xmlns="" val="1047346888"/>
+                      <a16:colId xmlns="" xmlns:a16="http://schemas.microsoft.com/office/drawing/2014/main" val="1047346888"/>
                     </a:ext>
                   </a:extLst>
                 </a:gridCol>
                 <a:gridCol w="464546">
                   <a:extLst>
                     <a:ext uri="{9D8B030D-6E8A-4147-A177-3AD203B41FA5}">
-                      <a16:colId xmlns:a16="http://schemas.microsoft.com/office/drawing/2014/main" xmlns="" val="3175573251"/>
+                      <a16:colId xmlns="" xmlns:a16="http://schemas.microsoft.com/office/drawing/2014/main" val="3175573251"/>
                     </a:ext>
                   </a:extLst>
                 </a:gridCol>
                 <a:gridCol w="464546">
                   <a:extLst>
                     <a:ext uri="{9D8B030D-6E8A-4147-A177-3AD203B41FA5}">
-                      <a16:colId xmlns:a16="http://schemas.microsoft.com/office/drawing/2014/main" xmlns="" val="4176778861"/>
+                      <a16:colId xmlns="" xmlns:a16="http://schemas.microsoft.com/office/drawing/2014/main" val="4176778861"/>
                     </a:ext>
                   </a:extLst>
                 </a:gridCol>
                 <a:gridCol w="464546">
                   <a:extLst>
                     <a:ext uri="{9D8B030D-6E8A-4147-A177-3AD203B41FA5}">
-                      <a16:colId xmlns:a16="http://schemas.microsoft.com/office/drawing/2014/main" xmlns="" val="1113466877"/>
+                      <a16:colId xmlns="" xmlns:a16="http://schemas.microsoft.com/office/drawing/2014/main" val="1113466877"/>
                     </a:ext>
                   </a:extLst>
                 </a:gridCol>
                 <a:gridCol w="464546">
                   <a:extLst>
                     <a:ext uri="{9D8B030D-6E8A-4147-A177-3AD203B41FA5}">
-                      <a16:colId xmlns:a16="http://schemas.microsoft.com/office/drawing/2014/main" xmlns="" val="446932511"/>
+                      <a16:colId xmlns="" xmlns:a16="http://schemas.microsoft.com/office/drawing/2014/main" val="446932511"/>
                     </a:ext>
                   </a:extLst>
                 </a:gridCol>
                 <a:gridCol w="464546">
                   <a:extLst>
                     <a:ext uri="{9D8B030D-6E8A-4147-A177-3AD203B41FA5}">
-                      <a16:colId xmlns:a16="http://schemas.microsoft.com/office/drawing/2014/main" xmlns="" val="290695333"/>
+                      <a16:colId xmlns="" xmlns:a16="http://schemas.microsoft.com/office/drawing/2014/main" val="290695333"/>
                     </a:ext>
                   </a:extLst>
                 </a:gridCol>
@@ -3930,7 +3930,7 @@
                 </a:tc>
                 <a:extLst>
                   <a:ext uri="{0D108BD9-81ED-4DB2-BD59-A6C34878D82A}">
-                    <a16:rowId xmlns:a16="http://schemas.microsoft.com/office/drawing/2014/main" xmlns="" val="2941513846"/>
+                    <a16:rowId xmlns="" xmlns:a16="http://schemas.microsoft.com/office/drawing/2014/main" val="2941513846"/>
                   </a:ext>
                 </a:extLst>
               </a:tr>
@@ -3943,7 +3943,7 @@
           <p:cNvPr id="7" name="Straight Arrow Connector 6">
             <a:extLst>
               <a:ext uri="{FF2B5EF4-FFF2-40B4-BE49-F238E27FC236}">
-                <a16:creationId xmlns:a16="http://schemas.microsoft.com/office/drawing/2014/main" xmlns="" id="{8BFA402C-1619-4DB1-97AC-0867DDCAB434}"/>
+                <a16:creationId xmlns="" xmlns:a16="http://schemas.microsoft.com/office/drawing/2014/main" id="{8BFA402C-1619-4DB1-97AC-0867DDCAB434}"/>
               </a:ext>
             </a:extLst>
           </p:cNvPr>
@@ -3984,7 +3984,7 @@
           <p:cNvPr id="9" name="TextBox 8">
             <a:extLst>
               <a:ext uri="{FF2B5EF4-FFF2-40B4-BE49-F238E27FC236}">
-                <a16:creationId xmlns:a16="http://schemas.microsoft.com/office/drawing/2014/main" xmlns="" id="{63FF2E68-35A0-4B4A-AF0E-4FF5062412E9}"/>
+                <a16:creationId xmlns="" xmlns:a16="http://schemas.microsoft.com/office/drawing/2014/main" id="{63FF2E68-35A0-4B4A-AF0E-4FF5062412E9}"/>
               </a:ext>
             </a:extLst>
           </p:cNvPr>
@@ -4031,7 +4031,7 @@
           <p:cNvPr id="15" name="Picture 14">
             <a:extLst>
               <a:ext uri="{FF2B5EF4-FFF2-40B4-BE49-F238E27FC236}">
-                <a16:creationId xmlns:a16="http://schemas.microsoft.com/office/drawing/2014/main" xmlns="" id="{FB1FF901-C906-43CB-8F91-7D769A07AA2D}"/>
+                <a16:creationId xmlns="" xmlns:a16="http://schemas.microsoft.com/office/drawing/2014/main" id="{FB1FF901-C906-43CB-8F91-7D769A07AA2D}"/>
               </a:ext>
             </a:extLst>
           </p:cNvPr>
@@ -4061,7 +4061,7 @@
           <p:cNvPr id="16" name="TextBox 15">
             <a:extLst>
               <a:ext uri="{FF2B5EF4-FFF2-40B4-BE49-F238E27FC236}">
-                <a16:creationId xmlns:a16="http://schemas.microsoft.com/office/drawing/2014/main" xmlns="" id="{93DC42B1-BCA8-44DF-8C63-F55D3F34BDC9}"/>
+                <a16:creationId xmlns="" xmlns:a16="http://schemas.microsoft.com/office/drawing/2014/main" id="{93DC42B1-BCA8-44DF-8C63-F55D3F34BDC9}"/>
               </a:ext>
             </a:extLst>
           </p:cNvPr>
@@ -4096,7 +4096,7 @@
           <p:cNvPr id="17" name="Picture 16">
             <a:extLst>
               <a:ext uri="{FF2B5EF4-FFF2-40B4-BE49-F238E27FC236}">
-                <a16:creationId xmlns:a16="http://schemas.microsoft.com/office/drawing/2014/main" xmlns="" id="{590133A9-43B3-4ACA-8B6A-AC7C02124269}"/>
+                <a16:creationId xmlns="" xmlns:a16="http://schemas.microsoft.com/office/drawing/2014/main" id="{590133A9-43B3-4ACA-8B6A-AC7C02124269}"/>
               </a:ext>
             </a:extLst>
           </p:cNvPr>
@@ -4126,7 +4126,7 @@
           <p:cNvPr id="20" name="TextBox 19">
             <a:extLst>
               <a:ext uri="{FF2B5EF4-FFF2-40B4-BE49-F238E27FC236}">
-                <a16:creationId xmlns:a16="http://schemas.microsoft.com/office/drawing/2014/main" xmlns="" id="{F3C5B3FB-46BE-4DB8-AFF6-0342A6DD7DA8}"/>
+                <a16:creationId xmlns="" xmlns:a16="http://schemas.microsoft.com/office/drawing/2014/main" id="{F3C5B3FB-46BE-4DB8-AFF6-0342A6DD7DA8}"/>
               </a:ext>
             </a:extLst>
           </p:cNvPr>
@@ -4162,7 +4162,7 @@
           <p:cNvPr id="24" name="Arrow: Down 23">
             <a:extLst>
               <a:ext uri="{FF2B5EF4-FFF2-40B4-BE49-F238E27FC236}">
-                <a16:creationId xmlns:a16="http://schemas.microsoft.com/office/drawing/2014/main" xmlns="" id="{A88AAE1C-1796-490D-B473-313D439CF144}"/>
+                <a16:creationId xmlns="" xmlns:a16="http://schemas.microsoft.com/office/drawing/2014/main" id="{A88AAE1C-1796-490D-B473-313D439CF144}"/>
               </a:ext>
             </a:extLst>
           </p:cNvPr>
@@ -4208,7 +4208,7 @@
           <p:cNvPr id="25" name="TextBox 24">
             <a:extLst>
               <a:ext uri="{FF2B5EF4-FFF2-40B4-BE49-F238E27FC236}">
-                <a16:creationId xmlns:a16="http://schemas.microsoft.com/office/drawing/2014/main" xmlns="" id="{78812C09-EA6B-4EA6-B6DF-2E2A9815F127}"/>
+                <a16:creationId xmlns="" xmlns:a16="http://schemas.microsoft.com/office/drawing/2014/main" id="{78812C09-EA6B-4EA6-B6DF-2E2A9815F127}"/>
               </a:ext>
             </a:extLst>
           </p:cNvPr>
@@ -4243,7 +4243,7 @@
           <p:cNvPr id="26" name="TextBox 25">
             <a:extLst>
               <a:ext uri="{FF2B5EF4-FFF2-40B4-BE49-F238E27FC236}">
-                <a16:creationId xmlns:a16="http://schemas.microsoft.com/office/drawing/2014/main" xmlns="" id="{871C09F9-6C79-4F69-80A6-2181613CD9F8}"/>
+                <a16:creationId xmlns="" xmlns:a16="http://schemas.microsoft.com/office/drawing/2014/main" id="{871C09F9-6C79-4F69-80A6-2181613CD9F8}"/>
               </a:ext>
             </a:extLst>
           </p:cNvPr>
@@ -4308,7 +4308,7 @@
           <p:cNvPr id="5" name="Table 4">
             <a:extLst>
               <a:ext uri="{FF2B5EF4-FFF2-40B4-BE49-F238E27FC236}">
-                <a16:creationId xmlns:a16="http://schemas.microsoft.com/office/drawing/2014/main" xmlns="" id="{2A780205-6AD3-4A25-9810-EC44FD0749F4}"/>
+                <a16:creationId xmlns="" xmlns:a16="http://schemas.microsoft.com/office/drawing/2014/main" id="{2A780205-6AD3-4A25-9810-EC44FD0749F4}"/>
               </a:ext>
             </a:extLst>
           </p:cNvPr>
@@ -4337,175 +4337,175 @@
                 <a:gridCol w="464546">
                   <a:extLst>
                     <a:ext uri="{9D8B030D-6E8A-4147-A177-3AD203B41FA5}">
-                      <a16:colId xmlns:a16="http://schemas.microsoft.com/office/drawing/2014/main" xmlns="" val="1019277772"/>
+                      <a16:colId xmlns="" xmlns:a16="http://schemas.microsoft.com/office/drawing/2014/main" val="1019277772"/>
                     </a:ext>
                   </a:extLst>
                 </a:gridCol>
                 <a:gridCol w="464546">
                   <a:extLst>
                     <a:ext uri="{9D8B030D-6E8A-4147-A177-3AD203B41FA5}">
-                      <a16:colId xmlns:a16="http://schemas.microsoft.com/office/drawing/2014/main" xmlns="" val="904070617"/>
+                      <a16:colId xmlns="" xmlns:a16="http://schemas.microsoft.com/office/drawing/2014/main" val="904070617"/>
                     </a:ext>
                   </a:extLst>
                 </a:gridCol>
                 <a:gridCol w="464546">
                   <a:extLst>
                     <a:ext uri="{9D8B030D-6E8A-4147-A177-3AD203B41FA5}">
-                      <a16:colId xmlns:a16="http://schemas.microsoft.com/office/drawing/2014/main" xmlns="" val="3450995975"/>
+                      <a16:colId xmlns="" xmlns:a16="http://schemas.microsoft.com/office/drawing/2014/main" val="3450995975"/>
                     </a:ext>
                   </a:extLst>
                 </a:gridCol>
                 <a:gridCol w="464546">
                   <a:extLst>
                     <a:ext uri="{9D8B030D-6E8A-4147-A177-3AD203B41FA5}">
-                      <a16:colId xmlns:a16="http://schemas.microsoft.com/office/drawing/2014/main" xmlns="" val="84178246"/>
+                      <a16:colId xmlns="" xmlns:a16="http://schemas.microsoft.com/office/drawing/2014/main" val="84178246"/>
                     </a:ext>
                   </a:extLst>
                 </a:gridCol>
                 <a:gridCol w="464546">
                   <a:extLst>
                     <a:ext uri="{9D8B030D-6E8A-4147-A177-3AD203B41FA5}">
-                      <a16:colId xmlns:a16="http://schemas.microsoft.com/office/drawing/2014/main" xmlns="" val="3444399563"/>
+                      <a16:colId xmlns="" xmlns:a16="http://schemas.microsoft.com/office/drawing/2014/main" val="3444399563"/>
                     </a:ext>
                   </a:extLst>
                 </a:gridCol>
                 <a:gridCol w="464546">
                   <a:extLst>
                     <a:ext uri="{9D8B030D-6E8A-4147-A177-3AD203B41FA5}">
-                      <a16:colId xmlns:a16="http://schemas.microsoft.com/office/drawing/2014/main" xmlns="" val="332534161"/>
+                      <a16:colId xmlns="" xmlns:a16="http://schemas.microsoft.com/office/drawing/2014/main" val="332534161"/>
                     </a:ext>
                   </a:extLst>
                 </a:gridCol>
                 <a:gridCol w="464546">
                   <a:extLst>
                     <a:ext uri="{9D8B030D-6E8A-4147-A177-3AD203B41FA5}">
-                      <a16:colId xmlns:a16="http://schemas.microsoft.com/office/drawing/2014/main" xmlns="" val="2290736699"/>
+                      <a16:colId xmlns="" xmlns:a16="http://schemas.microsoft.com/office/drawing/2014/main" val="2290736699"/>
                     </a:ext>
                   </a:extLst>
                 </a:gridCol>
                 <a:gridCol w="464546">
                   <a:extLst>
                     <a:ext uri="{9D8B030D-6E8A-4147-A177-3AD203B41FA5}">
-                      <a16:colId xmlns:a16="http://schemas.microsoft.com/office/drawing/2014/main" xmlns="" val="19451911"/>
+                      <a16:colId xmlns="" xmlns:a16="http://schemas.microsoft.com/office/drawing/2014/main" val="19451911"/>
                     </a:ext>
                   </a:extLst>
                 </a:gridCol>
                 <a:gridCol w="464546">
                   <a:extLst>
                     <a:ext uri="{9D8B030D-6E8A-4147-A177-3AD203B41FA5}">
-                      <a16:colId xmlns:a16="http://schemas.microsoft.com/office/drawing/2014/main" xmlns="" val="308529571"/>
+                      <a16:colId xmlns="" xmlns:a16="http://schemas.microsoft.com/office/drawing/2014/main" val="308529571"/>
                     </a:ext>
                   </a:extLst>
                 </a:gridCol>
                 <a:gridCol w="464546">
                   <a:extLst>
                     <a:ext uri="{9D8B030D-6E8A-4147-A177-3AD203B41FA5}">
-                      <a16:colId xmlns:a16="http://schemas.microsoft.com/office/drawing/2014/main" xmlns="" val="1626105078"/>
+                      <a16:colId xmlns="" xmlns:a16="http://schemas.microsoft.com/office/drawing/2014/main" val="1626105078"/>
                     </a:ext>
                   </a:extLst>
                 </a:gridCol>
                 <a:gridCol w="464546">
                   <a:extLst>
                     <a:ext uri="{9D8B030D-6E8A-4147-A177-3AD203B41FA5}">
-                      <a16:colId xmlns:a16="http://schemas.microsoft.com/office/drawing/2014/main" xmlns="" val="3796810149"/>
+                      <a16:colId xmlns="" xmlns:a16="http://schemas.microsoft.com/office/drawing/2014/main" val="3796810149"/>
                     </a:ext>
                   </a:extLst>
                 </a:gridCol>
                 <a:gridCol w="464546">
                   <a:extLst>
                     <a:ext uri="{9D8B030D-6E8A-4147-A177-3AD203B41FA5}">
-                      <a16:colId xmlns:a16="http://schemas.microsoft.com/office/drawing/2014/main" xmlns="" val="1772219669"/>
+                      <a16:colId xmlns="" xmlns:a16="http://schemas.microsoft.com/office/drawing/2014/main" val="1772219669"/>
                     </a:ext>
                   </a:extLst>
                 </a:gridCol>
                 <a:gridCol w="464546">
                   <a:extLst>
                     <a:ext uri="{9D8B030D-6E8A-4147-A177-3AD203B41FA5}">
-                      <a16:colId xmlns:a16="http://schemas.microsoft.com/office/drawing/2014/main" xmlns="" val="1327067936"/>
+                      <a16:colId xmlns="" xmlns:a16="http://schemas.microsoft.com/office/drawing/2014/main" val="1327067936"/>
                     </a:ext>
                   </a:extLst>
                 </a:gridCol>
                 <a:gridCol w="464546">
                   <a:extLst>
                     <a:ext uri="{9D8B030D-6E8A-4147-A177-3AD203B41FA5}">
-                      <a16:colId xmlns:a16="http://schemas.microsoft.com/office/drawing/2014/main" xmlns="" val="57842469"/>
+                      <a16:colId xmlns="" xmlns:a16="http://schemas.microsoft.com/office/drawing/2014/main" val="57842469"/>
                     </a:ext>
                   </a:extLst>
                 </a:gridCol>
                 <a:gridCol w="464546">
                   <a:extLst>
                     <a:ext uri="{9D8B030D-6E8A-4147-A177-3AD203B41FA5}">
-                      <a16:colId xmlns:a16="http://schemas.microsoft.com/office/drawing/2014/main" xmlns="" val="2526297131"/>
+                      <a16:colId xmlns="" xmlns:a16="http://schemas.microsoft.com/office/drawing/2014/main" val="2526297131"/>
                     </a:ext>
                   </a:extLst>
                 </a:gridCol>
                 <a:gridCol w="464546">
                   <a:extLst>
                     <a:ext uri="{9D8B030D-6E8A-4147-A177-3AD203B41FA5}">
-                      <a16:colId xmlns:a16="http://schemas.microsoft.com/office/drawing/2014/main" xmlns="" val="4184108719"/>
+                      <a16:colId xmlns="" xmlns:a16="http://schemas.microsoft.com/office/drawing/2014/main" val="4184108719"/>
                     </a:ext>
                   </a:extLst>
                 </a:gridCol>
                 <a:gridCol w="464546">
                   <a:extLst>
                     <a:ext uri="{9D8B030D-6E8A-4147-A177-3AD203B41FA5}">
-                      <a16:colId xmlns:a16="http://schemas.microsoft.com/office/drawing/2014/main" xmlns="" val="2493287182"/>
+                      <a16:colId xmlns="" xmlns:a16="http://schemas.microsoft.com/office/drawing/2014/main" val="2493287182"/>
                     </a:ext>
                   </a:extLst>
                 </a:gridCol>
                 <a:gridCol w="464546">
                   <a:extLst>
                     <a:ext uri="{9D8B030D-6E8A-4147-A177-3AD203B41FA5}">
-                      <a16:colId xmlns:a16="http://schemas.microsoft.com/office/drawing/2014/main" xmlns="" val="4018964974"/>
+                      <a16:colId xmlns="" xmlns:a16="http://schemas.microsoft.com/office/drawing/2014/main" val="4018964974"/>
                     </a:ext>
                   </a:extLst>
                 </a:gridCol>
                 <a:gridCol w="464546">
                   <a:extLst>
                     <a:ext uri="{9D8B030D-6E8A-4147-A177-3AD203B41FA5}">
-                      <a16:colId xmlns:a16="http://schemas.microsoft.com/office/drawing/2014/main" xmlns="" val="3303023726"/>
+                      <a16:colId xmlns="" xmlns:a16="http://schemas.microsoft.com/office/drawing/2014/main" val="3303023726"/>
                     </a:ext>
                   </a:extLst>
                 </a:gridCol>
                 <a:gridCol w="464546">
                   <a:extLst>
                     <a:ext uri="{9D8B030D-6E8A-4147-A177-3AD203B41FA5}">
-                      <a16:colId xmlns:a16="http://schemas.microsoft.com/office/drawing/2014/main" xmlns="" val="1047346888"/>
+                      <a16:colId xmlns="" xmlns:a16="http://schemas.microsoft.com/office/drawing/2014/main" val="1047346888"/>
                     </a:ext>
                   </a:extLst>
                 </a:gridCol>
                 <a:gridCol w="464546">
                   <a:extLst>
                     <a:ext uri="{9D8B030D-6E8A-4147-A177-3AD203B41FA5}">
-                      <a16:colId xmlns:a16="http://schemas.microsoft.com/office/drawing/2014/main" xmlns="" val="3175573251"/>
+                      <a16:colId xmlns="" xmlns:a16="http://schemas.microsoft.com/office/drawing/2014/main" val="3175573251"/>
                     </a:ext>
                   </a:extLst>
                 </a:gridCol>
                 <a:gridCol w="464546">
                   <a:extLst>
                     <a:ext uri="{9D8B030D-6E8A-4147-A177-3AD203B41FA5}">
-                      <a16:colId xmlns:a16="http://schemas.microsoft.com/office/drawing/2014/main" xmlns="" val="4176778861"/>
+                      <a16:colId xmlns="" xmlns:a16="http://schemas.microsoft.com/office/drawing/2014/main" val="4176778861"/>
                     </a:ext>
                   </a:extLst>
                 </a:gridCol>
                 <a:gridCol w="464546">
                   <a:extLst>
                     <a:ext uri="{9D8B030D-6E8A-4147-A177-3AD203B41FA5}">
-                      <a16:colId xmlns:a16="http://schemas.microsoft.com/office/drawing/2014/main" xmlns="" val="1113466877"/>
+                      <a16:colId xmlns="" xmlns:a16="http://schemas.microsoft.com/office/drawing/2014/main" val="1113466877"/>
                     </a:ext>
                   </a:extLst>
                 </a:gridCol>
                 <a:gridCol w="464546">
                   <a:extLst>
                     <a:ext uri="{9D8B030D-6E8A-4147-A177-3AD203B41FA5}">
-                      <a16:colId xmlns:a16="http://schemas.microsoft.com/office/drawing/2014/main" xmlns="" val="446932511"/>
+                      <a16:colId xmlns="" xmlns:a16="http://schemas.microsoft.com/office/drawing/2014/main" val="446932511"/>
                     </a:ext>
                   </a:extLst>
                 </a:gridCol>
                 <a:gridCol w="464546">
                   <a:extLst>
                     <a:ext uri="{9D8B030D-6E8A-4147-A177-3AD203B41FA5}">
-                      <a16:colId xmlns:a16="http://schemas.microsoft.com/office/drawing/2014/main" xmlns="" val="290695333"/>
+                      <a16:colId xmlns="" xmlns:a16="http://schemas.microsoft.com/office/drawing/2014/main" val="290695333"/>
                     </a:ext>
                   </a:extLst>
                 </a:gridCol>
@@ -4824,7 +4824,7 @@
                 </a:tc>
                 <a:extLst>
                   <a:ext uri="{0D108BD9-81ED-4DB2-BD59-A6C34878D82A}">
-                    <a16:rowId xmlns:a16="http://schemas.microsoft.com/office/drawing/2014/main" xmlns="" val="2941513846"/>
+                    <a16:rowId xmlns="" xmlns:a16="http://schemas.microsoft.com/office/drawing/2014/main" val="2941513846"/>
                   </a:ext>
                 </a:extLst>
               </a:tr>
@@ -4895,7 +4895,7 @@
           <p:cNvPr id="18" name="Table 17">
             <a:extLst>
               <a:ext uri="{FF2B5EF4-FFF2-40B4-BE49-F238E27FC236}">
-                <a16:creationId xmlns:a16="http://schemas.microsoft.com/office/drawing/2014/main" xmlns="" id="{2A780205-6AD3-4A25-9810-EC44FD0749F4}"/>
+                <a16:creationId xmlns="" xmlns:a16="http://schemas.microsoft.com/office/drawing/2014/main" id="{2A780205-6AD3-4A25-9810-EC44FD0749F4}"/>
               </a:ext>
             </a:extLst>
           </p:cNvPr>
@@ -4924,175 +4924,175 @@
                 <a:gridCol w="464546">
                   <a:extLst>
                     <a:ext uri="{9D8B030D-6E8A-4147-A177-3AD203B41FA5}">
-                      <a16:colId xmlns:a16="http://schemas.microsoft.com/office/drawing/2014/main" xmlns="" val="1019277772"/>
+                      <a16:colId xmlns="" xmlns:a16="http://schemas.microsoft.com/office/drawing/2014/main" val="1019277772"/>
                     </a:ext>
                   </a:extLst>
                 </a:gridCol>
                 <a:gridCol w="464546">
                   <a:extLst>
                     <a:ext uri="{9D8B030D-6E8A-4147-A177-3AD203B41FA5}">
-                      <a16:colId xmlns:a16="http://schemas.microsoft.com/office/drawing/2014/main" xmlns="" val="904070617"/>
+                      <a16:colId xmlns="" xmlns:a16="http://schemas.microsoft.com/office/drawing/2014/main" val="904070617"/>
                     </a:ext>
                   </a:extLst>
                 </a:gridCol>
                 <a:gridCol w="464546">
                   <a:extLst>
                     <a:ext uri="{9D8B030D-6E8A-4147-A177-3AD203B41FA5}">
-                      <a16:colId xmlns:a16="http://schemas.microsoft.com/office/drawing/2014/main" xmlns="" val="3450995975"/>
+                      <a16:colId xmlns="" xmlns:a16="http://schemas.microsoft.com/office/drawing/2014/main" val="3450995975"/>
                     </a:ext>
                   </a:extLst>
                 </a:gridCol>
                 <a:gridCol w="464546">
                   <a:extLst>
                     <a:ext uri="{9D8B030D-6E8A-4147-A177-3AD203B41FA5}">
-                      <a16:colId xmlns:a16="http://schemas.microsoft.com/office/drawing/2014/main" xmlns="" val="84178246"/>
+                      <a16:colId xmlns="" xmlns:a16="http://schemas.microsoft.com/office/drawing/2014/main" val="84178246"/>
                     </a:ext>
                   </a:extLst>
                 </a:gridCol>
                 <a:gridCol w="464546">
                   <a:extLst>
                     <a:ext uri="{9D8B030D-6E8A-4147-A177-3AD203B41FA5}">
-                      <a16:colId xmlns:a16="http://schemas.microsoft.com/office/drawing/2014/main" xmlns="" val="3444399563"/>
+                      <a16:colId xmlns="" xmlns:a16="http://schemas.microsoft.com/office/drawing/2014/main" val="3444399563"/>
                     </a:ext>
                   </a:extLst>
                 </a:gridCol>
                 <a:gridCol w="464546">
                   <a:extLst>
                     <a:ext uri="{9D8B030D-6E8A-4147-A177-3AD203B41FA5}">
-                      <a16:colId xmlns:a16="http://schemas.microsoft.com/office/drawing/2014/main" xmlns="" val="332534161"/>
+                      <a16:colId xmlns="" xmlns:a16="http://schemas.microsoft.com/office/drawing/2014/main" val="332534161"/>
                     </a:ext>
                   </a:extLst>
                 </a:gridCol>
                 <a:gridCol w="464546">
                   <a:extLst>
                     <a:ext uri="{9D8B030D-6E8A-4147-A177-3AD203B41FA5}">
-                      <a16:colId xmlns:a16="http://schemas.microsoft.com/office/drawing/2014/main" xmlns="" val="2290736699"/>
+                      <a16:colId xmlns="" xmlns:a16="http://schemas.microsoft.com/office/drawing/2014/main" val="2290736699"/>
                     </a:ext>
                   </a:extLst>
                 </a:gridCol>
                 <a:gridCol w="464546">
                   <a:extLst>
                     <a:ext uri="{9D8B030D-6E8A-4147-A177-3AD203B41FA5}">
-                      <a16:colId xmlns:a16="http://schemas.microsoft.com/office/drawing/2014/main" xmlns="" val="19451911"/>
+                      <a16:colId xmlns="" xmlns:a16="http://schemas.microsoft.com/office/drawing/2014/main" val="19451911"/>
                     </a:ext>
                   </a:extLst>
                 </a:gridCol>
                 <a:gridCol w="464546">
                   <a:extLst>
                     <a:ext uri="{9D8B030D-6E8A-4147-A177-3AD203B41FA5}">
-                      <a16:colId xmlns:a16="http://schemas.microsoft.com/office/drawing/2014/main" xmlns="" val="308529571"/>
+                      <a16:colId xmlns="" xmlns:a16="http://schemas.microsoft.com/office/drawing/2014/main" val="308529571"/>
                     </a:ext>
                   </a:extLst>
                 </a:gridCol>
                 <a:gridCol w="464546">
                   <a:extLst>
                     <a:ext uri="{9D8B030D-6E8A-4147-A177-3AD203B41FA5}">
-                      <a16:colId xmlns:a16="http://schemas.microsoft.com/office/drawing/2014/main" xmlns="" val="1626105078"/>
+                      <a16:colId xmlns="" xmlns:a16="http://schemas.microsoft.com/office/drawing/2014/main" val="1626105078"/>
                     </a:ext>
                   </a:extLst>
                 </a:gridCol>
                 <a:gridCol w="464546">
                   <a:extLst>
                     <a:ext uri="{9D8B030D-6E8A-4147-A177-3AD203B41FA5}">
-                      <a16:colId xmlns:a16="http://schemas.microsoft.com/office/drawing/2014/main" xmlns="" val="3796810149"/>
+                      <a16:colId xmlns="" xmlns:a16="http://schemas.microsoft.com/office/drawing/2014/main" val="3796810149"/>
                     </a:ext>
                   </a:extLst>
                 </a:gridCol>
                 <a:gridCol w="464546">
                   <a:extLst>
                     <a:ext uri="{9D8B030D-6E8A-4147-A177-3AD203B41FA5}">
-                      <a16:colId xmlns:a16="http://schemas.microsoft.com/office/drawing/2014/main" xmlns="" val="1772219669"/>
+                      <a16:colId xmlns="" xmlns:a16="http://schemas.microsoft.com/office/drawing/2014/main" val="1772219669"/>
                     </a:ext>
                   </a:extLst>
                 </a:gridCol>
                 <a:gridCol w="464546">
                   <a:extLst>
                     <a:ext uri="{9D8B030D-6E8A-4147-A177-3AD203B41FA5}">
-                      <a16:colId xmlns:a16="http://schemas.microsoft.com/office/drawing/2014/main" xmlns="" val="1327067936"/>
+                      <a16:colId xmlns="" xmlns:a16="http://schemas.microsoft.com/office/drawing/2014/main" val="1327067936"/>
                     </a:ext>
                   </a:extLst>
                 </a:gridCol>
                 <a:gridCol w="464546">
                   <a:extLst>
                     <a:ext uri="{9D8B030D-6E8A-4147-A177-3AD203B41FA5}">
-                      <a16:colId xmlns:a16="http://schemas.microsoft.com/office/drawing/2014/main" xmlns="" val="57842469"/>
+                      <a16:colId xmlns="" xmlns:a16="http://schemas.microsoft.com/office/drawing/2014/main" val="57842469"/>
                     </a:ext>
                   </a:extLst>
                 </a:gridCol>
                 <a:gridCol w="464546">
                   <a:extLst>
                     <a:ext uri="{9D8B030D-6E8A-4147-A177-3AD203B41FA5}">
-                      <a16:colId xmlns:a16="http://schemas.microsoft.com/office/drawing/2014/main" xmlns="" val="2526297131"/>
+                      <a16:colId xmlns="" xmlns:a16="http://schemas.microsoft.com/office/drawing/2014/main" val="2526297131"/>
                     </a:ext>
                   </a:extLst>
                 </a:gridCol>
                 <a:gridCol w="464546">
                   <a:extLst>
                     <a:ext uri="{9D8B030D-6E8A-4147-A177-3AD203B41FA5}">
-                      <a16:colId xmlns:a16="http://schemas.microsoft.com/office/drawing/2014/main" xmlns="" val="4184108719"/>
+                      <a16:colId xmlns="" xmlns:a16="http://schemas.microsoft.com/office/drawing/2014/main" val="4184108719"/>
                     </a:ext>
                   </a:extLst>
                 </a:gridCol>
                 <a:gridCol w="464546">
                   <a:extLst>
                     <a:ext uri="{9D8B030D-6E8A-4147-A177-3AD203B41FA5}">
-                      <a16:colId xmlns:a16="http://schemas.microsoft.com/office/drawing/2014/main" xmlns="" val="2493287182"/>
+                      <a16:colId xmlns="" xmlns:a16="http://schemas.microsoft.com/office/drawing/2014/main" val="2493287182"/>
                     </a:ext>
                   </a:extLst>
                 </a:gridCol>
                 <a:gridCol w="464546">
                   <a:extLst>
                     <a:ext uri="{9D8B030D-6E8A-4147-A177-3AD203B41FA5}">
-                      <a16:colId xmlns:a16="http://schemas.microsoft.com/office/drawing/2014/main" xmlns="" val="4018964974"/>
+                      <a16:colId xmlns="" xmlns:a16="http://schemas.microsoft.com/office/drawing/2014/main" val="4018964974"/>
                     </a:ext>
                   </a:extLst>
                 </a:gridCol>
                 <a:gridCol w="464546">
                   <a:extLst>
                     <a:ext uri="{9D8B030D-6E8A-4147-A177-3AD203B41FA5}">
-                      <a16:colId xmlns:a16="http://schemas.microsoft.com/office/drawing/2014/main" xmlns="" val="3303023726"/>
+                      <a16:colId xmlns="" xmlns:a16="http://schemas.microsoft.com/office/drawing/2014/main" val="3303023726"/>
                     </a:ext>
                   </a:extLst>
                 </a:gridCol>
                 <a:gridCol w="464546">
                   <a:extLst>
                     <a:ext uri="{9D8B030D-6E8A-4147-A177-3AD203B41FA5}">
-                      <a16:colId xmlns:a16="http://schemas.microsoft.com/office/drawing/2014/main" xmlns="" val="1047346888"/>
+                      <a16:colId xmlns="" xmlns:a16="http://schemas.microsoft.com/office/drawing/2014/main" val="1047346888"/>
                     </a:ext>
                   </a:extLst>
                 </a:gridCol>
                 <a:gridCol w="464546">
                   <a:extLst>
                     <a:ext uri="{9D8B030D-6E8A-4147-A177-3AD203B41FA5}">
-                      <a16:colId xmlns:a16="http://schemas.microsoft.com/office/drawing/2014/main" xmlns="" val="3175573251"/>
+                      <a16:colId xmlns="" xmlns:a16="http://schemas.microsoft.com/office/drawing/2014/main" val="3175573251"/>
                     </a:ext>
                   </a:extLst>
                 </a:gridCol>
                 <a:gridCol w="464546">
                   <a:extLst>
                     <a:ext uri="{9D8B030D-6E8A-4147-A177-3AD203B41FA5}">
-                      <a16:colId xmlns:a16="http://schemas.microsoft.com/office/drawing/2014/main" xmlns="" val="4176778861"/>
+                      <a16:colId xmlns="" xmlns:a16="http://schemas.microsoft.com/office/drawing/2014/main" val="4176778861"/>
                     </a:ext>
                   </a:extLst>
                 </a:gridCol>
                 <a:gridCol w="464546">
                   <a:extLst>
                     <a:ext uri="{9D8B030D-6E8A-4147-A177-3AD203B41FA5}">
-                      <a16:colId xmlns:a16="http://schemas.microsoft.com/office/drawing/2014/main" xmlns="" val="1113466877"/>
+                      <a16:colId xmlns="" xmlns:a16="http://schemas.microsoft.com/office/drawing/2014/main" val="1113466877"/>
                     </a:ext>
                   </a:extLst>
                 </a:gridCol>
                 <a:gridCol w="464546">
                   <a:extLst>
                     <a:ext uri="{9D8B030D-6E8A-4147-A177-3AD203B41FA5}">
-                      <a16:colId xmlns:a16="http://schemas.microsoft.com/office/drawing/2014/main" xmlns="" val="446932511"/>
+                      <a16:colId xmlns="" xmlns:a16="http://schemas.microsoft.com/office/drawing/2014/main" val="446932511"/>
                     </a:ext>
                   </a:extLst>
                 </a:gridCol>
                 <a:gridCol w="464546">
                   <a:extLst>
                     <a:ext uri="{9D8B030D-6E8A-4147-A177-3AD203B41FA5}">
-                      <a16:colId xmlns:a16="http://schemas.microsoft.com/office/drawing/2014/main" xmlns="" val="290695333"/>
+                      <a16:colId xmlns="" xmlns:a16="http://schemas.microsoft.com/office/drawing/2014/main" val="290695333"/>
                     </a:ext>
                   </a:extLst>
                 </a:gridCol>
@@ -5571,7 +5571,7 @@
                 </a:tc>
                 <a:extLst>
                   <a:ext uri="{0D108BD9-81ED-4DB2-BD59-A6C34878D82A}">
-                    <a16:rowId xmlns:a16="http://schemas.microsoft.com/office/drawing/2014/main" xmlns="" val="2941513846"/>
+                    <a16:rowId xmlns="" xmlns:a16="http://schemas.microsoft.com/office/drawing/2014/main" val="2941513846"/>
                   </a:ext>
                 </a:extLst>
               </a:tr>
@@ -5584,7 +5584,7 @@
           <p:cNvPr id="19" name="Picture 18">
             <a:extLst>
               <a:ext uri="{FF2B5EF4-FFF2-40B4-BE49-F238E27FC236}">
-                <a16:creationId xmlns:a16="http://schemas.microsoft.com/office/drawing/2014/main" xmlns="" id="{590133A9-43B3-4ACA-8B6A-AC7C02124269}"/>
+                <a16:creationId xmlns="" xmlns:a16="http://schemas.microsoft.com/office/drawing/2014/main" id="{590133A9-43B3-4ACA-8B6A-AC7C02124269}"/>
               </a:ext>
             </a:extLst>
           </p:cNvPr>
@@ -5614,7 +5614,7 @@
           <p:cNvPr id="21" name="Picture 20">
             <a:extLst>
               <a:ext uri="{FF2B5EF4-FFF2-40B4-BE49-F238E27FC236}">
-                <a16:creationId xmlns:a16="http://schemas.microsoft.com/office/drawing/2014/main" xmlns="" id="{590133A9-43B3-4ACA-8B6A-AC7C02124269}"/>
+                <a16:creationId xmlns="" xmlns:a16="http://schemas.microsoft.com/office/drawing/2014/main" id="{590133A9-43B3-4ACA-8B6A-AC7C02124269}"/>
               </a:ext>
             </a:extLst>
           </p:cNvPr>
@@ -5644,7 +5644,7 @@
           <p:cNvPr id="22" name="Picture 21">
             <a:extLst>
               <a:ext uri="{FF2B5EF4-FFF2-40B4-BE49-F238E27FC236}">
-                <a16:creationId xmlns:a16="http://schemas.microsoft.com/office/drawing/2014/main" xmlns="" id="{590133A9-43B3-4ACA-8B6A-AC7C02124269}"/>
+                <a16:creationId xmlns="" xmlns:a16="http://schemas.microsoft.com/office/drawing/2014/main" id="{590133A9-43B3-4ACA-8B6A-AC7C02124269}"/>
               </a:ext>
             </a:extLst>
           </p:cNvPr>
@@ -5674,7 +5674,7 @@
           <p:cNvPr id="23" name="Picture 22">
             <a:extLst>
               <a:ext uri="{FF2B5EF4-FFF2-40B4-BE49-F238E27FC236}">
-                <a16:creationId xmlns:a16="http://schemas.microsoft.com/office/drawing/2014/main" xmlns="" id="{590133A9-43B3-4ACA-8B6A-AC7C02124269}"/>
+                <a16:creationId xmlns="" xmlns:a16="http://schemas.microsoft.com/office/drawing/2014/main" id="{590133A9-43B3-4ACA-8B6A-AC7C02124269}"/>
               </a:ext>
             </a:extLst>
           </p:cNvPr>
@@ -9101,7 +9101,7 @@
           <p:cNvPr id="5" name="Table 4">
             <a:extLst>
               <a:ext uri="{FF2B5EF4-FFF2-40B4-BE49-F238E27FC236}">
-                <a16:creationId xmlns:a16="http://schemas.microsoft.com/office/drawing/2014/main" xmlns="" id="{2A780205-6AD3-4A25-9810-EC44FD0749F4}"/>
+                <a16:creationId xmlns="" xmlns:a16="http://schemas.microsoft.com/office/drawing/2014/main" id="{2A780205-6AD3-4A25-9810-EC44FD0749F4}"/>
               </a:ext>
             </a:extLst>
           </p:cNvPr>
@@ -9130,175 +9130,175 @@
                 <a:gridCol w="464546">
                   <a:extLst>
                     <a:ext uri="{9D8B030D-6E8A-4147-A177-3AD203B41FA5}">
-                      <a16:colId xmlns:a16="http://schemas.microsoft.com/office/drawing/2014/main" xmlns="" val="1019277772"/>
+                      <a16:colId xmlns="" xmlns:a16="http://schemas.microsoft.com/office/drawing/2014/main" val="1019277772"/>
                     </a:ext>
                   </a:extLst>
                 </a:gridCol>
                 <a:gridCol w="464546">
                   <a:extLst>
                     <a:ext uri="{9D8B030D-6E8A-4147-A177-3AD203B41FA5}">
-                      <a16:colId xmlns:a16="http://schemas.microsoft.com/office/drawing/2014/main" xmlns="" val="904070617"/>
+                      <a16:colId xmlns="" xmlns:a16="http://schemas.microsoft.com/office/drawing/2014/main" val="904070617"/>
                     </a:ext>
                   </a:extLst>
                 </a:gridCol>
                 <a:gridCol w="464546">
                   <a:extLst>
                     <a:ext uri="{9D8B030D-6E8A-4147-A177-3AD203B41FA5}">
-                      <a16:colId xmlns:a16="http://schemas.microsoft.com/office/drawing/2014/main" xmlns="" val="3450995975"/>
+                      <a16:colId xmlns="" xmlns:a16="http://schemas.microsoft.com/office/drawing/2014/main" val="3450995975"/>
                     </a:ext>
                   </a:extLst>
                 </a:gridCol>
                 <a:gridCol w="464546">
                   <a:extLst>
                     <a:ext uri="{9D8B030D-6E8A-4147-A177-3AD203B41FA5}">
-                      <a16:colId xmlns:a16="http://schemas.microsoft.com/office/drawing/2014/main" xmlns="" val="84178246"/>
+                      <a16:colId xmlns="" xmlns:a16="http://schemas.microsoft.com/office/drawing/2014/main" val="84178246"/>
                     </a:ext>
                   </a:extLst>
                 </a:gridCol>
                 <a:gridCol w="464546">
                   <a:extLst>
                     <a:ext uri="{9D8B030D-6E8A-4147-A177-3AD203B41FA5}">
-                      <a16:colId xmlns:a16="http://schemas.microsoft.com/office/drawing/2014/main" xmlns="" val="3444399563"/>
+                      <a16:colId xmlns="" xmlns:a16="http://schemas.microsoft.com/office/drawing/2014/main" val="3444399563"/>
                     </a:ext>
                   </a:extLst>
                 </a:gridCol>
                 <a:gridCol w="464546">
                   <a:extLst>
                     <a:ext uri="{9D8B030D-6E8A-4147-A177-3AD203B41FA5}">
-                      <a16:colId xmlns:a16="http://schemas.microsoft.com/office/drawing/2014/main" xmlns="" val="332534161"/>
+                      <a16:colId xmlns="" xmlns:a16="http://schemas.microsoft.com/office/drawing/2014/main" val="332534161"/>
                     </a:ext>
                   </a:extLst>
                 </a:gridCol>
                 <a:gridCol w="464546">
                   <a:extLst>
                     <a:ext uri="{9D8B030D-6E8A-4147-A177-3AD203B41FA5}">
-                      <a16:colId xmlns:a16="http://schemas.microsoft.com/office/drawing/2014/main" xmlns="" val="2290736699"/>
+                      <a16:colId xmlns="" xmlns:a16="http://schemas.microsoft.com/office/drawing/2014/main" val="2290736699"/>
                     </a:ext>
                   </a:extLst>
                 </a:gridCol>
                 <a:gridCol w="464546">
                   <a:extLst>
                     <a:ext uri="{9D8B030D-6E8A-4147-A177-3AD203B41FA5}">
-                      <a16:colId xmlns:a16="http://schemas.microsoft.com/office/drawing/2014/main" xmlns="" val="19451911"/>
+                      <a16:colId xmlns="" xmlns:a16="http://schemas.microsoft.com/office/drawing/2014/main" val="19451911"/>
                     </a:ext>
                   </a:extLst>
                 </a:gridCol>
                 <a:gridCol w="464546">
                   <a:extLst>
                     <a:ext uri="{9D8B030D-6E8A-4147-A177-3AD203B41FA5}">
-                      <a16:colId xmlns:a16="http://schemas.microsoft.com/office/drawing/2014/main" xmlns="" val="308529571"/>
+                      <a16:colId xmlns="" xmlns:a16="http://schemas.microsoft.com/office/drawing/2014/main" val="308529571"/>
                     </a:ext>
                   </a:extLst>
                 </a:gridCol>
                 <a:gridCol w="464546">
                   <a:extLst>
                     <a:ext uri="{9D8B030D-6E8A-4147-A177-3AD203B41FA5}">
-                      <a16:colId xmlns:a16="http://schemas.microsoft.com/office/drawing/2014/main" xmlns="" val="1626105078"/>
+                      <a16:colId xmlns="" xmlns:a16="http://schemas.microsoft.com/office/drawing/2014/main" val="1626105078"/>
                     </a:ext>
                   </a:extLst>
                 </a:gridCol>
                 <a:gridCol w="464546">
                   <a:extLst>
                     <a:ext uri="{9D8B030D-6E8A-4147-A177-3AD203B41FA5}">
-                      <a16:colId xmlns:a16="http://schemas.microsoft.com/office/drawing/2014/main" xmlns="" val="3796810149"/>
+                      <a16:colId xmlns="" xmlns:a16="http://schemas.microsoft.com/office/drawing/2014/main" val="3796810149"/>
                     </a:ext>
                   </a:extLst>
                 </a:gridCol>
                 <a:gridCol w="464546">
                   <a:extLst>
                     <a:ext uri="{9D8B030D-6E8A-4147-A177-3AD203B41FA5}">
-                      <a16:colId xmlns:a16="http://schemas.microsoft.com/office/drawing/2014/main" xmlns="" val="1772219669"/>
+                      <a16:colId xmlns="" xmlns:a16="http://schemas.microsoft.com/office/drawing/2014/main" val="1772219669"/>
                     </a:ext>
                   </a:extLst>
                 </a:gridCol>
                 <a:gridCol w="464546">
                   <a:extLst>
                     <a:ext uri="{9D8B030D-6E8A-4147-A177-3AD203B41FA5}">
-                      <a16:colId xmlns:a16="http://schemas.microsoft.com/office/drawing/2014/main" xmlns="" val="1327067936"/>
+                      <a16:colId xmlns="" xmlns:a16="http://schemas.microsoft.com/office/drawing/2014/main" val="1327067936"/>
                     </a:ext>
                   </a:extLst>
                 </a:gridCol>
                 <a:gridCol w="464546">
                   <a:extLst>
                     <a:ext uri="{9D8B030D-6E8A-4147-A177-3AD203B41FA5}">
-                      <a16:colId xmlns:a16="http://schemas.microsoft.com/office/drawing/2014/main" xmlns="" val="57842469"/>
+                      <a16:colId xmlns="" xmlns:a16="http://schemas.microsoft.com/office/drawing/2014/main" val="57842469"/>
                     </a:ext>
                   </a:extLst>
                 </a:gridCol>
                 <a:gridCol w="464546">
                   <a:extLst>
                     <a:ext uri="{9D8B030D-6E8A-4147-A177-3AD203B41FA5}">
-                      <a16:colId xmlns:a16="http://schemas.microsoft.com/office/drawing/2014/main" xmlns="" val="2526297131"/>
+                      <a16:colId xmlns="" xmlns:a16="http://schemas.microsoft.com/office/drawing/2014/main" val="2526297131"/>
                     </a:ext>
                   </a:extLst>
                 </a:gridCol>
                 <a:gridCol w="464546">
                   <a:extLst>
                     <a:ext uri="{9D8B030D-6E8A-4147-A177-3AD203B41FA5}">
-                      <a16:colId xmlns:a16="http://schemas.microsoft.com/office/drawing/2014/main" xmlns="" val="4184108719"/>
+                      <a16:colId xmlns="" xmlns:a16="http://schemas.microsoft.com/office/drawing/2014/main" val="4184108719"/>
                     </a:ext>
                   </a:extLst>
                 </a:gridCol>
                 <a:gridCol w="464546">
                   <a:extLst>
                     <a:ext uri="{9D8B030D-6E8A-4147-A177-3AD203B41FA5}">
-                      <a16:colId xmlns:a16="http://schemas.microsoft.com/office/drawing/2014/main" xmlns="" val="2493287182"/>
+                      <a16:colId xmlns="" xmlns:a16="http://schemas.microsoft.com/office/drawing/2014/main" val="2493287182"/>
                     </a:ext>
                   </a:extLst>
                 </a:gridCol>
                 <a:gridCol w="464546">
                   <a:extLst>
                     <a:ext uri="{9D8B030D-6E8A-4147-A177-3AD203B41FA5}">
-                      <a16:colId xmlns:a16="http://schemas.microsoft.com/office/drawing/2014/main" xmlns="" val="4018964974"/>
+                      <a16:colId xmlns="" xmlns:a16="http://schemas.microsoft.com/office/drawing/2014/main" val="4018964974"/>
                     </a:ext>
                   </a:extLst>
                 </a:gridCol>
                 <a:gridCol w="464546">
                   <a:extLst>
                     <a:ext uri="{9D8B030D-6E8A-4147-A177-3AD203B41FA5}">
-                      <a16:colId xmlns:a16="http://schemas.microsoft.com/office/drawing/2014/main" xmlns="" val="3303023726"/>
+                      <a16:colId xmlns="" xmlns:a16="http://schemas.microsoft.com/office/drawing/2014/main" val="3303023726"/>
                     </a:ext>
                   </a:extLst>
                 </a:gridCol>
                 <a:gridCol w="464546">
                   <a:extLst>
                     <a:ext uri="{9D8B030D-6E8A-4147-A177-3AD203B41FA5}">
-                      <a16:colId xmlns:a16="http://schemas.microsoft.com/office/drawing/2014/main" xmlns="" val="1047346888"/>
+                      <a16:colId xmlns="" xmlns:a16="http://schemas.microsoft.com/office/drawing/2014/main" val="1047346888"/>
                     </a:ext>
                   </a:extLst>
                 </a:gridCol>
                 <a:gridCol w="464546">
                   <a:extLst>
                     <a:ext uri="{9D8B030D-6E8A-4147-A177-3AD203B41FA5}">
-                      <a16:colId xmlns:a16="http://schemas.microsoft.com/office/drawing/2014/main" xmlns="" val="3175573251"/>
+                      <a16:colId xmlns="" xmlns:a16="http://schemas.microsoft.com/office/drawing/2014/main" val="3175573251"/>
                     </a:ext>
                   </a:extLst>
                 </a:gridCol>
                 <a:gridCol w="464546">
                   <a:extLst>
                     <a:ext uri="{9D8B030D-6E8A-4147-A177-3AD203B41FA5}">
-                      <a16:colId xmlns:a16="http://schemas.microsoft.com/office/drawing/2014/main" xmlns="" val="4176778861"/>
+                      <a16:colId xmlns="" xmlns:a16="http://schemas.microsoft.com/office/drawing/2014/main" val="4176778861"/>
                     </a:ext>
                   </a:extLst>
                 </a:gridCol>
                 <a:gridCol w="464546">
                   <a:extLst>
                     <a:ext uri="{9D8B030D-6E8A-4147-A177-3AD203B41FA5}">
-                      <a16:colId xmlns:a16="http://schemas.microsoft.com/office/drawing/2014/main" xmlns="" val="1113466877"/>
+                      <a16:colId xmlns="" xmlns:a16="http://schemas.microsoft.com/office/drawing/2014/main" val="1113466877"/>
                     </a:ext>
                   </a:extLst>
                 </a:gridCol>
                 <a:gridCol w="464546">
                   <a:extLst>
                     <a:ext uri="{9D8B030D-6E8A-4147-A177-3AD203B41FA5}">
-                      <a16:colId xmlns:a16="http://schemas.microsoft.com/office/drawing/2014/main" xmlns="" val="446932511"/>
+                      <a16:colId xmlns="" xmlns:a16="http://schemas.microsoft.com/office/drawing/2014/main" val="446932511"/>
                     </a:ext>
                   </a:extLst>
                 </a:gridCol>
                 <a:gridCol w="464546">
                   <a:extLst>
                     <a:ext uri="{9D8B030D-6E8A-4147-A177-3AD203B41FA5}">
-                      <a16:colId xmlns:a16="http://schemas.microsoft.com/office/drawing/2014/main" xmlns="" val="290695333"/>
+                      <a16:colId xmlns="" xmlns:a16="http://schemas.microsoft.com/office/drawing/2014/main" val="290695333"/>
                     </a:ext>
                   </a:extLst>
                 </a:gridCol>
@@ -9701,7 +9701,7 @@
                 </a:tc>
                 <a:extLst>
                   <a:ext uri="{0D108BD9-81ED-4DB2-BD59-A6C34878D82A}">
-                    <a16:rowId xmlns:a16="http://schemas.microsoft.com/office/drawing/2014/main" xmlns="" val="2941513846"/>
+                    <a16:rowId xmlns="" xmlns:a16="http://schemas.microsoft.com/office/drawing/2014/main" val="2941513846"/>
                   </a:ext>
                 </a:extLst>
               </a:tr>
@@ -9772,7 +9772,7 @@
           <p:cNvPr id="18" name="Table 17">
             <a:extLst>
               <a:ext uri="{FF2B5EF4-FFF2-40B4-BE49-F238E27FC236}">
-                <a16:creationId xmlns:a16="http://schemas.microsoft.com/office/drawing/2014/main" xmlns="" id="{2A780205-6AD3-4A25-9810-EC44FD0749F4}"/>
+                <a16:creationId xmlns="" xmlns:a16="http://schemas.microsoft.com/office/drawing/2014/main" id="{2A780205-6AD3-4A25-9810-EC44FD0749F4}"/>
               </a:ext>
             </a:extLst>
           </p:cNvPr>
@@ -9801,175 +9801,175 @@
                 <a:gridCol w="464546">
                   <a:extLst>
                     <a:ext uri="{9D8B030D-6E8A-4147-A177-3AD203B41FA5}">
-                      <a16:colId xmlns:a16="http://schemas.microsoft.com/office/drawing/2014/main" xmlns="" val="1019277772"/>
+                      <a16:colId xmlns="" xmlns:a16="http://schemas.microsoft.com/office/drawing/2014/main" val="1019277772"/>
                     </a:ext>
                   </a:extLst>
                 </a:gridCol>
                 <a:gridCol w="464546">
                   <a:extLst>
                     <a:ext uri="{9D8B030D-6E8A-4147-A177-3AD203B41FA5}">
-                      <a16:colId xmlns:a16="http://schemas.microsoft.com/office/drawing/2014/main" xmlns="" val="904070617"/>
+                      <a16:colId xmlns="" xmlns:a16="http://schemas.microsoft.com/office/drawing/2014/main" val="904070617"/>
                     </a:ext>
                   </a:extLst>
                 </a:gridCol>
                 <a:gridCol w="464546">
                   <a:extLst>
                     <a:ext uri="{9D8B030D-6E8A-4147-A177-3AD203B41FA5}">
-                      <a16:colId xmlns:a16="http://schemas.microsoft.com/office/drawing/2014/main" xmlns="" val="3450995975"/>
+                      <a16:colId xmlns="" xmlns:a16="http://schemas.microsoft.com/office/drawing/2014/main" val="3450995975"/>
                     </a:ext>
                   </a:extLst>
                 </a:gridCol>
                 <a:gridCol w="464546">
                   <a:extLst>
                     <a:ext uri="{9D8B030D-6E8A-4147-A177-3AD203B41FA5}">
-                      <a16:colId xmlns:a16="http://schemas.microsoft.com/office/drawing/2014/main" xmlns="" val="84178246"/>
+                      <a16:colId xmlns="" xmlns:a16="http://schemas.microsoft.com/office/drawing/2014/main" val="84178246"/>
                     </a:ext>
                   </a:extLst>
                 </a:gridCol>
                 <a:gridCol w="464546">
                   <a:extLst>
                     <a:ext uri="{9D8B030D-6E8A-4147-A177-3AD203B41FA5}">
-                      <a16:colId xmlns:a16="http://schemas.microsoft.com/office/drawing/2014/main" xmlns="" val="3444399563"/>
+                      <a16:colId xmlns="" xmlns:a16="http://schemas.microsoft.com/office/drawing/2014/main" val="3444399563"/>
                     </a:ext>
                   </a:extLst>
                 </a:gridCol>
                 <a:gridCol w="464546">
                   <a:extLst>
                     <a:ext uri="{9D8B030D-6E8A-4147-A177-3AD203B41FA5}">
-                      <a16:colId xmlns:a16="http://schemas.microsoft.com/office/drawing/2014/main" xmlns="" val="332534161"/>
+                      <a16:colId xmlns="" xmlns:a16="http://schemas.microsoft.com/office/drawing/2014/main" val="332534161"/>
                     </a:ext>
                   </a:extLst>
                 </a:gridCol>
                 <a:gridCol w="464546">
                   <a:extLst>
                     <a:ext uri="{9D8B030D-6E8A-4147-A177-3AD203B41FA5}">
-                      <a16:colId xmlns:a16="http://schemas.microsoft.com/office/drawing/2014/main" xmlns="" val="2290736699"/>
+                      <a16:colId xmlns="" xmlns:a16="http://schemas.microsoft.com/office/drawing/2014/main" val="2290736699"/>
                     </a:ext>
                   </a:extLst>
                 </a:gridCol>
                 <a:gridCol w="464546">
                   <a:extLst>
                     <a:ext uri="{9D8B030D-6E8A-4147-A177-3AD203B41FA5}">
-                      <a16:colId xmlns:a16="http://schemas.microsoft.com/office/drawing/2014/main" xmlns="" val="19451911"/>
+                      <a16:colId xmlns="" xmlns:a16="http://schemas.microsoft.com/office/drawing/2014/main" val="19451911"/>
                     </a:ext>
                   </a:extLst>
                 </a:gridCol>
                 <a:gridCol w="464546">
                   <a:extLst>
                     <a:ext uri="{9D8B030D-6E8A-4147-A177-3AD203B41FA5}">
-                      <a16:colId xmlns:a16="http://schemas.microsoft.com/office/drawing/2014/main" xmlns="" val="308529571"/>
+                      <a16:colId xmlns="" xmlns:a16="http://schemas.microsoft.com/office/drawing/2014/main" val="308529571"/>
                     </a:ext>
                   </a:extLst>
                 </a:gridCol>
                 <a:gridCol w="464546">
                   <a:extLst>
                     <a:ext uri="{9D8B030D-6E8A-4147-A177-3AD203B41FA5}">
-                      <a16:colId xmlns:a16="http://schemas.microsoft.com/office/drawing/2014/main" xmlns="" val="1626105078"/>
+                      <a16:colId xmlns="" xmlns:a16="http://schemas.microsoft.com/office/drawing/2014/main" val="1626105078"/>
                     </a:ext>
                   </a:extLst>
                 </a:gridCol>
                 <a:gridCol w="464546">
                   <a:extLst>
                     <a:ext uri="{9D8B030D-6E8A-4147-A177-3AD203B41FA5}">
-                      <a16:colId xmlns:a16="http://schemas.microsoft.com/office/drawing/2014/main" xmlns="" val="3796810149"/>
+                      <a16:colId xmlns="" xmlns:a16="http://schemas.microsoft.com/office/drawing/2014/main" val="3796810149"/>
                     </a:ext>
                   </a:extLst>
                 </a:gridCol>
                 <a:gridCol w="464546">
                   <a:extLst>
                     <a:ext uri="{9D8B030D-6E8A-4147-A177-3AD203B41FA5}">
-                      <a16:colId xmlns:a16="http://schemas.microsoft.com/office/drawing/2014/main" xmlns="" val="1772219669"/>
+                      <a16:colId xmlns="" xmlns:a16="http://schemas.microsoft.com/office/drawing/2014/main" val="1772219669"/>
                     </a:ext>
                   </a:extLst>
                 </a:gridCol>
                 <a:gridCol w="464546">
                   <a:extLst>
                     <a:ext uri="{9D8B030D-6E8A-4147-A177-3AD203B41FA5}">
-                      <a16:colId xmlns:a16="http://schemas.microsoft.com/office/drawing/2014/main" xmlns="" val="1327067936"/>
+                      <a16:colId xmlns="" xmlns:a16="http://schemas.microsoft.com/office/drawing/2014/main" val="1327067936"/>
                     </a:ext>
                   </a:extLst>
                 </a:gridCol>
                 <a:gridCol w="464546">
                   <a:extLst>
                     <a:ext uri="{9D8B030D-6E8A-4147-A177-3AD203B41FA5}">
-                      <a16:colId xmlns:a16="http://schemas.microsoft.com/office/drawing/2014/main" xmlns="" val="57842469"/>
+                      <a16:colId xmlns="" xmlns:a16="http://schemas.microsoft.com/office/drawing/2014/main" val="57842469"/>
                     </a:ext>
                   </a:extLst>
                 </a:gridCol>
                 <a:gridCol w="464546">
                   <a:extLst>
                     <a:ext uri="{9D8B030D-6E8A-4147-A177-3AD203B41FA5}">
-                      <a16:colId xmlns:a16="http://schemas.microsoft.com/office/drawing/2014/main" xmlns="" val="2526297131"/>
+                      <a16:colId xmlns="" xmlns:a16="http://schemas.microsoft.com/office/drawing/2014/main" val="2526297131"/>
                     </a:ext>
                   </a:extLst>
                 </a:gridCol>
                 <a:gridCol w="464546">
                   <a:extLst>
                     <a:ext uri="{9D8B030D-6E8A-4147-A177-3AD203B41FA5}">
-                      <a16:colId xmlns:a16="http://schemas.microsoft.com/office/drawing/2014/main" xmlns="" val="4184108719"/>
+                      <a16:colId xmlns="" xmlns:a16="http://schemas.microsoft.com/office/drawing/2014/main" val="4184108719"/>
                     </a:ext>
                   </a:extLst>
                 </a:gridCol>
                 <a:gridCol w="464546">
                   <a:extLst>
                     <a:ext uri="{9D8B030D-6E8A-4147-A177-3AD203B41FA5}">
-                      <a16:colId xmlns:a16="http://schemas.microsoft.com/office/drawing/2014/main" xmlns="" val="2493287182"/>
+                      <a16:colId xmlns="" xmlns:a16="http://schemas.microsoft.com/office/drawing/2014/main" val="2493287182"/>
                     </a:ext>
                   </a:extLst>
                 </a:gridCol>
                 <a:gridCol w="464546">
                   <a:extLst>
                     <a:ext uri="{9D8B030D-6E8A-4147-A177-3AD203B41FA5}">
-                      <a16:colId xmlns:a16="http://schemas.microsoft.com/office/drawing/2014/main" xmlns="" val="4018964974"/>
+                      <a16:colId xmlns="" xmlns:a16="http://schemas.microsoft.com/office/drawing/2014/main" val="4018964974"/>
                     </a:ext>
                   </a:extLst>
                 </a:gridCol>
                 <a:gridCol w="464546">
                   <a:extLst>
                     <a:ext uri="{9D8B030D-6E8A-4147-A177-3AD203B41FA5}">
-                      <a16:colId xmlns:a16="http://schemas.microsoft.com/office/drawing/2014/main" xmlns="" val="3303023726"/>
+                      <a16:colId xmlns="" xmlns:a16="http://schemas.microsoft.com/office/drawing/2014/main" val="3303023726"/>
                     </a:ext>
                   </a:extLst>
                 </a:gridCol>
                 <a:gridCol w="464546">
                   <a:extLst>
                     <a:ext uri="{9D8B030D-6E8A-4147-A177-3AD203B41FA5}">
-                      <a16:colId xmlns:a16="http://schemas.microsoft.com/office/drawing/2014/main" xmlns="" val="1047346888"/>
+                      <a16:colId xmlns="" xmlns:a16="http://schemas.microsoft.com/office/drawing/2014/main" val="1047346888"/>
                     </a:ext>
                   </a:extLst>
                 </a:gridCol>
                 <a:gridCol w="464546">
                   <a:extLst>
                     <a:ext uri="{9D8B030D-6E8A-4147-A177-3AD203B41FA5}">
-                      <a16:colId xmlns:a16="http://schemas.microsoft.com/office/drawing/2014/main" xmlns="" val="3175573251"/>
+                      <a16:colId xmlns="" xmlns:a16="http://schemas.microsoft.com/office/drawing/2014/main" val="3175573251"/>
                     </a:ext>
                   </a:extLst>
                 </a:gridCol>
                 <a:gridCol w="464546">
                   <a:extLst>
                     <a:ext uri="{9D8B030D-6E8A-4147-A177-3AD203B41FA5}">
-                      <a16:colId xmlns:a16="http://schemas.microsoft.com/office/drawing/2014/main" xmlns="" val="4176778861"/>
+                      <a16:colId xmlns="" xmlns:a16="http://schemas.microsoft.com/office/drawing/2014/main" val="4176778861"/>
                     </a:ext>
                   </a:extLst>
                 </a:gridCol>
                 <a:gridCol w="464546">
                   <a:extLst>
                     <a:ext uri="{9D8B030D-6E8A-4147-A177-3AD203B41FA5}">
-                      <a16:colId xmlns:a16="http://schemas.microsoft.com/office/drawing/2014/main" xmlns="" val="1113466877"/>
+                      <a16:colId xmlns="" xmlns:a16="http://schemas.microsoft.com/office/drawing/2014/main" val="1113466877"/>
                     </a:ext>
                   </a:extLst>
                 </a:gridCol>
                 <a:gridCol w="464546">
                   <a:extLst>
                     <a:ext uri="{9D8B030D-6E8A-4147-A177-3AD203B41FA5}">
-                      <a16:colId xmlns:a16="http://schemas.microsoft.com/office/drawing/2014/main" xmlns="" val="446932511"/>
+                      <a16:colId xmlns="" xmlns:a16="http://schemas.microsoft.com/office/drawing/2014/main" val="446932511"/>
                     </a:ext>
                   </a:extLst>
                 </a:gridCol>
                 <a:gridCol w="464546">
                   <a:extLst>
                     <a:ext uri="{9D8B030D-6E8A-4147-A177-3AD203B41FA5}">
-                      <a16:colId xmlns:a16="http://schemas.microsoft.com/office/drawing/2014/main" xmlns="" val="290695333"/>
+                      <a16:colId xmlns="" xmlns:a16="http://schemas.microsoft.com/office/drawing/2014/main" val="290695333"/>
                     </a:ext>
                   </a:extLst>
                 </a:gridCol>
@@ -10448,7 +10448,7 @@
                 </a:tc>
                 <a:extLst>
                   <a:ext uri="{0D108BD9-81ED-4DB2-BD59-A6C34878D82A}">
-                    <a16:rowId xmlns:a16="http://schemas.microsoft.com/office/drawing/2014/main" xmlns="" val="2941513846"/>
+                    <a16:rowId xmlns="" xmlns:a16="http://schemas.microsoft.com/office/drawing/2014/main" val="2941513846"/>
                   </a:ext>
                 </a:extLst>
               </a:tr>
@@ -10461,7 +10461,7 @@
           <p:cNvPr id="19" name="Picture 18">
             <a:extLst>
               <a:ext uri="{FF2B5EF4-FFF2-40B4-BE49-F238E27FC236}">
-                <a16:creationId xmlns:a16="http://schemas.microsoft.com/office/drawing/2014/main" xmlns="" id="{590133A9-43B3-4ACA-8B6A-AC7C02124269}"/>
+                <a16:creationId xmlns="" xmlns:a16="http://schemas.microsoft.com/office/drawing/2014/main" id="{590133A9-43B3-4ACA-8B6A-AC7C02124269}"/>
               </a:ext>
             </a:extLst>
           </p:cNvPr>
@@ -11816,7 +11816,7 @@
           <p:cNvPr id="70" name="Picture 69">
             <a:extLst>
               <a:ext uri="{FF2B5EF4-FFF2-40B4-BE49-F238E27FC236}">
-                <a16:creationId xmlns:a16="http://schemas.microsoft.com/office/drawing/2014/main" xmlns="" id="{590133A9-43B3-4ACA-8B6A-AC7C02124269}"/>
+                <a16:creationId xmlns="" xmlns:a16="http://schemas.microsoft.com/office/drawing/2014/main" id="{590133A9-43B3-4ACA-8B6A-AC7C02124269}"/>
               </a:ext>
             </a:extLst>
           </p:cNvPr>
@@ -12439,7 +12439,7 @@
           <p:cNvPr id="83" name="Picture 82">
             <a:extLst>
               <a:ext uri="{FF2B5EF4-FFF2-40B4-BE49-F238E27FC236}">
-                <a16:creationId xmlns:a16="http://schemas.microsoft.com/office/drawing/2014/main" xmlns="" id="{590133A9-43B3-4ACA-8B6A-AC7C02124269}"/>
+                <a16:creationId xmlns="" xmlns:a16="http://schemas.microsoft.com/office/drawing/2014/main" id="{590133A9-43B3-4ACA-8B6A-AC7C02124269}"/>
               </a:ext>
             </a:extLst>
           </p:cNvPr>
@@ -12499,7 +12499,7 @@
           <p:cNvPr id="85" name="Picture 84">
             <a:extLst>
               <a:ext uri="{FF2B5EF4-FFF2-40B4-BE49-F238E27FC236}">
-                <a16:creationId xmlns:a16="http://schemas.microsoft.com/office/drawing/2014/main" xmlns="" id="{590133A9-43B3-4ACA-8B6A-AC7C02124269}"/>
+                <a16:creationId xmlns="" xmlns:a16="http://schemas.microsoft.com/office/drawing/2014/main" id="{590133A9-43B3-4ACA-8B6A-AC7C02124269}"/>
               </a:ext>
             </a:extLst>
           </p:cNvPr>
@@ -12559,7 +12559,7 @@
           <p:cNvPr id="87" name="Picture 86">
             <a:extLst>
               <a:ext uri="{FF2B5EF4-FFF2-40B4-BE49-F238E27FC236}">
-                <a16:creationId xmlns:a16="http://schemas.microsoft.com/office/drawing/2014/main" xmlns="" id="{590133A9-43B3-4ACA-8B6A-AC7C02124269}"/>
+                <a16:creationId xmlns="" xmlns:a16="http://schemas.microsoft.com/office/drawing/2014/main" id="{590133A9-43B3-4ACA-8B6A-AC7C02124269}"/>
               </a:ext>
             </a:extLst>
           </p:cNvPr>
@@ -12702,7 +12702,8 @@
             <a:avLst/>
           </a:prstGeom>
           <a:ln>
-            <a:tailEnd type="triangle"/>
+            <a:headEnd type="triangle"/>
+            <a:tailEnd type="none"/>
           </a:ln>
         </p:spPr>
         <p:style>
@@ -12738,7 +12739,8 @@
             <a:avLst/>
           </a:prstGeom>
           <a:ln>
-            <a:tailEnd type="triangle"/>
+            <a:headEnd type="triangle"/>
+            <a:tailEnd type="none"/>
           </a:ln>
         </p:spPr>
         <p:style>

</xml_diff>

<commit_message>
Changed names from Masternode to Hypernode
</commit_message>
<xml_diff>
--- a/doc/bis-pos-doc.pptx
+++ b/doc/bis-pos-doc.pptx
@@ -137,7 +137,7 @@
           <p:cNvPr id="2" name="Title 1">
             <a:extLst>
               <a:ext uri="{FF2B5EF4-FFF2-40B4-BE49-F238E27FC236}">
-                <a16:creationId xmlns:a16="http://schemas.microsoft.com/office/drawing/2014/main" xmlns="" id="{F96EF631-5FC2-446F-BE90-CF17B4E7EF90}"/>
+                <a16:creationId xmlns:a16="http://schemas.microsoft.com/office/drawing/2014/main" id="{F96EF631-5FC2-446F-BE90-CF17B4E7EF90}"/>
               </a:ext>
             </a:extLst>
           </p:cNvPr>
@@ -175,7 +175,7 @@
           <p:cNvPr id="3" name="Subtitle 2">
             <a:extLst>
               <a:ext uri="{FF2B5EF4-FFF2-40B4-BE49-F238E27FC236}">
-                <a16:creationId xmlns:a16="http://schemas.microsoft.com/office/drawing/2014/main" xmlns="" id="{479C8FE8-DEBA-476B-ADEC-36320E590D6C}"/>
+                <a16:creationId xmlns:a16="http://schemas.microsoft.com/office/drawing/2014/main" id="{479C8FE8-DEBA-476B-ADEC-36320E590D6C}"/>
               </a:ext>
             </a:extLst>
           </p:cNvPr>
@@ -246,7 +246,7 @@
           <p:cNvPr id="4" name="Date Placeholder 3">
             <a:extLst>
               <a:ext uri="{FF2B5EF4-FFF2-40B4-BE49-F238E27FC236}">
-                <a16:creationId xmlns:a16="http://schemas.microsoft.com/office/drawing/2014/main" xmlns="" id="{F2DE9071-8F45-4F53-87A7-A06569C3C0D7}"/>
+                <a16:creationId xmlns:a16="http://schemas.microsoft.com/office/drawing/2014/main" id="{F2DE9071-8F45-4F53-87A7-A06569C3C0D7}"/>
               </a:ext>
             </a:extLst>
           </p:cNvPr>
@@ -264,7 +264,7 @@
           <a:p>
             <a:fld id="{7F738CB0-C1DE-441C-8594-7FD4DA415420}" type="datetimeFigureOut">
               <a:rPr lang="nb-NO" smtClean="0"/>
-              <a:t>25.07.2018</a:t>
+              <a:t>02.03.2020</a:t>
             </a:fld>
             <a:endParaRPr lang="nb-NO"/>
           </a:p>
@@ -275,7 +275,7 @@
           <p:cNvPr id="5" name="Footer Placeholder 4">
             <a:extLst>
               <a:ext uri="{FF2B5EF4-FFF2-40B4-BE49-F238E27FC236}">
-                <a16:creationId xmlns:a16="http://schemas.microsoft.com/office/drawing/2014/main" xmlns="" id="{37CBE4B5-A934-4654-B959-418DB35CBF92}"/>
+                <a16:creationId xmlns:a16="http://schemas.microsoft.com/office/drawing/2014/main" id="{37CBE4B5-A934-4654-B959-418DB35CBF92}"/>
               </a:ext>
             </a:extLst>
           </p:cNvPr>
@@ -300,7 +300,7 @@
           <p:cNvPr id="6" name="Slide Number Placeholder 5">
             <a:extLst>
               <a:ext uri="{FF2B5EF4-FFF2-40B4-BE49-F238E27FC236}">
-                <a16:creationId xmlns:a16="http://schemas.microsoft.com/office/drawing/2014/main" xmlns="" id="{A172DFD6-3B4D-4455-BC69-B757EA3CF6AB}"/>
+                <a16:creationId xmlns:a16="http://schemas.microsoft.com/office/drawing/2014/main" id="{A172DFD6-3B4D-4455-BC69-B757EA3CF6AB}"/>
               </a:ext>
             </a:extLst>
           </p:cNvPr>
@@ -359,7 +359,7 @@
           <p:cNvPr id="2" name="Title 1">
             <a:extLst>
               <a:ext uri="{FF2B5EF4-FFF2-40B4-BE49-F238E27FC236}">
-                <a16:creationId xmlns:a16="http://schemas.microsoft.com/office/drawing/2014/main" xmlns="" id="{B5315822-FAC5-4FA8-A21D-4E83D2918F05}"/>
+                <a16:creationId xmlns:a16="http://schemas.microsoft.com/office/drawing/2014/main" id="{B5315822-FAC5-4FA8-A21D-4E83D2918F05}"/>
               </a:ext>
             </a:extLst>
           </p:cNvPr>
@@ -388,7 +388,7 @@
           <p:cNvPr id="3" name="Vertical Text Placeholder 2">
             <a:extLst>
               <a:ext uri="{FF2B5EF4-FFF2-40B4-BE49-F238E27FC236}">
-                <a16:creationId xmlns:a16="http://schemas.microsoft.com/office/drawing/2014/main" xmlns="" id="{9BA9137D-96DD-4AD2-985F-CFE8016F8381}"/>
+                <a16:creationId xmlns:a16="http://schemas.microsoft.com/office/drawing/2014/main" id="{9BA9137D-96DD-4AD2-985F-CFE8016F8381}"/>
               </a:ext>
             </a:extLst>
           </p:cNvPr>
@@ -446,7 +446,7 @@
           <p:cNvPr id="4" name="Date Placeholder 3">
             <a:extLst>
               <a:ext uri="{FF2B5EF4-FFF2-40B4-BE49-F238E27FC236}">
-                <a16:creationId xmlns:a16="http://schemas.microsoft.com/office/drawing/2014/main" xmlns="" id="{DC412755-E11C-4D28-9081-0818F5963D19}"/>
+                <a16:creationId xmlns:a16="http://schemas.microsoft.com/office/drawing/2014/main" id="{DC412755-E11C-4D28-9081-0818F5963D19}"/>
               </a:ext>
             </a:extLst>
           </p:cNvPr>
@@ -464,7 +464,7 @@
           <a:p>
             <a:fld id="{7F738CB0-C1DE-441C-8594-7FD4DA415420}" type="datetimeFigureOut">
               <a:rPr lang="nb-NO" smtClean="0"/>
-              <a:t>25.07.2018</a:t>
+              <a:t>02.03.2020</a:t>
             </a:fld>
             <a:endParaRPr lang="nb-NO"/>
           </a:p>
@@ -475,7 +475,7 @@
           <p:cNvPr id="5" name="Footer Placeholder 4">
             <a:extLst>
               <a:ext uri="{FF2B5EF4-FFF2-40B4-BE49-F238E27FC236}">
-                <a16:creationId xmlns:a16="http://schemas.microsoft.com/office/drawing/2014/main" xmlns="" id="{E3649C68-839A-45C3-890A-4C6ACB163B29}"/>
+                <a16:creationId xmlns:a16="http://schemas.microsoft.com/office/drawing/2014/main" id="{E3649C68-839A-45C3-890A-4C6ACB163B29}"/>
               </a:ext>
             </a:extLst>
           </p:cNvPr>
@@ -500,7 +500,7 @@
           <p:cNvPr id="6" name="Slide Number Placeholder 5">
             <a:extLst>
               <a:ext uri="{FF2B5EF4-FFF2-40B4-BE49-F238E27FC236}">
-                <a16:creationId xmlns:a16="http://schemas.microsoft.com/office/drawing/2014/main" xmlns="" id="{EC65B7EA-3D51-4934-A76A-2F29B0CF38EC}"/>
+                <a16:creationId xmlns:a16="http://schemas.microsoft.com/office/drawing/2014/main" id="{EC65B7EA-3D51-4934-A76A-2F29B0CF38EC}"/>
               </a:ext>
             </a:extLst>
           </p:cNvPr>
@@ -559,7 +559,7 @@
           <p:cNvPr id="2" name="Vertical Title 1">
             <a:extLst>
               <a:ext uri="{FF2B5EF4-FFF2-40B4-BE49-F238E27FC236}">
-                <a16:creationId xmlns:a16="http://schemas.microsoft.com/office/drawing/2014/main" xmlns="" id="{32E08DE2-C36A-40C9-907E-BB4751B16684}"/>
+                <a16:creationId xmlns:a16="http://schemas.microsoft.com/office/drawing/2014/main" id="{32E08DE2-C36A-40C9-907E-BB4751B16684}"/>
               </a:ext>
             </a:extLst>
           </p:cNvPr>
@@ -593,7 +593,7 @@
           <p:cNvPr id="3" name="Vertical Text Placeholder 2">
             <a:extLst>
               <a:ext uri="{FF2B5EF4-FFF2-40B4-BE49-F238E27FC236}">
-                <a16:creationId xmlns:a16="http://schemas.microsoft.com/office/drawing/2014/main" xmlns="" id="{CD8DB52F-B200-4F9D-BC5D-A23A63588606}"/>
+                <a16:creationId xmlns:a16="http://schemas.microsoft.com/office/drawing/2014/main" id="{CD8DB52F-B200-4F9D-BC5D-A23A63588606}"/>
               </a:ext>
             </a:extLst>
           </p:cNvPr>
@@ -656,7 +656,7 @@
           <p:cNvPr id="4" name="Date Placeholder 3">
             <a:extLst>
               <a:ext uri="{FF2B5EF4-FFF2-40B4-BE49-F238E27FC236}">
-                <a16:creationId xmlns:a16="http://schemas.microsoft.com/office/drawing/2014/main" xmlns="" id="{259B81F9-0EF6-403E-9A18-3FD3968D7668}"/>
+                <a16:creationId xmlns:a16="http://schemas.microsoft.com/office/drawing/2014/main" id="{259B81F9-0EF6-403E-9A18-3FD3968D7668}"/>
               </a:ext>
             </a:extLst>
           </p:cNvPr>
@@ -674,7 +674,7 @@
           <a:p>
             <a:fld id="{7F738CB0-C1DE-441C-8594-7FD4DA415420}" type="datetimeFigureOut">
               <a:rPr lang="nb-NO" smtClean="0"/>
-              <a:t>25.07.2018</a:t>
+              <a:t>02.03.2020</a:t>
             </a:fld>
             <a:endParaRPr lang="nb-NO"/>
           </a:p>
@@ -685,7 +685,7 @@
           <p:cNvPr id="5" name="Footer Placeholder 4">
             <a:extLst>
               <a:ext uri="{FF2B5EF4-FFF2-40B4-BE49-F238E27FC236}">
-                <a16:creationId xmlns:a16="http://schemas.microsoft.com/office/drawing/2014/main" xmlns="" id="{377314DB-723A-4330-A9D9-BE387BC3475C}"/>
+                <a16:creationId xmlns:a16="http://schemas.microsoft.com/office/drawing/2014/main" id="{377314DB-723A-4330-A9D9-BE387BC3475C}"/>
               </a:ext>
             </a:extLst>
           </p:cNvPr>
@@ -710,7 +710,7 @@
           <p:cNvPr id="6" name="Slide Number Placeholder 5">
             <a:extLst>
               <a:ext uri="{FF2B5EF4-FFF2-40B4-BE49-F238E27FC236}">
-                <a16:creationId xmlns:a16="http://schemas.microsoft.com/office/drawing/2014/main" xmlns="" id="{A34D8764-9A7D-44A2-92AB-0E1F170AB97F}"/>
+                <a16:creationId xmlns:a16="http://schemas.microsoft.com/office/drawing/2014/main" id="{A34D8764-9A7D-44A2-92AB-0E1F170AB97F}"/>
               </a:ext>
             </a:extLst>
           </p:cNvPr>
@@ -769,7 +769,7 @@
           <p:cNvPr id="2" name="Title 1">
             <a:extLst>
               <a:ext uri="{FF2B5EF4-FFF2-40B4-BE49-F238E27FC236}">
-                <a16:creationId xmlns:a16="http://schemas.microsoft.com/office/drawing/2014/main" xmlns="" id="{5B4EF6A2-11AB-4F8C-9BA3-874743343987}"/>
+                <a16:creationId xmlns:a16="http://schemas.microsoft.com/office/drawing/2014/main" id="{5B4EF6A2-11AB-4F8C-9BA3-874743343987}"/>
               </a:ext>
             </a:extLst>
           </p:cNvPr>
@@ -798,7 +798,7 @@
           <p:cNvPr id="3" name="Content Placeholder 2">
             <a:extLst>
               <a:ext uri="{FF2B5EF4-FFF2-40B4-BE49-F238E27FC236}">
-                <a16:creationId xmlns:a16="http://schemas.microsoft.com/office/drawing/2014/main" xmlns="" id="{24C842A2-1295-44A4-99AB-D6D2960ECD53}"/>
+                <a16:creationId xmlns:a16="http://schemas.microsoft.com/office/drawing/2014/main" id="{24C842A2-1295-44A4-99AB-D6D2960ECD53}"/>
               </a:ext>
             </a:extLst>
           </p:cNvPr>
@@ -856,7 +856,7 @@
           <p:cNvPr id="4" name="Date Placeholder 3">
             <a:extLst>
               <a:ext uri="{FF2B5EF4-FFF2-40B4-BE49-F238E27FC236}">
-                <a16:creationId xmlns:a16="http://schemas.microsoft.com/office/drawing/2014/main" xmlns="" id="{2E2A235E-B90D-4872-8D07-C3419BB513CF}"/>
+                <a16:creationId xmlns:a16="http://schemas.microsoft.com/office/drawing/2014/main" id="{2E2A235E-B90D-4872-8D07-C3419BB513CF}"/>
               </a:ext>
             </a:extLst>
           </p:cNvPr>
@@ -874,7 +874,7 @@
           <a:p>
             <a:fld id="{7F738CB0-C1DE-441C-8594-7FD4DA415420}" type="datetimeFigureOut">
               <a:rPr lang="nb-NO" smtClean="0"/>
-              <a:t>25.07.2018</a:t>
+              <a:t>02.03.2020</a:t>
             </a:fld>
             <a:endParaRPr lang="nb-NO"/>
           </a:p>
@@ -885,7 +885,7 @@
           <p:cNvPr id="5" name="Footer Placeholder 4">
             <a:extLst>
               <a:ext uri="{FF2B5EF4-FFF2-40B4-BE49-F238E27FC236}">
-                <a16:creationId xmlns:a16="http://schemas.microsoft.com/office/drawing/2014/main" xmlns="" id="{8FBEE775-7158-4490-8482-B6DE40972C4C}"/>
+                <a16:creationId xmlns:a16="http://schemas.microsoft.com/office/drawing/2014/main" id="{8FBEE775-7158-4490-8482-B6DE40972C4C}"/>
               </a:ext>
             </a:extLst>
           </p:cNvPr>
@@ -910,7 +910,7 @@
           <p:cNvPr id="6" name="Slide Number Placeholder 5">
             <a:extLst>
               <a:ext uri="{FF2B5EF4-FFF2-40B4-BE49-F238E27FC236}">
-                <a16:creationId xmlns:a16="http://schemas.microsoft.com/office/drawing/2014/main" xmlns="" id="{8F4FA970-B798-47DD-9FB4-72F0793FAF55}"/>
+                <a16:creationId xmlns:a16="http://schemas.microsoft.com/office/drawing/2014/main" id="{8F4FA970-B798-47DD-9FB4-72F0793FAF55}"/>
               </a:ext>
             </a:extLst>
           </p:cNvPr>
@@ -969,7 +969,7 @@
           <p:cNvPr id="2" name="Title 1">
             <a:extLst>
               <a:ext uri="{FF2B5EF4-FFF2-40B4-BE49-F238E27FC236}">
-                <a16:creationId xmlns:a16="http://schemas.microsoft.com/office/drawing/2014/main" xmlns="" id="{DDD1BDE8-6175-4AE7-81D7-4BB377D5E311}"/>
+                <a16:creationId xmlns:a16="http://schemas.microsoft.com/office/drawing/2014/main" id="{DDD1BDE8-6175-4AE7-81D7-4BB377D5E311}"/>
               </a:ext>
             </a:extLst>
           </p:cNvPr>
@@ -1007,7 +1007,7 @@
           <p:cNvPr id="3" name="Text Placeholder 2">
             <a:extLst>
               <a:ext uri="{FF2B5EF4-FFF2-40B4-BE49-F238E27FC236}">
-                <a16:creationId xmlns:a16="http://schemas.microsoft.com/office/drawing/2014/main" xmlns="" id="{0AF360CD-96A3-4069-A867-1F0E51BC9FB5}"/>
+                <a16:creationId xmlns:a16="http://schemas.microsoft.com/office/drawing/2014/main" id="{0AF360CD-96A3-4069-A867-1F0E51BC9FB5}"/>
               </a:ext>
             </a:extLst>
           </p:cNvPr>
@@ -1132,7 +1132,7 @@
           <p:cNvPr id="4" name="Date Placeholder 3">
             <a:extLst>
               <a:ext uri="{FF2B5EF4-FFF2-40B4-BE49-F238E27FC236}">
-                <a16:creationId xmlns:a16="http://schemas.microsoft.com/office/drawing/2014/main" xmlns="" id="{2015F0DF-9ED1-429C-B60C-D26E1F8E1520}"/>
+                <a16:creationId xmlns:a16="http://schemas.microsoft.com/office/drawing/2014/main" id="{2015F0DF-9ED1-429C-B60C-D26E1F8E1520}"/>
               </a:ext>
             </a:extLst>
           </p:cNvPr>
@@ -1150,7 +1150,7 @@
           <a:p>
             <a:fld id="{7F738CB0-C1DE-441C-8594-7FD4DA415420}" type="datetimeFigureOut">
               <a:rPr lang="nb-NO" smtClean="0"/>
-              <a:t>25.07.2018</a:t>
+              <a:t>02.03.2020</a:t>
             </a:fld>
             <a:endParaRPr lang="nb-NO"/>
           </a:p>
@@ -1161,7 +1161,7 @@
           <p:cNvPr id="5" name="Footer Placeholder 4">
             <a:extLst>
               <a:ext uri="{FF2B5EF4-FFF2-40B4-BE49-F238E27FC236}">
-                <a16:creationId xmlns:a16="http://schemas.microsoft.com/office/drawing/2014/main" xmlns="" id="{9E1A6DA4-F267-4CC1-B67D-7844BD294EFC}"/>
+                <a16:creationId xmlns:a16="http://schemas.microsoft.com/office/drawing/2014/main" id="{9E1A6DA4-F267-4CC1-B67D-7844BD294EFC}"/>
               </a:ext>
             </a:extLst>
           </p:cNvPr>
@@ -1186,7 +1186,7 @@
           <p:cNvPr id="6" name="Slide Number Placeholder 5">
             <a:extLst>
               <a:ext uri="{FF2B5EF4-FFF2-40B4-BE49-F238E27FC236}">
-                <a16:creationId xmlns:a16="http://schemas.microsoft.com/office/drawing/2014/main" xmlns="" id="{88A09BEC-65DC-42D9-AF9B-BE7C3A6CBA0F}"/>
+                <a16:creationId xmlns:a16="http://schemas.microsoft.com/office/drawing/2014/main" id="{88A09BEC-65DC-42D9-AF9B-BE7C3A6CBA0F}"/>
               </a:ext>
             </a:extLst>
           </p:cNvPr>
@@ -1245,7 +1245,7 @@
           <p:cNvPr id="2" name="Title 1">
             <a:extLst>
               <a:ext uri="{FF2B5EF4-FFF2-40B4-BE49-F238E27FC236}">
-                <a16:creationId xmlns:a16="http://schemas.microsoft.com/office/drawing/2014/main" xmlns="" id="{5BA3F379-AFF9-4C15-A0CD-4AD800814F20}"/>
+                <a16:creationId xmlns:a16="http://schemas.microsoft.com/office/drawing/2014/main" id="{5BA3F379-AFF9-4C15-A0CD-4AD800814F20}"/>
               </a:ext>
             </a:extLst>
           </p:cNvPr>
@@ -1274,7 +1274,7 @@
           <p:cNvPr id="3" name="Content Placeholder 2">
             <a:extLst>
               <a:ext uri="{FF2B5EF4-FFF2-40B4-BE49-F238E27FC236}">
-                <a16:creationId xmlns:a16="http://schemas.microsoft.com/office/drawing/2014/main" xmlns="" id="{0851FEA9-59CA-4320-AE48-87DE6EFF15F4}"/>
+                <a16:creationId xmlns:a16="http://schemas.microsoft.com/office/drawing/2014/main" id="{0851FEA9-59CA-4320-AE48-87DE6EFF15F4}"/>
               </a:ext>
             </a:extLst>
           </p:cNvPr>
@@ -1337,7 +1337,7 @@
           <p:cNvPr id="4" name="Content Placeholder 3">
             <a:extLst>
               <a:ext uri="{FF2B5EF4-FFF2-40B4-BE49-F238E27FC236}">
-                <a16:creationId xmlns:a16="http://schemas.microsoft.com/office/drawing/2014/main" xmlns="" id="{EBC4153E-11C3-471C-8A2D-4EB1E5DF1102}"/>
+                <a16:creationId xmlns:a16="http://schemas.microsoft.com/office/drawing/2014/main" id="{EBC4153E-11C3-471C-8A2D-4EB1E5DF1102}"/>
               </a:ext>
             </a:extLst>
           </p:cNvPr>
@@ -1400,7 +1400,7 @@
           <p:cNvPr id="5" name="Date Placeholder 4">
             <a:extLst>
               <a:ext uri="{FF2B5EF4-FFF2-40B4-BE49-F238E27FC236}">
-                <a16:creationId xmlns:a16="http://schemas.microsoft.com/office/drawing/2014/main" xmlns="" id="{71FA7135-5DC8-4245-9C9B-1C65B4160F3E}"/>
+                <a16:creationId xmlns:a16="http://schemas.microsoft.com/office/drawing/2014/main" id="{71FA7135-5DC8-4245-9C9B-1C65B4160F3E}"/>
               </a:ext>
             </a:extLst>
           </p:cNvPr>
@@ -1418,7 +1418,7 @@
           <a:p>
             <a:fld id="{7F738CB0-C1DE-441C-8594-7FD4DA415420}" type="datetimeFigureOut">
               <a:rPr lang="nb-NO" smtClean="0"/>
-              <a:t>25.07.2018</a:t>
+              <a:t>02.03.2020</a:t>
             </a:fld>
             <a:endParaRPr lang="nb-NO"/>
           </a:p>
@@ -1429,7 +1429,7 @@
           <p:cNvPr id="6" name="Footer Placeholder 5">
             <a:extLst>
               <a:ext uri="{FF2B5EF4-FFF2-40B4-BE49-F238E27FC236}">
-                <a16:creationId xmlns:a16="http://schemas.microsoft.com/office/drawing/2014/main" xmlns="" id="{68C521B6-267D-4036-A4A3-98CE554F9588}"/>
+                <a16:creationId xmlns:a16="http://schemas.microsoft.com/office/drawing/2014/main" id="{68C521B6-267D-4036-A4A3-98CE554F9588}"/>
               </a:ext>
             </a:extLst>
           </p:cNvPr>
@@ -1454,7 +1454,7 @@
           <p:cNvPr id="7" name="Slide Number Placeholder 6">
             <a:extLst>
               <a:ext uri="{FF2B5EF4-FFF2-40B4-BE49-F238E27FC236}">
-                <a16:creationId xmlns:a16="http://schemas.microsoft.com/office/drawing/2014/main" xmlns="" id="{C4EB498D-29FC-4950-86CE-F95CB26CD9C7}"/>
+                <a16:creationId xmlns:a16="http://schemas.microsoft.com/office/drawing/2014/main" id="{C4EB498D-29FC-4950-86CE-F95CB26CD9C7}"/>
               </a:ext>
             </a:extLst>
           </p:cNvPr>
@@ -1513,7 +1513,7 @@
           <p:cNvPr id="2" name="Title 1">
             <a:extLst>
               <a:ext uri="{FF2B5EF4-FFF2-40B4-BE49-F238E27FC236}">
-                <a16:creationId xmlns:a16="http://schemas.microsoft.com/office/drawing/2014/main" xmlns="" id="{1FF5669B-B5BA-4467-B073-E737E9A7CF0A}"/>
+                <a16:creationId xmlns:a16="http://schemas.microsoft.com/office/drawing/2014/main" id="{1FF5669B-B5BA-4467-B073-E737E9A7CF0A}"/>
               </a:ext>
             </a:extLst>
           </p:cNvPr>
@@ -1547,7 +1547,7 @@
           <p:cNvPr id="3" name="Text Placeholder 2">
             <a:extLst>
               <a:ext uri="{FF2B5EF4-FFF2-40B4-BE49-F238E27FC236}">
-                <a16:creationId xmlns:a16="http://schemas.microsoft.com/office/drawing/2014/main" xmlns="" id="{F4751580-ACA5-4D3D-886D-B8CD5EEB913C}"/>
+                <a16:creationId xmlns:a16="http://schemas.microsoft.com/office/drawing/2014/main" id="{F4751580-ACA5-4D3D-886D-B8CD5EEB913C}"/>
               </a:ext>
             </a:extLst>
           </p:cNvPr>
@@ -1618,7 +1618,7 @@
           <p:cNvPr id="4" name="Content Placeholder 3">
             <a:extLst>
               <a:ext uri="{FF2B5EF4-FFF2-40B4-BE49-F238E27FC236}">
-                <a16:creationId xmlns:a16="http://schemas.microsoft.com/office/drawing/2014/main" xmlns="" id="{D9B9EF48-50DF-4E47-8FE2-6BA119AACEF5}"/>
+                <a16:creationId xmlns:a16="http://schemas.microsoft.com/office/drawing/2014/main" id="{D9B9EF48-50DF-4E47-8FE2-6BA119AACEF5}"/>
               </a:ext>
             </a:extLst>
           </p:cNvPr>
@@ -1681,7 +1681,7 @@
           <p:cNvPr id="5" name="Text Placeholder 4">
             <a:extLst>
               <a:ext uri="{FF2B5EF4-FFF2-40B4-BE49-F238E27FC236}">
-                <a16:creationId xmlns:a16="http://schemas.microsoft.com/office/drawing/2014/main" xmlns="" id="{2E77F2AE-6CC6-4E3E-A1A7-2DB462E2493B}"/>
+                <a16:creationId xmlns:a16="http://schemas.microsoft.com/office/drawing/2014/main" id="{2E77F2AE-6CC6-4E3E-A1A7-2DB462E2493B}"/>
               </a:ext>
             </a:extLst>
           </p:cNvPr>
@@ -1752,7 +1752,7 @@
           <p:cNvPr id="6" name="Content Placeholder 5">
             <a:extLst>
               <a:ext uri="{FF2B5EF4-FFF2-40B4-BE49-F238E27FC236}">
-                <a16:creationId xmlns:a16="http://schemas.microsoft.com/office/drawing/2014/main" xmlns="" id="{0045D2A2-37AC-4356-9266-4621B4D36FDD}"/>
+                <a16:creationId xmlns:a16="http://schemas.microsoft.com/office/drawing/2014/main" id="{0045D2A2-37AC-4356-9266-4621B4D36FDD}"/>
               </a:ext>
             </a:extLst>
           </p:cNvPr>
@@ -1815,7 +1815,7 @@
           <p:cNvPr id="7" name="Date Placeholder 6">
             <a:extLst>
               <a:ext uri="{FF2B5EF4-FFF2-40B4-BE49-F238E27FC236}">
-                <a16:creationId xmlns:a16="http://schemas.microsoft.com/office/drawing/2014/main" xmlns="" id="{FF93F9BC-E5DC-4652-8BA9-68B9FB868DDE}"/>
+                <a16:creationId xmlns:a16="http://schemas.microsoft.com/office/drawing/2014/main" id="{FF93F9BC-E5DC-4652-8BA9-68B9FB868DDE}"/>
               </a:ext>
             </a:extLst>
           </p:cNvPr>
@@ -1833,7 +1833,7 @@
           <a:p>
             <a:fld id="{7F738CB0-C1DE-441C-8594-7FD4DA415420}" type="datetimeFigureOut">
               <a:rPr lang="nb-NO" smtClean="0"/>
-              <a:t>25.07.2018</a:t>
+              <a:t>02.03.2020</a:t>
             </a:fld>
             <a:endParaRPr lang="nb-NO"/>
           </a:p>
@@ -1844,7 +1844,7 @@
           <p:cNvPr id="8" name="Footer Placeholder 7">
             <a:extLst>
               <a:ext uri="{FF2B5EF4-FFF2-40B4-BE49-F238E27FC236}">
-                <a16:creationId xmlns:a16="http://schemas.microsoft.com/office/drawing/2014/main" xmlns="" id="{30B1A723-AF11-4A0E-8F80-839B6E6D0E02}"/>
+                <a16:creationId xmlns:a16="http://schemas.microsoft.com/office/drawing/2014/main" id="{30B1A723-AF11-4A0E-8F80-839B6E6D0E02}"/>
               </a:ext>
             </a:extLst>
           </p:cNvPr>
@@ -1869,7 +1869,7 @@
           <p:cNvPr id="9" name="Slide Number Placeholder 8">
             <a:extLst>
               <a:ext uri="{FF2B5EF4-FFF2-40B4-BE49-F238E27FC236}">
-                <a16:creationId xmlns:a16="http://schemas.microsoft.com/office/drawing/2014/main" xmlns="" id="{542CD643-A062-4BE0-BB72-1FA12B502FB4}"/>
+                <a16:creationId xmlns:a16="http://schemas.microsoft.com/office/drawing/2014/main" id="{542CD643-A062-4BE0-BB72-1FA12B502FB4}"/>
               </a:ext>
             </a:extLst>
           </p:cNvPr>
@@ -1928,7 +1928,7 @@
           <p:cNvPr id="2" name="Title 1">
             <a:extLst>
               <a:ext uri="{FF2B5EF4-FFF2-40B4-BE49-F238E27FC236}">
-                <a16:creationId xmlns:a16="http://schemas.microsoft.com/office/drawing/2014/main" xmlns="" id="{FA4C9A75-9BBE-4B9A-9384-01EF47666824}"/>
+                <a16:creationId xmlns:a16="http://schemas.microsoft.com/office/drawing/2014/main" id="{FA4C9A75-9BBE-4B9A-9384-01EF47666824}"/>
               </a:ext>
             </a:extLst>
           </p:cNvPr>
@@ -1957,7 +1957,7 @@
           <p:cNvPr id="3" name="Date Placeholder 2">
             <a:extLst>
               <a:ext uri="{FF2B5EF4-FFF2-40B4-BE49-F238E27FC236}">
-                <a16:creationId xmlns:a16="http://schemas.microsoft.com/office/drawing/2014/main" xmlns="" id="{975DD675-2572-44CE-89B4-7F5B4BD77B06}"/>
+                <a16:creationId xmlns:a16="http://schemas.microsoft.com/office/drawing/2014/main" id="{975DD675-2572-44CE-89B4-7F5B4BD77B06}"/>
               </a:ext>
             </a:extLst>
           </p:cNvPr>
@@ -1975,7 +1975,7 @@
           <a:p>
             <a:fld id="{7F738CB0-C1DE-441C-8594-7FD4DA415420}" type="datetimeFigureOut">
               <a:rPr lang="nb-NO" smtClean="0"/>
-              <a:t>25.07.2018</a:t>
+              <a:t>02.03.2020</a:t>
             </a:fld>
             <a:endParaRPr lang="nb-NO"/>
           </a:p>
@@ -1986,7 +1986,7 @@
           <p:cNvPr id="4" name="Footer Placeholder 3">
             <a:extLst>
               <a:ext uri="{FF2B5EF4-FFF2-40B4-BE49-F238E27FC236}">
-                <a16:creationId xmlns:a16="http://schemas.microsoft.com/office/drawing/2014/main" xmlns="" id="{0337F819-6B9B-4C56-9AC2-56B7772A9961}"/>
+                <a16:creationId xmlns:a16="http://schemas.microsoft.com/office/drawing/2014/main" id="{0337F819-6B9B-4C56-9AC2-56B7772A9961}"/>
               </a:ext>
             </a:extLst>
           </p:cNvPr>
@@ -2011,7 +2011,7 @@
           <p:cNvPr id="5" name="Slide Number Placeholder 4">
             <a:extLst>
               <a:ext uri="{FF2B5EF4-FFF2-40B4-BE49-F238E27FC236}">
-                <a16:creationId xmlns:a16="http://schemas.microsoft.com/office/drawing/2014/main" xmlns="" id="{9EAB3763-35B5-4D4C-8666-CFD03F46F98C}"/>
+                <a16:creationId xmlns:a16="http://schemas.microsoft.com/office/drawing/2014/main" id="{9EAB3763-35B5-4D4C-8666-CFD03F46F98C}"/>
               </a:ext>
             </a:extLst>
           </p:cNvPr>
@@ -2070,7 +2070,7 @@
           <p:cNvPr id="2" name="Date Placeholder 1">
             <a:extLst>
               <a:ext uri="{FF2B5EF4-FFF2-40B4-BE49-F238E27FC236}">
-                <a16:creationId xmlns:a16="http://schemas.microsoft.com/office/drawing/2014/main" xmlns="" id="{BC58F7ED-9401-428D-B0EE-80CED4726F1B}"/>
+                <a16:creationId xmlns:a16="http://schemas.microsoft.com/office/drawing/2014/main" id="{BC58F7ED-9401-428D-B0EE-80CED4726F1B}"/>
               </a:ext>
             </a:extLst>
           </p:cNvPr>
@@ -2088,7 +2088,7 @@
           <a:p>
             <a:fld id="{7F738CB0-C1DE-441C-8594-7FD4DA415420}" type="datetimeFigureOut">
               <a:rPr lang="nb-NO" smtClean="0"/>
-              <a:t>25.07.2018</a:t>
+              <a:t>02.03.2020</a:t>
             </a:fld>
             <a:endParaRPr lang="nb-NO"/>
           </a:p>
@@ -2099,7 +2099,7 @@
           <p:cNvPr id="3" name="Footer Placeholder 2">
             <a:extLst>
               <a:ext uri="{FF2B5EF4-FFF2-40B4-BE49-F238E27FC236}">
-                <a16:creationId xmlns:a16="http://schemas.microsoft.com/office/drawing/2014/main" xmlns="" id="{A661831B-702B-4241-9983-AB12BC5AA7F9}"/>
+                <a16:creationId xmlns:a16="http://schemas.microsoft.com/office/drawing/2014/main" id="{A661831B-702B-4241-9983-AB12BC5AA7F9}"/>
               </a:ext>
             </a:extLst>
           </p:cNvPr>
@@ -2124,7 +2124,7 @@
           <p:cNvPr id="4" name="Slide Number Placeholder 3">
             <a:extLst>
               <a:ext uri="{FF2B5EF4-FFF2-40B4-BE49-F238E27FC236}">
-                <a16:creationId xmlns:a16="http://schemas.microsoft.com/office/drawing/2014/main" xmlns="" id="{EAA325E4-E257-4234-A411-DD616A90E1E8}"/>
+                <a16:creationId xmlns:a16="http://schemas.microsoft.com/office/drawing/2014/main" id="{EAA325E4-E257-4234-A411-DD616A90E1E8}"/>
               </a:ext>
             </a:extLst>
           </p:cNvPr>
@@ -2183,7 +2183,7 @@
           <p:cNvPr id="2" name="Title 1">
             <a:extLst>
               <a:ext uri="{FF2B5EF4-FFF2-40B4-BE49-F238E27FC236}">
-                <a16:creationId xmlns:a16="http://schemas.microsoft.com/office/drawing/2014/main" xmlns="" id="{550A35D2-C828-49F7-9902-4A95A6A24A57}"/>
+                <a16:creationId xmlns:a16="http://schemas.microsoft.com/office/drawing/2014/main" id="{550A35D2-C828-49F7-9902-4A95A6A24A57}"/>
               </a:ext>
             </a:extLst>
           </p:cNvPr>
@@ -2221,7 +2221,7 @@
           <p:cNvPr id="3" name="Content Placeholder 2">
             <a:extLst>
               <a:ext uri="{FF2B5EF4-FFF2-40B4-BE49-F238E27FC236}">
-                <a16:creationId xmlns:a16="http://schemas.microsoft.com/office/drawing/2014/main" xmlns="" id="{A6692223-816C-4384-98F1-AB68315DBD99}"/>
+                <a16:creationId xmlns:a16="http://schemas.microsoft.com/office/drawing/2014/main" id="{A6692223-816C-4384-98F1-AB68315DBD99}"/>
               </a:ext>
             </a:extLst>
           </p:cNvPr>
@@ -2312,7 +2312,7 @@
           <p:cNvPr id="4" name="Text Placeholder 3">
             <a:extLst>
               <a:ext uri="{FF2B5EF4-FFF2-40B4-BE49-F238E27FC236}">
-                <a16:creationId xmlns:a16="http://schemas.microsoft.com/office/drawing/2014/main" xmlns="" id="{F34CEEAC-A051-4439-BA65-8DC08104C1FD}"/>
+                <a16:creationId xmlns:a16="http://schemas.microsoft.com/office/drawing/2014/main" id="{F34CEEAC-A051-4439-BA65-8DC08104C1FD}"/>
               </a:ext>
             </a:extLst>
           </p:cNvPr>
@@ -2383,7 +2383,7 @@
           <p:cNvPr id="5" name="Date Placeholder 4">
             <a:extLst>
               <a:ext uri="{FF2B5EF4-FFF2-40B4-BE49-F238E27FC236}">
-                <a16:creationId xmlns:a16="http://schemas.microsoft.com/office/drawing/2014/main" xmlns="" id="{0D6F54FB-165C-4B19-9DB8-92ED6257D6B3}"/>
+                <a16:creationId xmlns:a16="http://schemas.microsoft.com/office/drawing/2014/main" id="{0D6F54FB-165C-4B19-9DB8-92ED6257D6B3}"/>
               </a:ext>
             </a:extLst>
           </p:cNvPr>
@@ -2401,7 +2401,7 @@
           <a:p>
             <a:fld id="{7F738CB0-C1DE-441C-8594-7FD4DA415420}" type="datetimeFigureOut">
               <a:rPr lang="nb-NO" smtClean="0"/>
-              <a:t>25.07.2018</a:t>
+              <a:t>02.03.2020</a:t>
             </a:fld>
             <a:endParaRPr lang="nb-NO"/>
           </a:p>
@@ -2412,7 +2412,7 @@
           <p:cNvPr id="6" name="Footer Placeholder 5">
             <a:extLst>
               <a:ext uri="{FF2B5EF4-FFF2-40B4-BE49-F238E27FC236}">
-                <a16:creationId xmlns:a16="http://schemas.microsoft.com/office/drawing/2014/main" xmlns="" id="{C16066EA-AB7C-4169-8A10-986F1189B740}"/>
+                <a16:creationId xmlns:a16="http://schemas.microsoft.com/office/drawing/2014/main" id="{C16066EA-AB7C-4169-8A10-986F1189B740}"/>
               </a:ext>
             </a:extLst>
           </p:cNvPr>
@@ -2437,7 +2437,7 @@
           <p:cNvPr id="7" name="Slide Number Placeholder 6">
             <a:extLst>
               <a:ext uri="{FF2B5EF4-FFF2-40B4-BE49-F238E27FC236}">
-                <a16:creationId xmlns:a16="http://schemas.microsoft.com/office/drawing/2014/main" xmlns="" id="{4A8D13CC-6251-4591-8F91-622A9D063B7E}"/>
+                <a16:creationId xmlns:a16="http://schemas.microsoft.com/office/drawing/2014/main" id="{4A8D13CC-6251-4591-8F91-622A9D063B7E}"/>
               </a:ext>
             </a:extLst>
           </p:cNvPr>
@@ -2496,7 +2496,7 @@
           <p:cNvPr id="2" name="Title 1">
             <a:extLst>
               <a:ext uri="{FF2B5EF4-FFF2-40B4-BE49-F238E27FC236}">
-                <a16:creationId xmlns:a16="http://schemas.microsoft.com/office/drawing/2014/main" xmlns="" id="{95809F61-D27C-4A3A-88DE-844D8F3DA60F}"/>
+                <a16:creationId xmlns:a16="http://schemas.microsoft.com/office/drawing/2014/main" id="{95809F61-D27C-4A3A-88DE-844D8F3DA60F}"/>
               </a:ext>
             </a:extLst>
           </p:cNvPr>
@@ -2534,7 +2534,7 @@
           <p:cNvPr id="3" name="Picture Placeholder 2">
             <a:extLst>
               <a:ext uri="{FF2B5EF4-FFF2-40B4-BE49-F238E27FC236}">
-                <a16:creationId xmlns:a16="http://schemas.microsoft.com/office/drawing/2014/main" xmlns="" id="{A7222853-8A5B-4C5D-AC14-12D9A50A130E}"/>
+                <a16:creationId xmlns:a16="http://schemas.microsoft.com/office/drawing/2014/main" id="{A7222853-8A5B-4C5D-AC14-12D9A50A130E}"/>
               </a:ext>
             </a:extLst>
           </p:cNvPr>
@@ -2601,7 +2601,7 @@
           <p:cNvPr id="4" name="Text Placeholder 3">
             <a:extLst>
               <a:ext uri="{FF2B5EF4-FFF2-40B4-BE49-F238E27FC236}">
-                <a16:creationId xmlns:a16="http://schemas.microsoft.com/office/drawing/2014/main" xmlns="" id="{60403052-75FB-4741-89CE-DE25FB413BB4}"/>
+                <a16:creationId xmlns:a16="http://schemas.microsoft.com/office/drawing/2014/main" id="{60403052-75FB-4741-89CE-DE25FB413BB4}"/>
               </a:ext>
             </a:extLst>
           </p:cNvPr>
@@ -2672,7 +2672,7 @@
           <p:cNvPr id="5" name="Date Placeholder 4">
             <a:extLst>
               <a:ext uri="{FF2B5EF4-FFF2-40B4-BE49-F238E27FC236}">
-                <a16:creationId xmlns:a16="http://schemas.microsoft.com/office/drawing/2014/main" xmlns="" id="{86BC7775-B335-4DD0-9AB4-40FDDD4C3401}"/>
+                <a16:creationId xmlns:a16="http://schemas.microsoft.com/office/drawing/2014/main" id="{86BC7775-B335-4DD0-9AB4-40FDDD4C3401}"/>
               </a:ext>
             </a:extLst>
           </p:cNvPr>
@@ -2690,7 +2690,7 @@
           <a:p>
             <a:fld id="{7F738CB0-C1DE-441C-8594-7FD4DA415420}" type="datetimeFigureOut">
               <a:rPr lang="nb-NO" smtClean="0"/>
-              <a:t>25.07.2018</a:t>
+              <a:t>02.03.2020</a:t>
             </a:fld>
             <a:endParaRPr lang="nb-NO"/>
           </a:p>
@@ -2701,7 +2701,7 @@
           <p:cNvPr id="6" name="Footer Placeholder 5">
             <a:extLst>
               <a:ext uri="{FF2B5EF4-FFF2-40B4-BE49-F238E27FC236}">
-                <a16:creationId xmlns:a16="http://schemas.microsoft.com/office/drawing/2014/main" xmlns="" id="{786678D3-A3F1-454F-B40B-AB97D65E3A63}"/>
+                <a16:creationId xmlns:a16="http://schemas.microsoft.com/office/drawing/2014/main" id="{786678D3-A3F1-454F-B40B-AB97D65E3A63}"/>
               </a:ext>
             </a:extLst>
           </p:cNvPr>
@@ -2726,7 +2726,7 @@
           <p:cNvPr id="7" name="Slide Number Placeholder 6">
             <a:extLst>
               <a:ext uri="{FF2B5EF4-FFF2-40B4-BE49-F238E27FC236}">
-                <a16:creationId xmlns:a16="http://schemas.microsoft.com/office/drawing/2014/main" xmlns="" id="{DBB54FFA-0409-400B-B8A1-A67876A1E3EA}"/>
+                <a16:creationId xmlns:a16="http://schemas.microsoft.com/office/drawing/2014/main" id="{DBB54FFA-0409-400B-B8A1-A67876A1E3EA}"/>
               </a:ext>
             </a:extLst>
           </p:cNvPr>
@@ -2790,7 +2790,7 @@
           <p:cNvPr id="2" name="Title Placeholder 1">
             <a:extLst>
               <a:ext uri="{FF2B5EF4-FFF2-40B4-BE49-F238E27FC236}">
-                <a16:creationId xmlns:a16="http://schemas.microsoft.com/office/drawing/2014/main" xmlns="" id="{D7007F74-BA27-4C14-A6D7-7F4724918C5F}"/>
+                <a16:creationId xmlns:a16="http://schemas.microsoft.com/office/drawing/2014/main" id="{D7007F74-BA27-4C14-A6D7-7F4724918C5F}"/>
               </a:ext>
             </a:extLst>
           </p:cNvPr>
@@ -2829,7 +2829,7 @@
           <p:cNvPr id="3" name="Text Placeholder 2">
             <a:extLst>
               <a:ext uri="{FF2B5EF4-FFF2-40B4-BE49-F238E27FC236}">
-                <a16:creationId xmlns:a16="http://schemas.microsoft.com/office/drawing/2014/main" xmlns="" id="{99B2D774-4E0B-4E12-B14A-1A01B75080FC}"/>
+                <a16:creationId xmlns:a16="http://schemas.microsoft.com/office/drawing/2014/main" id="{99B2D774-4E0B-4E12-B14A-1A01B75080FC}"/>
               </a:ext>
             </a:extLst>
           </p:cNvPr>
@@ -2897,7 +2897,7 @@
           <p:cNvPr id="4" name="Date Placeholder 3">
             <a:extLst>
               <a:ext uri="{FF2B5EF4-FFF2-40B4-BE49-F238E27FC236}">
-                <a16:creationId xmlns:a16="http://schemas.microsoft.com/office/drawing/2014/main" xmlns="" id="{B93A4BC0-DA86-4D9A-8ECA-26D07C557666}"/>
+                <a16:creationId xmlns:a16="http://schemas.microsoft.com/office/drawing/2014/main" id="{B93A4BC0-DA86-4D9A-8ECA-26D07C557666}"/>
               </a:ext>
             </a:extLst>
           </p:cNvPr>
@@ -2933,7 +2933,7 @@
           <a:p>
             <a:fld id="{7F738CB0-C1DE-441C-8594-7FD4DA415420}" type="datetimeFigureOut">
               <a:rPr lang="nb-NO" smtClean="0"/>
-              <a:t>25.07.2018</a:t>
+              <a:t>02.03.2020</a:t>
             </a:fld>
             <a:endParaRPr lang="nb-NO"/>
           </a:p>
@@ -2944,7 +2944,7 @@
           <p:cNvPr id="5" name="Footer Placeholder 4">
             <a:extLst>
               <a:ext uri="{FF2B5EF4-FFF2-40B4-BE49-F238E27FC236}">
-                <a16:creationId xmlns:a16="http://schemas.microsoft.com/office/drawing/2014/main" xmlns="" id="{6A1B10C5-D9A0-4C11-8EA0-6690193E30DF}"/>
+                <a16:creationId xmlns:a16="http://schemas.microsoft.com/office/drawing/2014/main" id="{6A1B10C5-D9A0-4C11-8EA0-6690193E30DF}"/>
               </a:ext>
             </a:extLst>
           </p:cNvPr>
@@ -2987,7 +2987,7 @@
           <p:cNvPr id="6" name="Slide Number Placeholder 5">
             <a:extLst>
               <a:ext uri="{FF2B5EF4-FFF2-40B4-BE49-F238E27FC236}">
-                <a16:creationId xmlns:a16="http://schemas.microsoft.com/office/drawing/2014/main" xmlns="" id="{310486ED-1B14-4910-B4EA-F17DEE438B45}"/>
+                <a16:creationId xmlns:a16="http://schemas.microsoft.com/office/drawing/2014/main" id="{310486ED-1B14-4910-B4EA-F17DEE438B45}"/>
               </a:ext>
             </a:extLst>
           </p:cNvPr>
@@ -3355,7 +3355,7 @@
           <p:cNvPr id="5" name="Table 4">
             <a:extLst>
               <a:ext uri="{FF2B5EF4-FFF2-40B4-BE49-F238E27FC236}">
-                <a16:creationId xmlns:a16="http://schemas.microsoft.com/office/drawing/2014/main" xmlns="" id="{2A780205-6AD3-4A25-9810-EC44FD0749F4}"/>
+                <a16:creationId xmlns:a16="http://schemas.microsoft.com/office/drawing/2014/main" id="{2A780205-6AD3-4A25-9810-EC44FD0749F4}"/>
               </a:ext>
             </a:extLst>
           </p:cNvPr>
@@ -3384,175 +3384,175 @@
                 <a:gridCol w="464546">
                   <a:extLst>
                     <a:ext uri="{9D8B030D-6E8A-4147-A177-3AD203B41FA5}">
-                      <a16:colId xmlns:a16="http://schemas.microsoft.com/office/drawing/2014/main" xmlns="" val="1019277772"/>
+                      <a16:colId xmlns:a16="http://schemas.microsoft.com/office/drawing/2014/main" val="1019277772"/>
                     </a:ext>
                   </a:extLst>
                 </a:gridCol>
                 <a:gridCol w="464546">
                   <a:extLst>
                     <a:ext uri="{9D8B030D-6E8A-4147-A177-3AD203B41FA5}">
-                      <a16:colId xmlns:a16="http://schemas.microsoft.com/office/drawing/2014/main" xmlns="" val="904070617"/>
+                      <a16:colId xmlns:a16="http://schemas.microsoft.com/office/drawing/2014/main" val="904070617"/>
                     </a:ext>
                   </a:extLst>
                 </a:gridCol>
                 <a:gridCol w="464546">
                   <a:extLst>
                     <a:ext uri="{9D8B030D-6E8A-4147-A177-3AD203B41FA5}">
-                      <a16:colId xmlns:a16="http://schemas.microsoft.com/office/drawing/2014/main" xmlns="" val="3450995975"/>
+                      <a16:colId xmlns:a16="http://schemas.microsoft.com/office/drawing/2014/main" val="3450995975"/>
                     </a:ext>
                   </a:extLst>
                 </a:gridCol>
                 <a:gridCol w="464546">
                   <a:extLst>
                     <a:ext uri="{9D8B030D-6E8A-4147-A177-3AD203B41FA5}">
-                      <a16:colId xmlns:a16="http://schemas.microsoft.com/office/drawing/2014/main" xmlns="" val="84178246"/>
+                      <a16:colId xmlns:a16="http://schemas.microsoft.com/office/drawing/2014/main" val="84178246"/>
                     </a:ext>
                   </a:extLst>
                 </a:gridCol>
                 <a:gridCol w="464546">
                   <a:extLst>
                     <a:ext uri="{9D8B030D-6E8A-4147-A177-3AD203B41FA5}">
-                      <a16:colId xmlns:a16="http://schemas.microsoft.com/office/drawing/2014/main" xmlns="" val="3444399563"/>
+                      <a16:colId xmlns:a16="http://schemas.microsoft.com/office/drawing/2014/main" val="3444399563"/>
                     </a:ext>
                   </a:extLst>
                 </a:gridCol>
                 <a:gridCol w="464546">
                   <a:extLst>
                     <a:ext uri="{9D8B030D-6E8A-4147-A177-3AD203B41FA5}">
-                      <a16:colId xmlns:a16="http://schemas.microsoft.com/office/drawing/2014/main" xmlns="" val="332534161"/>
+                      <a16:colId xmlns:a16="http://schemas.microsoft.com/office/drawing/2014/main" val="332534161"/>
                     </a:ext>
                   </a:extLst>
                 </a:gridCol>
                 <a:gridCol w="464546">
                   <a:extLst>
                     <a:ext uri="{9D8B030D-6E8A-4147-A177-3AD203B41FA5}">
-                      <a16:colId xmlns:a16="http://schemas.microsoft.com/office/drawing/2014/main" xmlns="" val="2290736699"/>
+                      <a16:colId xmlns:a16="http://schemas.microsoft.com/office/drawing/2014/main" val="2290736699"/>
                     </a:ext>
                   </a:extLst>
                 </a:gridCol>
                 <a:gridCol w="464546">
                   <a:extLst>
                     <a:ext uri="{9D8B030D-6E8A-4147-A177-3AD203B41FA5}">
-                      <a16:colId xmlns:a16="http://schemas.microsoft.com/office/drawing/2014/main" xmlns="" val="19451911"/>
+                      <a16:colId xmlns:a16="http://schemas.microsoft.com/office/drawing/2014/main" val="19451911"/>
                     </a:ext>
                   </a:extLst>
                 </a:gridCol>
                 <a:gridCol w="464546">
                   <a:extLst>
                     <a:ext uri="{9D8B030D-6E8A-4147-A177-3AD203B41FA5}">
-                      <a16:colId xmlns:a16="http://schemas.microsoft.com/office/drawing/2014/main" xmlns="" val="308529571"/>
+                      <a16:colId xmlns:a16="http://schemas.microsoft.com/office/drawing/2014/main" val="308529571"/>
                     </a:ext>
                   </a:extLst>
                 </a:gridCol>
                 <a:gridCol w="464546">
                   <a:extLst>
                     <a:ext uri="{9D8B030D-6E8A-4147-A177-3AD203B41FA5}">
-                      <a16:colId xmlns:a16="http://schemas.microsoft.com/office/drawing/2014/main" xmlns="" val="1626105078"/>
+                      <a16:colId xmlns:a16="http://schemas.microsoft.com/office/drawing/2014/main" val="1626105078"/>
                     </a:ext>
                   </a:extLst>
                 </a:gridCol>
                 <a:gridCol w="464546">
                   <a:extLst>
                     <a:ext uri="{9D8B030D-6E8A-4147-A177-3AD203B41FA5}">
-                      <a16:colId xmlns:a16="http://schemas.microsoft.com/office/drawing/2014/main" xmlns="" val="3796810149"/>
+                      <a16:colId xmlns:a16="http://schemas.microsoft.com/office/drawing/2014/main" val="3796810149"/>
                     </a:ext>
                   </a:extLst>
                 </a:gridCol>
                 <a:gridCol w="464546">
                   <a:extLst>
                     <a:ext uri="{9D8B030D-6E8A-4147-A177-3AD203B41FA5}">
-                      <a16:colId xmlns:a16="http://schemas.microsoft.com/office/drawing/2014/main" xmlns="" val="1772219669"/>
+                      <a16:colId xmlns:a16="http://schemas.microsoft.com/office/drawing/2014/main" val="1772219669"/>
                     </a:ext>
                   </a:extLst>
                 </a:gridCol>
                 <a:gridCol w="464546">
                   <a:extLst>
                     <a:ext uri="{9D8B030D-6E8A-4147-A177-3AD203B41FA5}">
-                      <a16:colId xmlns:a16="http://schemas.microsoft.com/office/drawing/2014/main" xmlns="" val="1327067936"/>
+                      <a16:colId xmlns:a16="http://schemas.microsoft.com/office/drawing/2014/main" val="1327067936"/>
                     </a:ext>
                   </a:extLst>
                 </a:gridCol>
                 <a:gridCol w="464546">
                   <a:extLst>
                     <a:ext uri="{9D8B030D-6E8A-4147-A177-3AD203B41FA5}">
-                      <a16:colId xmlns:a16="http://schemas.microsoft.com/office/drawing/2014/main" xmlns="" val="57842469"/>
+                      <a16:colId xmlns:a16="http://schemas.microsoft.com/office/drawing/2014/main" val="57842469"/>
                     </a:ext>
                   </a:extLst>
                 </a:gridCol>
                 <a:gridCol w="464546">
                   <a:extLst>
                     <a:ext uri="{9D8B030D-6E8A-4147-A177-3AD203B41FA5}">
-                      <a16:colId xmlns:a16="http://schemas.microsoft.com/office/drawing/2014/main" xmlns="" val="2526297131"/>
+                      <a16:colId xmlns:a16="http://schemas.microsoft.com/office/drawing/2014/main" val="2526297131"/>
                     </a:ext>
                   </a:extLst>
                 </a:gridCol>
                 <a:gridCol w="464546">
                   <a:extLst>
                     <a:ext uri="{9D8B030D-6E8A-4147-A177-3AD203B41FA5}">
-                      <a16:colId xmlns:a16="http://schemas.microsoft.com/office/drawing/2014/main" xmlns="" val="4184108719"/>
+                      <a16:colId xmlns:a16="http://schemas.microsoft.com/office/drawing/2014/main" val="4184108719"/>
                     </a:ext>
                   </a:extLst>
                 </a:gridCol>
                 <a:gridCol w="464546">
                   <a:extLst>
                     <a:ext uri="{9D8B030D-6E8A-4147-A177-3AD203B41FA5}">
-                      <a16:colId xmlns:a16="http://schemas.microsoft.com/office/drawing/2014/main" xmlns="" val="2493287182"/>
+                      <a16:colId xmlns:a16="http://schemas.microsoft.com/office/drawing/2014/main" val="2493287182"/>
                     </a:ext>
                   </a:extLst>
                 </a:gridCol>
                 <a:gridCol w="464546">
                   <a:extLst>
                     <a:ext uri="{9D8B030D-6E8A-4147-A177-3AD203B41FA5}">
-                      <a16:colId xmlns:a16="http://schemas.microsoft.com/office/drawing/2014/main" xmlns="" val="4018964974"/>
+                      <a16:colId xmlns:a16="http://schemas.microsoft.com/office/drawing/2014/main" val="4018964974"/>
                     </a:ext>
                   </a:extLst>
                 </a:gridCol>
                 <a:gridCol w="464546">
                   <a:extLst>
                     <a:ext uri="{9D8B030D-6E8A-4147-A177-3AD203B41FA5}">
-                      <a16:colId xmlns:a16="http://schemas.microsoft.com/office/drawing/2014/main" xmlns="" val="3303023726"/>
+                      <a16:colId xmlns:a16="http://schemas.microsoft.com/office/drawing/2014/main" val="3303023726"/>
                     </a:ext>
                   </a:extLst>
                 </a:gridCol>
                 <a:gridCol w="464546">
                   <a:extLst>
                     <a:ext uri="{9D8B030D-6E8A-4147-A177-3AD203B41FA5}">
-                      <a16:colId xmlns:a16="http://schemas.microsoft.com/office/drawing/2014/main" xmlns="" val="1047346888"/>
+                      <a16:colId xmlns:a16="http://schemas.microsoft.com/office/drawing/2014/main" val="1047346888"/>
                     </a:ext>
                   </a:extLst>
                 </a:gridCol>
                 <a:gridCol w="464546">
                   <a:extLst>
                     <a:ext uri="{9D8B030D-6E8A-4147-A177-3AD203B41FA5}">
-                      <a16:colId xmlns:a16="http://schemas.microsoft.com/office/drawing/2014/main" xmlns="" val="3175573251"/>
+                      <a16:colId xmlns:a16="http://schemas.microsoft.com/office/drawing/2014/main" val="3175573251"/>
                     </a:ext>
                   </a:extLst>
                 </a:gridCol>
                 <a:gridCol w="464546">
                   <a:extLst>
                     <a:ext uri="{9D8B030D-6E8A-4147-A177-3AD203B41FA5}">
-                      <a16:colId xmlns:a16="http://schemas.microsoft.com/office/drawing/2014/main" xmlns="" val="4176778861"/>
+                      <a16:colId xmlns:a16="http://schemas.microsoft.com/office/drawing/2014/main" val="4176778861"/>
                     </a:ext>
                   </a:extLst>
                 </a:gridCol>
                 <a:gridCol w="464546">
                   <a:extLst>
                     <a:ext uri="{9D8B030D-6E8A-4147-A177-3AD203B41FA5}">
-                      <a16:colId xmlns:a16="http://schemas.microsoft.com/office/drawing/2014/main" xmlns="" val="1113466877"/>
+                      <a16:colId xmlns:a16="http://schemas.microsoft.com/office/drawing/2014/main" val="1113466877"/>
                     </a:ext>
                   </a:extLst>
                 </a:gridCol>
                 <a:gridCol w="464546">
                   <a:extLst>
                     <a:ext uri="{9D8B030D-6E8A-4147-A177-3AD203B41FA5}">
-                      <a16:colId xmlns:a16="http://schemas.microsoft.com/office/drawing/2014/main" xmlns="" val="446932511"/>
+                      <a16:colId xmlns:a16="http://schemas.microsoft.com/office/drawing/2014/main" val="446932511"/>
                     </a:ext>
                   </a:extLst>
                 </a:gridCol>
                 <a:gridCol w="464546">
                   <a:extLst>
                     <a:ext uri="{9D8B030D-6E8A-4147-A177-3AD203B41FA5}">
-                      <a16:colId xmlns:a16="http://schemas.microsoft.com/office/drawing/2014/main" xmlns="" val="290695333"/>
+                      <a16:colId xmlns:a16="http://schemas.microsoft.com/office/drawing/2014/main" val="290695333"/>
                     </a:ext>
                   </a:extLst>
                 </a:gridCol>
@@ -3930,7 +3930,7 @@
                 </a:tc>
                 <a:extLst>
                   <a:ext uri="{0D108BD9-81ED-4DB2-BD59-A6C34878D82A}">
-                    <a16:rowId xmlns:a16="http://schemas.microsoft.com/office/drawing/2014/main" xmlns="" val="2941513846"/>
+                    <a16:rowId xmlns:a16="http://schemas.microsoft.com/office/drawing/2014/main" val="2941513846"/>
                   </a:ext>
                 </a:extLst>
               </a:tr>
@@ -3943,7 +3943,7 @@
           <p:cNvPr id="7" name="Straight Arrow Connector 6">
             <a:extLst>
               <a:ext uri="{FF2B5EF4-FFF2-40B4-BE49-F238E27FC236}">
-                <a16:creationId xmlns:a16="http://schemas.microsoft.com/office/drawing/2014/main" xmlns="" id="{8BFA402C-1619-4DB1-97AC-0867DDCAB434}"/>
+                <a16:creationId xmlns:a16="http://schemas.microsoft.com/office/drawing/2014/main" id="{8BFA402C-1619-4DB1-97AC-0867DDCAB434}"/>
               </a:ext>
             </a:extLst>
           </p:cNvPr>
@@ -3984,7 +3984,7 @@
           <p:cNvPr id="9" name="TextBox 8">
             <a:extLst>
               <a:ext uri="{FF2B5EF4-FFF2-40B4-BE49-F238E27FC236}">
-                <a16:creationId xmlns:a16="http://schemas.microsoft.com/office/drawing/2014/main" xmlns="" id="{63FF2E68-35A0-4B4A-AF0E-4FF5062412E9}"/>
+                <a16:creationId xmlns:a16="http://schemas.microsoft.com/office/drawing/2014/main" id="{63FF2E68-35A0-4B4A-AF0E-4FF5062412E9}"/>
               </a:ext>
             </a:extLst>
           </p:cNvPr>
@@ -4031,7 +4031,7 @@
           <p:cNvPr id="15" name="Picture 14">
             <a:extLst>
               <a:ext uri="{FF2B5EF4-FFF2-40B4-BE49-F238E27FC236}">
-                <a16:creationId xmlns:a16="http://schemas.microsoft.com/office/drawing/2014/main" xmlns="" id="{FB1FF901-C906-43CB-8F91-7D769A07AA2D}"/>
+                <a16:creationId xmlns:a16="http://schemas.microsoft.com/office/drawing/2014/main" id="{FB1FF901-C906-43CB-8F91-7D769A07AA2D}"/>
               </a:ext>
             </a:extLst>
           </p:cNvPr>
@@ -4061,7 +4061,7 @@
           <p:cNvPr id="16" name="TextBox 15">
             <a:extLst>
               <a:ext uri="{FF2B5EF4-FFF2-40B4-BE49-F238E27FC236}">
-                <a16:creationId xmlns:a16="http://schemas.microsoft.com/office/drawing/2014/main" xmlns="" id="{93DC42B1-BCA8-44DF-8C63-F55D3F34BDC9}"/>
+                <a16:creationId xmlns:a16="http://schemas.microsoft.com/office/drawing/2014/main" id="{93DC42B1-BCA8-44DF-8C63-F55D3F34BDC9}"/>
               </a:ext>
             </a:extLst>
           </p:cNvPr>
@@ -4096,7 +4096,7 @@
           <p:cNvPr id="17" name="Picture 16">
             <a:extLst>
               <a:ext uri="{FF2B5EF4-FFF2-40B4-BE49-F238E27FC236}">
-                <a16:creationId xmlns:a16="http://schemas.microsoft.com/office/drawing/2014/main" xmlns="" id="{590133A9-43B3-4ACA-8B6A-AC7C02124269}"/>
+                <a16:creationId xmlns:a16="http://schemas.microsoft.com/office/drawing/2014/main" id="{590133A9-43B3-4ACA-8B6A-AC7C02124269}"/>
               </a:ext>
             </a:extLst>
           </p:cNvPr>
@@ -4126,7 +4126,7 @@
           <p:cNvPr id="20" name="TextBox 19">
             <a:extLst>
               <a:ext uri="{FF2B5EF4-FFF2-40B4-BE49-F238E27FC236}">
-                <a16:creationId xmlns:a16="http://schemas.microsoft.com/office/drawing/2014/main" xmlns="" id="{F3C5B3FB-46BE-4DB8-AFF6-0342A6DD7DA8}"/>
+                <a16:creationId xmlns:a16="http://schemas.microsoft.com/office/drawing/2014/main" id="{F3C5B3FB-46BE-4DB8-AFF6-0342A6DD7DA8}"/>
               </a:ext>
             </a:extLst>
           </p:cNvPr>
@@ -4162,7 +4162,7 @@
           <p:cNvPr id="24" name="Arrow: Down 23">
             <a:extLst>
               <a:ext uri="{FF2B5EF4-FFF2-40B4-BE49-F238E27FC236}">
-                <a16:creationId xmlns:a16="http://schemas.microsoft.com/office/drawing/2014/main" xmlns="" id="{A88AAE1C-1796-490D-B473-313D439CF144}"/>
+                <a16:creationId xmlns:a16="http://schemas.microsoft.com/office/drawing/2014/main" id="{A88AAE1C-1796-490D-B473-313D439CF144}"/>
               </a:ext>
             </a:extLst>
           </p:cNvPr>
@@ -4208,7 +4208,7 @@
           <p:cNvPr id="25" name="TextBox 24">
             <a:extLst>
               <a:ext uri="{FF2B5EF4-FFF2-40B4-BE49-F238E27FC236}">
-                <a16:creationId xmlns:a16="http://schemas.microsoft.com/office/drawing/2014/main" xmlns="" id="{78812C09-EA6B-4EA6-B6DF-2E2A9815F127}"/>
+                <a16:creationId xmlns:a16="http://schemas.microsoft.com/office/drawing/2014/main" id="{78812C09-EA6B-4EA6-B6DF-2E2A9815F127}"/>
               </a:ext>
             </a:extLst>
           </p:cNvPr>
@@ -4243,7 +4243,7 @@
           <p:cNvPr id="26" name="TextBox 25">
             <a:extLst>
               <a:ext uri="{FF2B5EF4-FFF2-40B4-BE49-F238E27FC236}">
-                <a16:creationId xmlns:a16="http://schemas.microsoft.com/office/drawing/2014/main" xmlns="" id="{871C09F9-6C79-4F69-80A6-2181613CD9F8}"/>
+                <a16:creationId xmlns:a16="http://schemas.microsoft.com/office/drawing/2014/main" id="{871C09F9-6C79-4F69-80A6-2181613CD9F8}"/>
               </a:ext>
             </a:extLst>
           </p:cNvPr>
@@ -4308,7 +4308,7 @@
           <p:cNvPr id="5" name="Table 4">
             <a:extLst>
               <a:ext uri="{FF2B5EF4-FFF2-40B4-BE49-F238E27FC236}">
-                <a16:creationId xmlns:a16="http://schemas.microsoft.com/office/drawing/2014/main" xmlns="" id="{2A780205-6AD3-4A25-9810-EC44FD0749F4}"/>
+                <a16:creationId xmlns:a16="http://schemas.microsoft.com/office/drawing/2014/main" id="{2A780205-6AD3-4A25-9810-EC44FD0749F4}"/>
               </a:ext>
             </a:extLst>
           </p:cNvPr>
@@ -4337,175 +4337,175 @@
                 <a:gridCol w="464546">
                   <a:extLst>
                     <a:ext uri="{9D8B030D-6E8A-4147-A177-3AD203B41FA5}">
-                      <a16:colId xmlns:a16="http://schemas.microsoft.com/office/drawing/2014/main" xmlns="" val="1019277772"/>
+                      <a16:colId xmlns:a16="http://schemas.microsoft.com/office/drawing/2014/main" val="1019277772"/>
                     </a:ext>
                   </a:extLst>
                 </a:gridCol>
                 <a:gridCol w="464546">
                   <a:extLst>
                     <a:ext uri="{9D8B030D-6E8A-4147-A177-3AD203B41FA5}">
-                      <a16:colId xmlns:a16="http://schemas.microsoft.com/office/drawing/2014/main" xmlns="" val="904070617"/>
+                      <a16:colId xmlns:a16="http://schemas.microsoft.com/office/drawing/2014/main" val="904070617"/>
                     </a:ext>
                   </a:extLst>
                 </a:gridCol>
                 <a:gridCol w="464546">
                   <a:extLst>
                     <a:ext uri="{9D8B030D-6E8A-4147-A177-3AD203B41FA5}">
-                      <a16:colId xmlns:a16="http://schemas.microsoft.com/office/drawing/2014/main" xmlns="" val="3450995975"/>
+                      <a16:colId xmlns:a16="http://schemas.microsoft.com/office/drawing/2014/main" val="3450995975"/>
                     </a:ext>
                   </a:extLst>
                 </a:gridCol>
                 <a:gridCol w="464546">
                   <a:extLst>
                     <a:ext uri="{9D8B030D-6E8A-4147-A177-3AD203B41FA5}">
-                      <a16:colId xmlns:a16="http://schemas.microsoft.com/office/drawing/2014/main" xmlns="" val="84178246"/>
+                      <a16:colId xmlns:a16="http://schemas.microsoft.com/office/drawing/2014/main" val="84178246"/>
                     </a:ext>
                   </a:extLst>
                 </a:gridCol>
                 <a:gridCol w="464546">
                   <a:extLst>
                     <a:ext uri="{9D8B030D-6E8A-4147-A177-3AD203B41FA5}">
-                      <a16:colId xmlns:a16="http://schemas.microsoft.com/office/drawing/2014/main" xmlns="" val="3444399563"/>
+                      <a16:colId xmlns:a16="http://schemas.microsoft.com/office/drawing/2014/main" val="3444399563"/>
                     </a:ext>
                   </a:extLst>
                 </a:gridCol>
                 <a:gridCol w="464546">
                   <a:extLst>
                     <a:ext uri="{9D8B030D-6E8A-4147-A177-3AD203B41FA5}">
-                      <a16:colId xmlns:a16="http://schemas.microsoft.com/office/drawing/2014/main" xmlns="" val="332534161"/>
+                      <a16:colId xmlns:a16="http://schemas.microsoft.com/office/drawing/2014/main" val="332534161"/>
                     </a:ext>
                   </a:extLst>
                 </a:gridCol>
                 <a:gridCol w="464546">
                   <a:extLst>
                     <a:ext uri="{9D8B030D-6E8A-4147-A177-3AD203B41FA5}">
-                      <a16:colId xmlns:a16="http://schemas.microsoft.com/office/drawing/2014/main" xmlns="" val="2290736699"/>
+                      <a16:colId xmlns:a16="http://schemas.microsoft.com/office/drawing/2014/main" val="2290736699"/>
                     </a:ext>
                   </a:extLst>
                 </a:gridCol>
                 <a:gridCol w="464546">
                   <a:extLst>
                     <a:ext uri="{9D8B030D-6E8A-4147-A177-3AD203B41FA5}">
-                      <a16:colId xmlns:a16="http://schemas.microsoft.com/office/drawing/2014/main" xmlns="" val="19451911"/>
+                      <a16:colId xmlns:a16="http://schemas.microsoft.com/office/drawing/2014/main" val="19451911"/>
                     </a:ext>
                   </a:extLst>
                 </a:gridCol>
                 <a:gridCol w="464546">
                   <a:extLst>
                     <a:ext uri="{9D8B030D-6E8A-4147-A177-3AD203B41FA5}">
-                      <a16:colId xmlns:a16="http://schemas.microsoft.com/office/drawing/2014/main" xmlns="" val="308529571"/>
+                      <a16:colId xmlns:a16="http://schemas.microsoft.com/office/drawing/2014/main" val="308529571"/>
                     </a:ext>
                   </a:extLst>
                 </a:gridCol>
                 <a:gridCol w="464546">
                   <a:extLst>
                     <a:ext uri="{9D8B030D-6E8A-4147-A177-3AD203B41FA5}">
-                      <a16:colId xmlns:a16="http://schemas.microsoft.com/office/drawing/2014/main" xmlns="" val="1626105078"/>
+                      <a16:colId xmlns:a16="http://schemas.microsoft.com/office/drawing/2014/main" val="1626105078"/>
                     </a:ext>
                   </a:extLst>
                 </a:gridCol>
                 <a:gridCol w="464546">
                   <a:extLst>
                     <a:ext uri="{9D8B030D-6E8A-4147-A177-3AD203B41FA5}">
-                      <a16:colId xmlns:a16="http://schemas.microsoft.com/office/drawing/2014/main" xmlns="" val="3796810149"/>
+                      <a16:colId xmlns:a16="http://schemas.microsoft.com/office/drawing/2014/main" val="3796810149"/>
                     </a:ext>
                   </a:extLst>
                 </a:gridCol>
                 <a:gridCol w="464546">
                   <a:extLst>
                     <a:ext uri="{9D8B030D-6E8A-4147-A177-3AD203B41FA5}">
-                      <a16:colId xmlns:a16="http://schemas.microsoft.com/office/drawing/2014/main" xmlns="" val="1772219669"/>
+                      <a16:colId xmlns:a16="http://schemas.microsoft.com/office/drawing/2014/main" val="1772219669"/>
                     </a:ext>
                   </a:extLst>
                 </a:gridCol>
                 <a:gridCol w="464546">
                   <a:extLst>
                     <a:ext uri="{9D8B030D-6E8A-4147-A177-3AD203B41FA5}">
-                      <a16:colId xmlns:a16="http://schemas.microsoft.com/office/drawing/2014/main" xmlns="" val="1327067936"/>
+                      <a16:colId xmlns:a16="http://schemas.microsoft.com/office/drawing/2014/main" val="1327067936"/>
                     </a:ext>
                   </a:extLst>
                 </a:gridCol>
                 <a:gridCol w="464546">
                   <a:extLst>
                     <a:ext uri="{9D8B030D-6E8A-4147-A177-3AD203B41FA5}">
-                      <a16:colId xmlns:a16="http://schemas.microsoft.com/office/drawing/2014/main" xmlns="" val="57842469"/>
+                      <a16:colId xmlns:a16="http://schemas.microsoft.com/office/drawing/2014/main" val="57842469"/>
                     </a:ext>
                   </a:extLst>
                 </a:gridCol>
                 <a:gridCol w="464546">
                   <a:extLst>
                     <a:ext uri="{9D8B030D-6E8A-4147-A177-3AD203B41FA5}">
-                      <a16:colId xmlns:a16="http://schemas.microsoft.com/office/drawing/2014/main" xmlns="" val="2526297131"/>
+                      <a16:colId xmlns:a16="http://schemas.microsoft.com/office/drawing/2014/main" val="2526297131"/>
                     </a:ext>
                   </a:extLst>
                 </a:gridCol>
                 <a:gridCol w="464546">
                   <a:extLst>
                     <a:ext uri="{9D8B030D-6E8A-4147-A177-3AD203B41FA5}">
-                      <a16:colId xmlns:a16="http://schemas.microsoft.com/office/drawing/2014/main" xmlns="" val="4184108719"/>
+                      <a16:colId xmlns:a16="http://schemas.microsoft.com/office/drawing/2014/main" val="4184108719"/>
                     </a:ext>
                   </a:extLst>
                 </a:gridCol>
                 <a:gridCol w="464546">
                   <a:extLst>
                     <a:ext uri="{9D8B030D-6E8A-4147-A177-3AD203B41FA5}">
-                      <a16:colId xmlns:a16="http://schemas.microsoft.com/office/drawing/2014/main" xmlns="" val="2493287182"/>
+                      <a16:colId xmlns:a16="http://schemas.microsoft.com/office/drawing/2014/main" val="2493287182"/>
                     </a:ext>
                   </a:extLst>
                 </a:gridCol>
                 <a:gridCol w="464546">
                   <a:extLst>
                     <a:ext uri="{9D8B030D-6E8A-4147-A177-3AD203B41FA5}">
-                      <a16:colId xmlns:a16="http://schemas.microsoft.com/office/drawing/2014/main" xmlns="" val="4018964974"/>
+                      <a16:colId xmlns:a16="http://schemas.microsoft.com/office/drawing/2014/main" val="4018964974"/>
                     </a:ext>
                   </a:extLst>
                 </a:gridCol>
                 <a:gridCol w="464546">
                   <a:extLst>
                     <a:ext uri="{9D8B030D-6E8A-4147-A177-3AD203B41FA5}">
-                      <a16:colId xmlns:a16="http://schemas.microsoft.com/office/drawing/2014/main" xmlns="" val="3303023726"/>
+                      <a16:colId xmlns:a16="http://schemas.microsoft.com/office/drawing/2014/main" val="3303023726"/>
                     </a:ext>
                   </a:extLst>
                 </a:gridCol>
                 <a:gridCol w="464546">
                   <a:extLst>
                     <a:ext uri="{9D8B030D-6E8A-4147-A177-3AD203B41FA5}">
-                      <a16:colId xmlns:a16="http://schemas.microsoft.com/office/drawing/2014/main" xmlns="" val="1047346888"/>
+                      <a16:colId xmlns:a16="http://schemas.microsoft.com/office/drawing/2014/main" val="1047346888"/>
                     </a:ext>
                   </a:extLst>
                 </a:gridCol>
                 <a:gridCol w="464546">
                   <a:extLst>
                     <a:ext uri="{9D8B030D-6E8A-4147-A177-3AD203B41FA5}">
-                      <a16:colId xmlns:a16="http://schemas.microsoft.com/office/drawing/2014/main" xmlns="" val="3175573251"/>
+                      <a16:colId xmlns:a16="http://schemas.microsoft.com/office/drawing/2014/main" val="3175573251"/>
                     </a:ext>
                   </a:extLst>
                 </a:gridCol>
                 <a:gridCol w="464546">
                   <a:extLst>
                     <a:ext uri="{9D8B030D-6E8A-4147-A177-3AD203B41FA5}">
-                      <a16:colId xmlns:a16="http://schemas.microsoft.com/office/drawing/2014/main" xmlns="" val="4176778861"/>
+                      <a16:colId xmlns:a16="http://schemas.microsoft.com/office/drawing/2014/main" val="4176778861"/>
                     </a:ext>
                   </a:extLst>
                 </a:gridCol>
                 <a:gridCol w="464546">
                   <a:extLst>
                     <a:ext uri="{9D8B030D-6E8A-4147-A177-3AD203B41FA5}">
-                      <a16:colId xmlns:a16="http://schemas.microsoft.com/office/drawing/2014/main" xmlns="" val="1113466877"/>
+                      <a16:colId xmlns:a16="http://schemas.microsoft.com/office/drawing/2014/main" val="1113466877"/>
                     </a:ext>
                   </a:extLst>
                 </a:gridCol>
                 <a:gridCol w="464546">
                   <a:extLst>
                     <a:ext uri="{9D8B030D-6E8A-4147-A177-3AD203B41FA5}">
-                      <a16:colId xmlns:a16="http://schemas.microsoft.com/office/drawing/2014/main" xmlns="" val="446932511"/>
+                      <a16:colId xmlns:a16="http://schemas.microsoft.com/office/drawing/2014/main" val="446932511"/>
                     </a:ext>
                   </a:extLst>
                 </a:gridCol>
                 <a:gridCol w="464546">
                   <a:extLst>
                     <a:ext uri="{9D8B030D-6E8A-4147-A177-3AD203B41FA5}">
-                      <a16:colId xmlns:a16="http://schemas.microsoft.com/office/drawing/2014/main" xmlns="" val="290695333"/>
+                      <a16:colId xmlns:a16="http://schemas.microsoft.com/office/drawing/2014/main" val="290695333"/>
                     </a:ext>
                   </a:extLst>
                 </a:gridCol>
@@ -4518,10 +4518,9 @@
                     <a:p>
                       <a:pPr algn="ctr"/>
                       <a:r>
-                        <a:rPr lang="nb-NO" sz="1100" dirty="0" smtClean="0"/>
+                        <a:rPr lang="nb-NO" sz="1100" dirty="0"/>
                         <a:t>n-24</a:t>
                       </a:r>
-                      <a:endParaRPr lang="nb-NO" sz="1100" dirty="0"/>
                     </a:p>
                   </a:txBody>
                   <a:tcPr>
@@ -4537,10 +4536,9 @@
                     <a:p>
                       <a:pPr algn="ctr"/>
                       <a:r>
-                        <a:rPr lang="nb-NO" sz="1100" dirty="0" smtClean="0"/>
+                        <a:rPr lang="nb-NO" sz="1100" dirty="0"/>
                         <a:t>n-23</a:t>
                       </a:r>
-                      <a:endParaRPr lang="nb-NO" sz="1100" dirty="0"/>
                     </a:p>
                   </a:txBody>
                   <a:tcPr/>
@@ -4552,10 +4550,9 @@
                     <a:p>
                       <a:pPr algn="ctr"/>
                       <a:r>
-                        <a:rPr lang="nb-NO" sz="1100" dirty="0" smtClean="0"/>
+                        <a:rPr lang="nb-NO" sz="1100" dirty="0"/>
                         <a:t>n-22</a:t>
                       </a:r>
-                      <a:endParaRPr lang="nb-NO" sz="1100" dirty="0"/>
                     </a:p>
                   </a:txBody>
                   <a:tcPr/>
@@ -4567,10 +4564,9 @@
                     <a:p>
                       <a:pPr algn="ctr"/>
                       <a:r>
-                        <a:rPr lang="nb-NO" sz="1100" dirty="0" smtClean="0"/>
+                        <a:rPr lang="nb-NO" sz="1100" dirty="0"/>
                         <a:t>n-21</a:t>
                       </a:r>
-                      <a:endParaRPr lang="nb-NO" sz="1100" dirty="0"/>
                     </a:p>
                   </a:txBody>
                   <a:tcPr/>
@@ -4582,10 +4578,9 @@
                     <a:p>
                       <a:pPr algn="ctr"/>
                       <a:r>
-                        <a:rPr lang="nb-NO" sz="1100" dirty="0" smtClean="0"/>
+                        <a:rPr lang="nb-NO" sz="1100" dirty="0"/>
                         <a:t>n-20</a:t>
                       </a:r>
-                      <a:endParaRPr lang="nb-NO" sz="1100" dirty="0"/>
                     </a:p>
                   </a:txBody>
                   <a:tcPr/>
@@ -4597,10 +4592,9 @@
                     <a:p>
                       <a:pPr algn="ctr"/>
                       <a:r>
-                        <a:rPr lang="nb-NO" sz="1100" dirty="0" smtClean="0"/>
+                        <a:rPr lang="nb-NO" sz="1100" dirty="0"/>
                         <a:t>n-19</a:t>
                       </a:r>
-                      <a:endParaRPr lang="nb-NO" sz="1100" dirty="0"/>
                     </a:p>
                   </a:txBody>
                   <a:tcPr/>
@@ -4612,10 +4606,9 @@
                     <a:p>
                       <a:pPr algn="ctr"/>
                       <a:r>
-                        <a:rPr lang="nb-NO" sz="1100" dirty="0" smtClean="0"/>
+                        <a:rPr lang="nb-NO" sz="1100" dirty="0"/>
                         <a:t>n-18</a:t>
                       </a:r>
-                      <a:endParaRPr lang="nb-NO" sz="1100" dirty="0"/>
                     </a:p>
                   </a:txBody>
                   <a:tcPr/>
@@ -4627,10 +4620,9 @@
                     <a:p>
                       <a:pPr algn="ctr"/>
                       <a:r>
-                        <a:rPr lang="nb-NO" sz="1100" dirty="0" smtClean="0"/>
+                        <a:rPr lang="nb-NO" sz="1100" dirty="0"/>
                         <a:t>n-17</a:t>
                       </a:r>
-                      <a:endParaRPr lang="nb-NO" sz="1100" dirty="0"/>
                     </a:p>
                   </a:txBody>
                   <a:tcPr/>
@@ -4642,10 +4634,9 @@
                     <a:p>
                       <a:pPr algn="ctr"/>
                       <a:r>
-                        <a:rPr lang="nb-NO" sz="1100" dirty="0" smtClean="0"/>
+                        <a:rPr lang="nb-NO" sz="1100" dirty="0"/>
                         <a:t>n-16</a:t>
                       </a:r>
-                      <a:endParaRPr lang="nb-NO" sz="1100" dirty="0"/>
                     </a:p>
                   </a:txBody>
                   <a:tcPr/>
@@ -4657,10 +4648,9 @@
                     <a:p>
                       <a:pPr algn="ctr"/>
                       <a:r>
-                        <a:rPr lang="nb-NO" sz="1100" dirty="0" smtClean="0"/>
+                        <a:rPr lang="nb-NO" sz="1100" dirty="0"/>
                         <a:t>n-15</a:t>
                       </a:r>
-                      <a:endParaRPr lang="nb-NO" sz="1100" dirty="0"/>
                     </a:p>
                   </a:txBody>
                   <a:tcPr/>
@@ -4672,10 +4662,9 @@
                     <a:p>
                       <a:pPr algn="ctr"/>
                       <a:r>
-                        <a:rPr lang="nb-NO" sz="1100" dirty="0" smtClean="0"/>
+                        <a:rPr lang="nb-NO" sz="1100" dirty="0"/>
                         <a:t>n-14</a:t>
                       </a:r>
-                      <a:endParaRPr lang="nb-NO" sz="1100" dirty="0"/>
                     </a:p>
                   </a:txBody>
                   <a:tcPr/>
@@ -4687,10 +4676,9 @@
                     <a:p>
                       <a:pPr algn="ctr"/>
                       <a:r>
-                        <a:rPr lang="nb-NO" sz="1100" dirty="0" smtClean="0"/>
+                        <a:rPr lang="nb-NO" sz="1100" dirty="0"/>
                         <a:t>n-13</a:t>
                       </a:r>
-                      <a:endParaRPr lang="nb-NO" sz="1100" dirty="0"/>
                     </a:p>
                   </a:txBody>
                   <a:tcPr/>
@@ -4702,10 +4690,9 @@
                     <a:p>
                       <a:pPr algn="ctr"/>
                       <a:r>
-                        <a:rPr lang="nb-NO" sz="1100" dirty="0" smtClean="0"/>
+                        <a:rPr lang="nb-NO" sz="1100" dirty="0"/>
                         <a:t>n-12</a:t>
                       </a:r>
-                      <a:endParaRPr lang="nb-NO" sz="1100" dirty="0"/>
                     </a:p>
                   </a:txBody>
                   <a:tcPr/>
@@ -4717,10 +4704,9 @@
                     <a:p>
                       <a:pPr algn="ctr"/>
                       <a:r>
-                        <a:rPr lang="nb-NO" sz="1100" dirty="0" smtClean="0"/>
+                        <a:rPr lang="nb-NO" sz="1100" dirty="0"/>
                         <a:t>n-11</a:t>
                       </a:r>
-                      <a:endParaRPr lang="nb-NO" sz="1100" dirty="0"/>
                     </a:p>
                   </a:txBody>
                   <a:tcPr/>
@@ -4732,10 +4718,9 @@
                     <a:p>
                       <a:pPr algn="ctr"/>
                       <a:r>
-                        <a:rPr lang="nb-NO" sz="1100" dirty="0" smtClean="0"/>
+                        <a:rPr lang="nb-NO" sz="1100" dirty="0"/>
                         <a:t>n-10</a:t>
                       </a:r>
-                      <a:endParaRPr lang="nb-NO" sz="1100" dirty="0"/>
                     </a:p>
                   </a:txBody>
                   <a:tcPr/>
@@ -4747,10 +4732,9 @@
                     <a:p>
                       <a:pPr algn="ctr"/>
                       <a:r>
-                        <a:rPr lang="nb-NO" sz="1100" dirty="0" smtClean="0"/>
+                        <a:rPr lang="nb-NO" sz="1100" dirty="0"/>
                         <a:t>n-9</a:t>
                       </a:r>
-                      <a:endParaRPr lang="nb-NO" sz="1100" dirty="0"/>
                     </a:p>
                   </a:txBody>
                   <a:tcPr/>
@@ -4762,10 +4746,9 @@
                     <a:p>
                       <a:pPr algn="ctr"/>
                       <a:r>
-                        <a:rPr lang="nb-NO" sz="1100" dirty="0" smtClean="0"/>
+                        <a:rPr lang="nb-NO" sz="1100" dirty="0"/>
                         <a:t>n-8</a:t>
                       </a:r>
-                      <a:endParaRPr lang="nb-NO" sz="1100" dirty="0"/>
                     </a:p>
                   </a:txBody>
                   <a:tcPr/>
@@ -4777,10 +4760,9 @@
                     <a:p>
                       <a:pPr algn="ctr"/>
                       <a:r>
-                        <a:rPr lang="nb-NO" sz="1100" dirty="0" smtClean="0"/>
+                        <a:rPr lang="nb-NO" sz="1100" dirty="0"/>
                         <a:t>n-7</a:t>
                       </a:r>
-                      <a:endParaRPr lang="nb-NO" sz="1100" dirty="0"/>
                     </a:p>
                   </a:txBody>
                   <a:tcPr/>
@@ -4792,10 +4774,9 @@
                     <a:p>
                       <a:pPr algn="ctr"/>
                       <a:r>
-                        <a:rPr lang="nb-NO" sz="1100" dirty="0" smtClean="0"/>
+                        <a:rPr lang="nb-NO" sz="1100" dirty="0"/>
                         <a:t>n-6</a:t>
                       </a:r>
-                      <a:endParaRPr lang="nb-NO" sz="1100" dirty="0"/>
                     </a:p>
                   </a:txBody>
                   <a:tcPr/>
@@ -4807,10 +4788,9 @@
                     <a:p>
                       <a:pPr algn="ctr"/>
                       <a:r>
-                        <a:rPr lang="nb-NO" sz="1100" dirty="0" smtClean="0"/>
+                        <a:rPr lang="nb-NO" sz="1100" dirty="0"/>
                         <a:t>n-5</a:t>
                       </a:r>
-                      <a:endParaRPr lang="nb-NO" sz="1100" dirty="0"/>
                     </a:p>
                   </a:txBody>
                   <a:tcPr/>
@@ -4822,10 +4802,9 @@
                     <a:p>
                       <a:pPr algn="ctr"/>
                       <a:r>
-                        <a:rPr lang="nb-NO" sz="1100" dirty="0" smtClean="0"/>
+                        <a:rPr lang="nb-NO" sz="1100" dirty="0"/>
                         <a:t>n-4</a:t>
                       </a:r>
-                      <a:endParaRPr lang="nb-NO" sz="1100" dirty="0"/>
                     </a:p>
                   </a:txBody>
                   <a:tcPr/>
@@ -4837,10 +4816,9 @@
                     <a:p>
                       <a:pPr algn="ctr"/>
                       <a:r>
-                        <a:rPr lang="nb-NO" sz="1100" dirty="0" smtClean="0"/>
+                        <a:rPr lang="nb-NO" sz="1100" dirty="0"/>
                         <a:t>n-3</a:t>
                       </a:r>
-                      <a:endParaRPr lang="nb-NO" sz="1100" dirty="0"/>
                     </a:p>
                   </a:txBody>
                   <a:tcPr>
@@ -4856,10 +4834,9 @@
                     <a:p>
                       <a:pPr algn="ctr"/>
                       <a:r>
-                        <a:rPr lang="nb-NO" sz="1100" dirty="0" smtClean="0"/>
+                        <a:rPr lang="nb-NO" sz="1100" dirty="0"/>
                         <a:t>n-2</a:t>
                       </a:r>
-                      <a:endParaRPr lang="nb-NO" sz="1100" dirty="0"/>
                     </a:p>
                   </a:txBody>
                   <a:tcPr>
@@ -4875,10 +4852,9 @@
                     <a:p>
                       <a:pPr algn="ctr"/>
                       <a:r>
-                        <a:rPr lang="nb-NO" sz="1100" dirty="0" smtClean="0"/>
+                        <a:rPr lang="nb-NO" sz="1100" dirty="0"/>
                         <a:t>n-1</a:t>
                       </a:r>
-                      <a:endParaRPr lang="nb-NO" sz="1100" dirty="0"/>
                     </a:p>
                   </a:txBody>
                   <a:tcPr>
@@ -4894,10 +4870,9 @@
                     <a:p>
                       <a:pPr algn="ctr"/>
                       <a:r>
-                        <a:rPr lang="nb-NO" sz="1100" dirty="0" smtClean="0"/>
+                        <a:rPr lang="nb-NO" sz="1100" dirty="0"/>
                         <a:t>n</a:t>
                       </a:r>
-                      <a:endParaRPr lang="nb-NO" sz="1100" dirty="0"/>
                     </a:p>
                   </a:txBody>
                   <a:tcPr>
@@ -4908,7 +4883,7 @@
                 </a:tc>
                 <a:extLst>
                   <a:ext uri="{0D108BD9-81ED-4DB2-BD59-A6C34878D82A}">
-                    <a16:rowId xmlns:a16="http://schemas.microsoft.com/office/drawing/2014/main" xmlns="" val="2941513846"/>
+                    <a16:rowId xmlns:a16="http://schemas.microsoft.com/office/drawing/2014/main" val="2941513846"/>
                   </a:ext>
                 </a:extLst>
               </a:tr>
@@ -4939,7 +4914,7 @@
           <a:lstStyle/>
           <a:p>
             <a:r>
-              <a:rPr lang="nb-NO" sz="1200" dirty="0" smtClean="0"/>
+              <a:rPr lang="nb-NO" sz="1200" dirty="0"/>
               <a:t>PoW chain: Blocktime: 60 seconds</a:t>
             </a:r>
           </a:p>
@@ -4968,7 +4943,7 @@
           <a:lstStyle/>
           <a:p>
             <a:r>
-              <a:rPr lang="nb-NO" sz="1200" dirty="0" smtClean="0"/>
+              <a:rPr lang="nb-NO" sz="1200" dirty="0"/>
               <a:t>PoS chain: Blocktime: 10 minutes</a:t>
             </a:r>
           </a:p>
@@ -4979,7 +4954,7 @@
           <p:cNvPr id="18" name="Table 17">
             <a:extLst>
               <a:ext uri="{FF2B5EF4-FFF2-40B4-BE49-F238E27FC236}">
-                <a16:creationId xmlns:a16="http://schemas.microsoft.com/office/drawing/2014/main" xmlns="" id="{2A780205-6AD3-4A25-9810-EC44FD0749F4}"/>
+                <a16:creationId xmlns:a16="http://schemas.microsoft.com/office/drawing/2014/main" id="{2A780205-6AD3-4A25-9810-EC44FD0749F4}"/>
               </a:ext>
             </a:extLst>
           </p:cNvPr>
@@ -5008,175 +4983,175 @@
                 <a:gridCol w="464546">
                   <a:extLst>
                     <a:ext uri="{9D8B030D-6E8A-4147-A177-3AD203B41FA5}">
-                      <a16:colId xmlns:a16="http://schemas.microsoft.com/office/drawing/2014/main" xmlns="" val="1019277772"/>
+                      <a16:colId xmlns:a16="http://schemas.microsoft.com/office/drawing/2014/main" val="1019277772"/>
                     </a:ext>
                   </a:extLst>
                 </a:gridCol>
                 <a:gridCol w="464546">
                   <a:extLst>
                     <a:ext uri="{9D8B030D-6E8A-4147-A177-3AD203B41FA5}">
-                      <a16:colId xmlns:a16="http://schemas.microsoft.com/office/drawing/2014/main" xmlns="" val="904070617"/>
+                      <a16:colId xmlns:a16="http://schemas.microsoft.com/office/drawing/2014/main" val="904070617"/>
                     </a:ext>
                   </a:extLst>
                 </a:gridCol>
                 <a:gridCol w="464546">
                   <a:extLst>
                     <a:ext uri="{9D8B030D-6E8A-4147-A177-3AD203B41FA5}">
-                      <a16:colId xmlns:a16="http://schemas.microsoft.com/office/drawing/2014/main" xmlns="" val="3450995975"/>
+                      <a16:colId xmlns:a16="http://schemas.microsoft.com/office/drawing/2014/main" val="3450995975"/>
                     </a:ext>
                   </a:extLst>
                 </a:gridCol>
                 <a:gridCol w="464546">
                   <a:extLst>
                     <a:ext uri="{9D8B030D-6E8A-4147-A177-3AD203B41FA5}">
-                      <a16:colId xmlns:a16="http://schemas.microsoft.com/office/drawing/2014/main" xmlns="" val="84178246"/>
+                      <a16:colId xmlns:a16="http://schemas.microsoft.com/office/drawing/2014/main" val="84178246"/>
                     </a:ext>
                   </a:extLst>
                 </a:gridCol>
                 <a:gridCol w="464546">
                   <a:extLst>
                     <a:ext uri="{9D8B030D-6E8A-4147-A177-3AD203B41FA5}">
-                      <a16:colId xmlns:a16="http://schemas.microsoft.com/office/drawing/2014/main" xmlns="" val="3444399563"/>
+                      <a16:colId xmlns:a16="http://schemas.microsoft.com/office/drawing/2014/main" val="3444399563"/>
                     </a:ext>
                   </a:extLst>
                 </a:gridCol>
                 <a:gridCol w="464546">
                   <a:extLst>
                     <a:ext uri="{9D8B030D-6E8A-4147-A177-3AD203B41FA5}">
-                      <a16:colId xmlns:a16="http://schemas.microsoft.com/office/drawing/2014/main" xmlns="" val="332534161"/>
+                      <a16:colId xmlns:a16="http://schemas.microsoft.com/office/drawing/2014/main" val="332534161"/>
                     </a:ext>
                   </a:extLst>
                 </a:gridCol>
                 <a:gridCol w="464546">
                   <a:extLst>
                     <a:ext uri="{9D8B030D-6E8A-4147-A177-3AD203B41FA5}">
-                      <a16:colId xmlns:a16="http://schemas.microsoft.com/office/drawing/2014/main" xmlns="" val="2290736699"/>
+                      <a16:colId xmlns:a16="http://schemas.microsoft.com/office/drawing/2014/main" val="2290736699"/>
                     </a:ext>
                   </a:extLst>
                 </a:gridCol>
                 <a:gridCol w="464546">
                   <a:extLst>
                     <a:ext uri="{9D8B030D-6E8A-4147-A177-3AD203B41FA5}">
-                      <a16:colId xmlns:a16="http://schemas.microsoft.com/office/drawing/2014/main" xmlns="" val="19451911"/>
+                      <a16:colId xmlns:a16="http://schemas.microsoft.com/office/drawing/2014/main" val="19451911"/>
                     </a:ext>
                   </a:extLst>
                 </a:gridCol>
                 <a:gridCol w="464546">
                   <a:extLst>
                     <a:ext uri="{9D8B030D-6E8A-4147-A177-3AD203B41FA5}">
-                      <a16:colId xmlns:a16="http://schemas.microsoft.com/office/drawing/2014/main" xmlns="" val="308529571"/>
+                      <a16:colId xmlns:a16="http://schemas.microsoft.com/office/drawing/2014/main" val="308529571"/>
                     </a:ext>
                   </a:extLst>
                 </a:gridCol>
                 <a:gridCol w="464546">
                   <a:extLst>
                     <a:ext uri="{9D8B030D-6E8A-4147-A177-3AD203B41FA5}">
-                      <a16:colId xmlns:a16="http://schemas.microsoft.com/office/drawing/2014/main" xmlns="" val="1626105078"/>
+                      <a16:colId xmlns:a16="http://schemas.microsoft.com/office/drawing/2014/main" val="1626105078"/>
                     </a:ext>
                   </a:extLst>
                 </a:gridCol>
                 <a:gridCol w="464546">
                   <a:extLst>
                     <a:ext uri="{9D8B030D-6E8A-4147-A177-3AD203B41FA5}">
-                      <a16:colId xmlns:a16="http://schemas.microsoft.com/office/drawing/2014/main" xmlns="" val="3796810149"/>
+                      <a16:colId xmlns:a16="http://schemas.microsoft.com/office/drawing/2014/main" val="3796810149"/>
                     </a:ext>
                   </a:extLst>
                 </a:gridCol>
                 <a:gridCol w="464546">
                   <a:extLst>
                     <a:ext uri="{9D8B030D-6E8A-4147-A177-3AD203B41FA5}">
-                      <a16:colId xmlns:a16="http://schemas.microsoft.com/office/drawing/2014/main" xmlns="" val="1772219669"/>
+                      <a16:colId xmlns:a16="http://schemas.microsoft.com/office/drawing/2014/main" val="1772219669"/>
                     </a:ext>
                   </a:extLst>
                 </a:gridCol>
                 <a:gridCol w="464546">
                   <a:extLst>
                     <a:ext uri="{9D8B030D-6E8A-4147-A177-3AD203B41FA5}">
-                      <a16:colId xmlns:a16="http://schemas.microsoft.com/office/drawing/2014/main" xmlns="" val="1327067936"/>
+                      <a16:colId xmlns:a16="http://schemas.microsoft.com/office/drawing/2014/main" val="1327067936"/>
                     </a:ext>
                   </a:extLst>
                 </a:gridCol>
                 <a:gridCol w="464546">
                   <a:extLst>
                     <a:ext uri="{9D8B030D-6E8A-4147-A177-3AD203B41FA5}">
-                      <a16:colId xmlns:a16="http://schemas.microsoft.com/office/drawing/2014/main" xmlns="" val="57842469"/>
+                      <a16:colId xmlns:a16="http://schemas.microsoft.com/office/drawing/2014/main" val="57842469"/>
                     </a:ext>
                   </a:extLst>
                 </a:gridCol>
                 <a:gridCol w="464546">
                   <a:extLst>
                     <a:ext uri="{9D8B030D-6E8A-4147-A177-3AD203B41FA5}">
-                      <a16:colId xmlns:a16="http://schemas.microsoft.com/office/drawing/2014/main" xmlns="" val="2526297131"/>
+                      <a16:colId xmlns:a16="http://schemas.microsoft.com/office/drawing/2014/main" val="2526297131"/>
                     </a:ext>
                   </a:extLst>
                 </a:gridCol>
                 <a:gridCol w="464546">
                   <a:extLst>
                     <a:ext uri="{9D8B030D-6E8A-4147-A177-3AD203B41FA5}">
-                      <a16:colId xmlns:a16="http://schemas.microsoft.com/office/drawing/2014/main" xmlns="" val="4184108719"/>
+                      <a16:colId xmlns:a16="http://schemas.microsoft.com/office/drawing/2014/main" val="4184108719"/>
                     </a:ext>
                   </a:extLst>
                 </a:gridCol>
                 <a:gridCol w="464546">
                   <a:extLst>
                     <a:ext uri="{9D8B030D-6E8A-4147-A177-3AD203B41FA5}">
-                      <a16:colId xmlns:a16="http://schemas.microsoft.com/office/drawing/2014/main" xmlns="" val="2493287182"/>
+                      <a16:colId xmlns:a16="http://schemas.microsoft.com/office/drawing/2014/main" val="2493287182"/>
                     </a:ext>
                   </a:extLst>
                 </a:gridCol>
                 <a:gridCol w="464546">
                   <a:extLst>
                     <a:ext uri="{9D8B030D-6E8A-4147-A177-3AD203B41FA5}">
-                      <a16:colId xmlns:a16="http://schemas.microsoft.com/office/drawing/2014/main" xmlns="" val="4018964974"/>
+                      <a16:colId xmlns:a16="http://schemas.microsoft.com/office/drawing/2014/main" val="4018964974"/>
                     </a:ext>
                   </a:extLst>
                 </a:gridCol>
                 <a:gridCol w="464546">
                   <a:extLst>
                     <a:ext uri="{9D8B030D-6E8A-4147-A177-3AD203B41FA5}">
-                      <a16:colId xmlns:a16="http://schemas.microsoft.com/office/drawing/2014/main" xmlns="" val="3303023726"/>
+                      <a16:colId xmlns:a16="http://schemas.microsoft.com/office/drawing/2014/main" val="3303023726"/>
                     </a:ext>
                   </a:extLst>
                 </a:gridCol>
                 <a:gridCol w="464546">
                   <a:extLst>
                     <a:ext uri="{9D8B030D-6E8A-4147-A177-3AD203B41FA5}">
-                      <a16:colId xmlns:a16="http://schemas.microsoft.com/office/drawing/2014/main" xmlns="" val="1047346888"/>
+                      <a16:colId xmlns:a16="http://schemas.microsoft.com/office/drawing/2014/main" val="1047346888"/>
                     </a:ext>
                   </a:extLst>
                 </a:gridCol>
                 <a:gridCol w="464546">
                   <a:extLst>
                     <a:ext uri="{9D8B030D-6E8A-4147-A177-3AD203B41FA5}">
-                      <a16:colId xmlns:a16="http://schemas.microsoft.com/office/drawing/2014/main" xmlns="" val="3175573251"/>
+                      <a16:colId xmlns:a16="http://schemas.microsoft.com/office/drawing/2014/main" val="3175573251"/>
                     </a:ext>
                   </a:extLst>
                 </a:gridCol>
                 <a:gridCol w="464546">
                   <a:extLst>
                     <a:ext uri="{9D8B030D-6E8A-4147-A177-3AD203B41FA5}">
-                      <a16:colId xmlns:a16="http://schemas.microsoft.com/office/drawing/2014/main" xmlns="" val="4176778861"/>
+                      <a16:colId xmlns:a16="http://schemas.microsoft.com/office/drawing/2014/main" val="4176778861"/>
                     </a:ext>
                   </a:extLst>
                 </a:gridCol>
                 <a:gridCol w="464546">
                   <a:extLst>
                     <a:ext uri="{9D8B030D-6E8A-4147-A177-3AD203B41FA5}">
-                      <a16:colId xmlns:a16="http://schemas.microsoft.com/office/drawing/2014/main" xmlns="" val="1113466877"/>
+                      <a16:colId xmlns:a16="http://schemas.microsoft.com/office/drawing/2014/main" val="1113466877"/>
                     </a:ext>
                   </a:extLst>
                 </a:gridCol>
                 <a:gridCol w="464546">
                   <a:extLst>
                     <a:ext uri="{9D8B030D-6E8A-4147-A177-3AD203B41FA5}">
-                      <a16:colId xmlns:a16="http://schemas.microsoft.com/office/drawing/2014/main" xmlns="" val="446932511"/>
+                      <a16:colId xmlns:a16="http://schemas.microsoft.com/office/drawing/2014/main" val="446932511"/>
                     </a:ext>
                   </a:extLst>
                 </a:gridCol>
                 <a:gridCol w="464546">
                   <a:extLst>
                     <a:ext uri="{9D8B030D-6E8A-4147-A177-3AD203B41FA5}">
-                      <a16:colId xmlns:a16="http://schemas.microsoft.com/office/drawing/2014/main" xmlns="" val="290695333"/>
+                      <a16:colId xmlns:a16="http://schemas.microsoft.com/office/drawing/2014/main" val="290695333"/>
                     </a:ext>
                   </a:extLst>
                 </a:gridCol>
@@ -5189,10 +5164,9 @@
                     <a:p>
                       <a:pPr algn="ctr"/>
                       <a:r>
-                        <a:rPr lang="nb-NO" dirty="0" smtClean="0"/>
+                        <a:rPr lang="nb-NO" dirty="0"/>
                         <a:t>1</a:t>
                       </a:r>
-                      <a:endParaRPr lang="nb-NO" dirty="0"/>
                     </a:p>
                   </a:txBody>
                   <a:tcPr>
@@ -5208,10 +5182,9 @@
                     <a:p>
                       <a:pPr algn="ctr"/>
                       <a:r>
-                        <a:rPr lang="nb-NO" dirty="0" smtClean="0"/>
+                        <a:rPr lang="nb-NO" dirty="0"/>
                         <a:t>2</a:t>
                       </a:r>
-                      <a:endParaRPr lang="nb-NO" dirty="0"/>
                     </a:p>
                   </a:txBody>
                   <a:tcPr>
@@ -5227,10 +5200,9 @@
                     <a:p>
                       <a:pPr algn="ctr"/>
                       <a:r>
-                        <a:rPr lang="nb-NO" dirty="0" smtClean="0"/>
+                        <a:rPr lang="nb-NO" dirty="0"/>
                         <a:t>3</a:t>
                       </a:r>
-                      <a:endParaRPr lang="nb-NO" dirty="0"/>
                     </a:p>
                   </a:txBody>
                   <a:tcPr>
@@ -5246,10 +5218,9 @@
                     <a:p>
                       <a:pPr algn="ctr"/>
                       <a:r>
-                        <a:rPr lang="nb-NO" dirty="0" smtClean="0"/>
+                        <a:rPr lang="nb-NO" dirty="0"/>
                         <a:t>4</a:t>
                       </a:r>
-                      <a:endParaRPr lang="nb-NO" dirty="0"/>
                     </a:p>
                   </a:txBody>
                   <a:tcPr>
@@ -5265,10 +5236,9 @@
                     <a:p>
                       <a:pPr algn="ctr"/>
                       <a:r>
-                        <a:rPr lang="nb-NO" dirty="0" smtClean="0"/>
+                        <a:rPr lang="nb-NO" dirty="0"/>
                         <a:t>5</a:t>
                       </a:r>
-                      <a:endParaRPr lang="nb-NO" dirty="0"/>
                     </a:p>
                   </a:txBody>
                   <a:tcPr>
@@ -5284,7 +5254,7 @@
                     <a:p>
                       <a:pPr algn="ctr"/>
                       <a:r>
-                        <a:rPr lang="nb-NO" sz="800" dirty="0" smtClean="0"/>
+                        <a:rPr lang="nb-NO" sz="800" dirty="0"/>
                         <a:t>empty</a:t>
                       </a:r>
                       <a:endParaRPr lang="nb-NO" dirty="0"/>
@@ -5303,10 +5273,9 @@
                     <a:p>
                       <a:pPr algn="ctr"/>
                       <a:r>
-                        <a:rPr lang="nb-NO" dirty="0" smtClean="0"/>
+                        <a:rPr lang="nb-NO" dirty="0"/>
                         <a:t>1</a:t>
                       </a:r>
-                      <a:endParaRPr lang="nb-NO" dirty="0"/>
                     </a:p>
                   </a:txBody>
                   <a:tcPr>
@@ -5322,10 +5291,9 @@
                     <a:p>
                       <a:pPr algn="ctr"/>
                       <a:r>
-                        <a:rPr lang="nb-NO" dirty="0" smtClean="0"/>
+                        <a:rPr lang="nb-NO" dirty="0"/>
                         <a:t>2</a:t>
                       </a:r>
-                      <a:endParaRPr lang="nb-NO" dirty="0"/>
                     </a:p>
                   </a:txBody>
                   <a:tcPr>
@@ -5341,10 +5309,9 @@
                     <a:p>
                       <a:pPr algn="ctr"/>
                       <a:r>
-                        <a:rPr lang="nb-NO" dirty="0" smtClean="0"/>
+                        <a:rPr lang="nb-NO" dirty="0"/>
                         <a:t>3</a:t>
                       </a:r>
-                      <a:endParaRPr lang="nb-NO" dirty="0"/>
                     </a:p>
                   </a:txBody>
                   <a:tcPr>
@@ -5360,10 +5327,9 @@
                     <a:p>
                       <a:pPr algn="ctr"/>
                       <a:r>
-                        <a:rPr lang="nb-NO" dirty="0" smtClean="0"/>
+                        <a:rPr lang="nb-NO" dirty="0"/>
                         <a:t>4</a:t>
                       </a:r>
-                      <a:endParaRPr lang="nb-NO" dirty="0"/>
                     </a:p>
                   </a:txBody>
                   <a:tcPr>
@@ -5379,10 +5345,9 @@
                     <a:p>
                       <a:pPr algn="ctr"/>
                       <a:r>
-                        <a:rPr lang="nb-NO" dirty="0" smtClean="0"/>
+                        <a:rPr lang="nb-NO" dirty="0"/>
                         <a:t>5</a:t>
                       </a:r>
-                      <a:endParaRPr lang="nb-NO" dirty="0"/>
                     </a:p>
                   </a:txBody>
                   <a:tcPr>
@@ -5398,7 +5363,7 @@
                     <a:p>
                       <a:pPr algn="ctr"/>
                       <a:r>
-                        <a:rPr lang="nb-NO" sz="800" dirty="0" smtClean="0"/>
+                        <a:rPr lang="nb-NO" sz="800" dirty="0"/>
                         <a:t>empty</a:t>
                       </a:r>
                       <a:endParaRPr lang="nb-NO" dirty="0"/>
@@ -5417,10 +5382,9 @@
                     <a:p>
                       <a:pPr algn="ctr"/>
                       <a:r>
-                        <a:rPr lang="nb-NO" dirty="0" smtClean="0"/>
+                        <a:rPr lang="nb-NO" dirty="0"/>
                         <a:t>1</a:t>
                       </a:r>
-                      <a:endParaRPr lang="nb-NO" dirty="0"/>
                     </a:p>
                   </a:txBody>
                   <a:tcPr>
@@ -5436,10 +5400,9 @@
                     <a:p>
                       <a:pPr algn="ctr"/>
                       <a:r>
-                        <a:rPr lang="nb-NO" dirty="0" smtClean="0"/>
+                        <a:rPr lang="nb-NO" dirty="0"/>
                         <a:t>2</a:t>
                       </a:r>
-                      <a:endParaRPr lang="nb-NO" dirty="0"/>
                     </a:p>
                   </a:txBody>
                   <a:tcPr>
@@ -5455,10 +5418,9 @@
                     <a:p>
                       <a:pPr algn="ctr"/>
                       <a:r>
-                        <a:rPr lang="nb-NO" dirty="0" smtClean="0"/>
+                        <a:rPr lang="nb-NO" dirty="0"/>
                         <a:t>3</a:t>
                       </a:r>
-                      <a:endParaRPr lang="nb-NO" dirty="0"/>
                     </a:p>
                   </a:txBody>
                   <a:tcPr>
@@ -5474,10 +5436,9 @@
                     <a:p>
                       <a:pPr algn="ctr"/>
                       <a:r>
-                        <a:rPr lang="nb-NO" dirty="0" smtClean="0"/>
+                        <a:rPr lang="nb-NO" dirty="0"/>
                         <a:t>4</a:t>
                       </a:r>
-                      <a:endParaRPr lang="nb-NO" dirty="0"/>
                     </a:p>
                   </a:txBody>
                   <a:tcPr>
@@ -5493,10 +5454,9 @@
                     <a:p>
                       <a:pPr algn="ctr"/>
                       <a:r>
-                        <a:rPr lang="nb-NO" dirty="0" smtClean="0"/>
+                        <a:rPr lang="nb-NO" dirty="0"/>
                         <a:t>5</a:t>
                       </a:r>
-                      <a:endParaRPr lang="nb-NO" dirty="0"/>
                     </a:p>
                   </a:txBody>
                   <a:tcPr>
@@ -5512,7 +5472,7 @@
                     <a:p>
                       <a:pPr algn="ctr"/>
                       <a:r>
-                        <a:rPr lang="nb-NO" sz="800" dirty="0" smtClean="0"/>
+                        <a:rPr lang="nb-NO" sz="800" dirty="0"/>
                         <a:t>empty</a:t>
                       </a:r>
                       <a:endParaRPr lang="nb-NO" dirty="0"/>
@@ -5531,10 +5491,9 @@
                     <a:p>
                       <a:pPr algn="ctr"/>
                       <a:r>
-                        <a:rPr lang="nb-NO" dirty="0" smtClean="0"/>
+                        <a:rPr lang="nb-NO" dirty="0"/>
                         <a:t>1</a:t>
                       </a:r>
-                      <a:endParaRPr lang="nb-NO" dirty="0"/>
                     </a:p>
                   </a:txBody>
                   <a:tcPr>
@@ -5550,10 +5509,9 @@
                     <a:p>
                       <a:pPr algn="ctr"/>
                       <a:r>
-                        <a:rPr lang="nb-NO" dirty="0" smtClean="0"/>
+                        <a:rPr lang="nb-NO" dirty="0"/>
                         <a:t>2</a:t>
                       </a:r>
-                      <a:endParaRPr lang="nb-NO" dirty="0"/>
                     </a:p>
                   </a:txBody>
                   <a:tcPr>
@@ -5569,10 +5527,9 @@
                     <a:p>
                       <a:pPr algn="ctr"/>
                       <a:r>
-                        <a:rPr lang="nb-NO" dirty="0" smtClean="0"/>
+                        <a:rPr lang="nb-NO" dirty="0"/>
                         <a:t>3</a:t>
                       </a:r>
-                      <a:endParaRPr lang="nb-NO" dirty="0"/>
                     </a:p>
                   </a:txBody>
                   <a:tcPr>
@@ -5588,10 +5545,9 @@
                     <a:p>
                       <a:pPr algn="ctr"/>
                       <a:r>
-                        <a:rPr lang="nb-NO" dirty="0" smtClean="0"/>
+                        <a:rPr lang="nb-NO" dirty="0"/>
                         <a:t>4</a:t>
                       </a:r>
-                      <a:endParaRPr lang="nb-NO" dirty="0"/>
                     </a:p>
                   </a:txBody>
                   <a:tcPr>
@@ -5607,10 +5563,9 @@
                     <a:p>
                       <a:pPr algn="ctr"/>
                       <a:r>
-                        <a:rPr lang="nb-NO" dirty="0" smtClean="0"/>
+                        <a:rPr lang="nb-NO" dirty="0"/>
                         <a:t>5</a:t>
                       </a:r>
-                      <a:endParaRPr lang="nb-NO" dirty="0"/>
                     </a:p>
                   </a:txBody>
                   <a:tcPr>
@@ -5626,7 +5581,7 @@
                     <a:p>
                       <a:pPr algn="ctr"/>
                       <a:r>
-                        <a:rPr lang="nb-NO" sz="800" dirty="0" smtClean="0"/>
+                        <a:rPr lang="nb-NO" sz="800" dirty="0"/>
                         <a:t>empty</a:t>
                       </a:r>
                       <a:endParaRPr lang="nb-NO" dirty="0"/>
@@ -5655,7 +5610,7 @@
                 </a:tc>
                 <a:extLst>
                   <a:ext uri="{0D108BD9-81ED-4DB2-BD59-A6C34878D82A}">
-                    <a16:rowId xmlns:a16="http://schemas.microsoft.com/office/drawing/2014/main" xmlns="" val="2941513846"/>
+                    <a16:rowId xmlns:a16="http://schemas.microsoft.com/office/drawing/2014/main" val="2941513846"/>
                   </a:ext>
                 </a:extLst>
               </a:tr>
@@ -5668,7 +5623,7 @@
           <p:cNvPr id="19" name="Picture 18">
             <a:extLst>
               <a:ext uri="{FF2B5EF4-FFF2-40B4-BE49-F238E27FC236}">
-                <a16:creationId xmlns:a16="http://schemas.microsoft.com/office/drawing/2014/main" xmlns="" id="{590133A9-43B3-4ACA-8B6A-AC7C02124269}"/>
+                <a16:creationId xmlns:a16="http://schemas.microsoft.com/office/drawing/2014/main" id="{590133A9-43B3-4ACA-8B6A-AC7C02124269}"/>
               </a:ext>
             </a:extLst>
           </p:cNvPr>
@@ -5698,7 +5653,7 @@
           <p:cNvPr id="21" name="Picture 20">
             <a:extLst>
               <a:ext uri="{FF2B5EF4-FFF2-40B4-BE49-F238E27FC236}">
-                <a16:creationId xmlns:a16="http://schemas.microsoft.com/office/drawing/2014/main" xmlns="" id="{590133A9-43B3-4ACA-8B6A-AC7C02124269}"/>
+                <a16:creationId xmlns:a16="http://schemas.microsoft.com/office/drawing/2014/main" id="{590133A9-43B3-4ACA-8B6A-AC7C02124269}"/>
               </a:ext>
             </a:extLst>
           </p:cNvPr>
@@ -5728,7 +5683,7 @@
           <p:cNvPr id="22" name="Picture 21">
             <a:extLst>
               <a:ext uri="{FF2B5EF4-FFF2-40B4-BE49-F238E27FC236}">
-                <a16:creationId xmlns:a16="http://schemas.microsoft.com/office/drawing/2014/main" xmlns="" id="{590133A9-43B3-4ACA-8B6A-AC7C02124269}"/>
+                <a16:creationId xmlns:a16="http://schemas.microsoft.com/office/drawing/2014/main" id="{590133A9-43B3-4ACA-8B6A-AC7C02124269}"/>
               </a:ext>
             </a:extLst>
           </p:cNvPr>
@@ -5758,7 +5713,7 @@
           <p:cNvPr id="23" name="Picture 22">
             <a:extLst>
               <a:ext uri="{FF2B5EF4-FFF2-40B4-BE49-F238E27FC236}">
-                <a16:creationId xmlns:a16="http://schemas.microsoft.com/office/drawing/2014/main" xmlns="" id="{590133A9-43B3-4ACA-8B6A-AC7C02124269}"/>
+                <a16:creationId xmlns:a16="http://schemas.microsoft.com/office/drawing/2014/main" id="{590133A9-43B3-4ACA-8B6A-AC7C02124269}"/>
               </a:ext>
             </a:extLst>
           </p:cNvPr>
@@ -5806,14 +5761,9 @@
           <a:lstStyle/>
           <a:p>
             <a:r>
-              <a:rPr lang="nb-NO" dirty="0" smtClean="0"/>
-              <a:t>Round </a:t>
-            </a:r>
-            <a:r>
-              <a:rPr lang="nb-NO" dirty="0" smtClean="0"/>
-              <a:t>k-3</a:t>
-            </a:r>
-            <a:endParaRPr lang="nb-NO" dirty="0"/>
+              <a:rPr lang="nb-NO" dirty="0"/>
+              <a:t>Round k-3</a:t>
+            </a:r>
           </a:p>
         </p:txBody>
       </p:sp>
@@ -5840,18 +5790,9 @@
           <a:lstStyle/>
           <a:p>
             <a:r>
-              <a:rPr lang="nb-NO" dirty="0" smtClean="0"/>
-              <a:t>Round </a:t>
-            </a:r>
-            <a:r>
-              <a:rPr lang="nb-NO" dirty="0" smtClean="0"/>
-              <a:t>k</a:t>
-            </a:r>
-            <a:r>
-              <a:rPr lang="nb-NO" dirty="0" smtClean="0"/>
-              <a:t>-2</a:t>
-            </a:r>
-            <a:endParaRPr lang="nb-NO" dirty="0"/>
+              <a:rPr lang="nb-NO" dirty="0"/>
+              <a:t>Round k-2</a:t>
+            </a:r>
           </a:p>
         </p:txBody>
       </p:sp>
@@ -5878,18 +5819,9 @@
           <a:lstStyle/>
           <a:p>
             <a:r>
-              <a:rPr lang="nb-NO" dirty="0" smtClean="0"/>
-              <a:t>Round </a:t>
-            </a:r>
-            <a:r>
-              <a:rPr lang="nb-NO" dirty="0" smtClean="0"/>
-              <a:t>k</a:t>
-            </a:r>
-            <a:r>
-              <a:rPr lang="nb-NO" dirty="0" smtClean="0"/>
-              <a:t>-1</a:t>
-            </a:r>
-            <a:endParaRPr lang="nb-NO" dirty="0"/>
+              <a:rPr lang="nb-NO" dirty="0"/>
+              <a:t>Round k-1</a:t>
+            </a:r>
           </a:p>
         </p:txBody>
       </p:sp>
@@ -5916,14 +5848,9 @@
           <a:lstStyle/>
           <a:p>
             <a:r>
-              <a:rPr lang="nb-NO" dirty="0" smtClean="0"/>
-              <a:t>Round </a:t>
-            </a:r>
-            <a:r>
-              <a:rPr lang="nb-NO" dirty="0" smtClean="0"/>
-              <a:t>k</a:t>
-            </a:r>
-            <a:endParaRPr lang="nb-NO" dirty="0"/>
+              <a:rPr lang="nb-NO" dirty="0"/>
+              <a:t>Round k</a:t>
+            </a:r>
           </a:p>
         </p:txBody>
       </p:sp>
@@ -5954,8 +5881,8 @@
               <a:buChar char="•"/>
             </a:pPr>
             <a:r>
-              <a:rPr lang="nb-NO" sz="1200" dirty="0" smtClean="0"/>
-              <a:t>Masternodes run both chains (PoW and PoS)</a:t>
+              <a:rPr lang="nb-NO" sz="1200" dirty="0"/>
+              <a:t>Hypernodes run both chains (PoW and PoS)</a:t>
             </a:r>
           </a:p>
           <a:p>
@@ -5964,8 +5891,8 @@
               <a:buChar char="•"/>
             </a:pPr>
             <a:r>
-              <a:rPr lang="nb-NO" sz="1200" dirty="0" smtClean="0"/>
-              <a:t>Masternodes are registered on the PoW chain (BIS address + IP-address)</a:t>
+              <a:rPr lang="nb-NO" sz="1200" dirty="0"/>
+              <a:t>Hypernodes are registered on the PoW chain (BIS address + IP-address)</a:t>
             </a:r>
           </a:p>
           <a:p>
@@ -5974,36 +5901,8 @@
               <a:buChar char="•"/>
             </a:pPr>
             <a:r>
-              <a:rPr lang="en-US" sz="1200" dirty="0" smtClean="0"/>
-              <a:t>A </a:t>
-            </a:r>
-            <a:r>
               <a:rPr lang="en-US" sz="1200" dirty="0"/>
-              <a:t>subset of </a:t>
-            </a:r>
-            <a:r>
-              <a:rPr lang="en-US" sz="1200" dirty="0" err="1" smtClean="0"/>
-              <a:t>Masternodes</a:t>
-            </a:r>
-            <a:r>
-              <a:rPr lang="en-US" sz="1200" dirty="0" smtClean="0"/>
-              <a:t> </a:t>
-            </a:r>
-            <a:r>
-              <a:rPr lang="en-US" sz="1200" dirty="0"/>
-              <a:t>is </a:t>
-            </a:r>
-            <a:r>
-              <a:rPr lang="en-US" sz="1200" dirty="0" smtClean="0"/>
-              <a:t>chosen </a:t>
-            </a:r>
-            <a:r>
-              <a:rPr lang="en-US" sz="1200" dirty="0"/>
-              <a:t>for each round (</a:t>
-            </a:r>
-            <a:r>
-              <a:rPr lang="en-US" sz="1200" dirty="0" smtClean="0"/>
-              <a:t>jurors)</a:t>
+              <a:t>A subset of Hypernodes is chosen for each round (jurors)</a:t>
             </a:r>
           </a:p>
           <a:p>
@@ -6012,36 +5911,8 @@
               <a:buChar char="•"/>
             </a:pPr>
             <a:r>
-              <a:rPr lang="en-US" sz="1200" dirty="0" smtClean="0"/>
-              <a:t>The jurors are responsible </a:t>
-            </a:r>
-            <a:r>
               <a:rPr lang="en-US" sz="1200" dirty="0"/>
-              <a:t>for forging blocks, with </a:t>
-            </a:r>
-            <a:r>
-              <a:rPr lang="en-US" sz="1200" dirty="0" smtClean="0"/>
-              <a:t>transactions </a:t>
-            </a:r>
-            <a:r>
-              <a:rPr lang="en-US" sz="1200" dirty="0"/>
-              <a:t>from every </a:t>
-            </a:r>
-            <a:r>
-              <a:rPr lang="en-US" sz="1200" dirty="0" err="1" smtClean="0"/>
-              <a:t>Masternode</a:t>
-            </a:r>
-            <a:r>
-              <a:rPr lang="en-US" sz="1200" dirty="0" smtClean="0"/>
-              <a:t>, </a:t>
-            </a:r>
-            <a:r>
-              <a:rPr lang="en-US" sz="1200" dirty="0"/>
-              <a:t>jurors or </a:t>
-            </a:r>
-            <a:r>
-              <a:rPr lang="en-US" sz="1200" dirty="0" smtClean="0"/>
-              <a:t>not</a:t>
+              <a:t>The jurors are responsible for forging blocks, with transactions from every Hypernode, jurors or not</a:t>
             </a:r>
           </a:p>
           <a:p>
@@ -6051,19 +5922,7 @@
             </a:pPr>
             <a:r>
               <a:rPr lang="nb-NO" sz="1200" dirty="0"/>
-              <a:t>Each PoS slot gets assigned a Masternode Tester </a:t>
-            </a:r>
-            <a:r>
-              <a:rPr lang="nb-NO" sz="1200" dirty="0" smtClean="0"/>
-              <a:t>(A) and </a:t>
-            </a:r>
-            <a:r>
-              <a:rPr lang="nb-NO" sz="1200" dirty="0"/>
-              <a:t>a Masternode </a:t>
-            </a:r>
-            <a:r>
-              <a:rPr lang="nb-NO" sz="1200" dirty="0" smtClean="0"/>
-              <a:t>Testee (B)</a:t>
+              <a:t>Each PoS slot gets assigned a Hypernode Tester (A) and a Hypernode Testee (B)</a:t>
             </a:r>
           </a:p>
           <a:p>
@@ -6084,11 +5943,7 @@
             </a:pPr>
             <a:r>
               <a:rPr lang="nb-NO" sz="1200" dirty="0"/>
-              <a:t>In each round the slots are assigned to new </a:t>
-            </a:r>
-            <a:r>
-              <a:rPr lang="nb-NO" sz="1200" dirty="0" smtClean="0"/>
-              <a:t>Masternodes</a:t>
+              <a:t>In each round the slots are assigned to new Hypernodes</a:t>
             </a:r>
           </a:p>
           <a:p>
@@ -6097,10 +5952,9 @@
               <a:buChar char="•"/>
             </a:pPr>
             <a:r>
-              <a:rPr lang="nb-NO" sz="1200" dirty="0" smtClean="0"/>
+              <a:rPr lang="nb-NO" sz="1200" dirty="0"/>
               <a:t>The last (empty) slot in each round is used for reaching consensus</a:t>
             </a:r>
-            <a:endParaRPr lang="nb-NO" sz="1200" dirty="0"/>
           </a:p>
         </p:txBody>
       </p:sp>
@@ -6193,7 +6047,7 @@
           <a:lstStyle/>
           <a:p>
             <a:r>
-              <a:rPr lang="nb-NO" sz="1200" dirty="0" smtClean="0"/>
+              <a:rPr lang="nb-NO" sz="1200" dirty="0"/>
               <a:t>Slot numbers in a round</a:t>
             </a:r>
           </a:p>
@@ -6239,17 +6093,16 @@
           <a:p>
             <a:pPr algn="ctr"/>
             <a:r>
-              <a:rPr lang="nb-NO" sz="1200" dirty="0" smtClean="0"/>
-              <a:t>Masternode</a:t>
+              <a:rPr lang="nb-NO" sz="1200" dirty="0"/>
+              <a:t>Hypernode</a:t>
             </a:r>
           </a:p>
           <a:p>
             <a:pPr algn="ctr"/>
             <a:r>
-              <a:rPr lang="nb-NO" sz="1200" dirty="0" smtClean="0"/>
+              <a:rPr lang="nb-NO" sz="1200" dirty="0"/>
               <a:t>Tester (A)</a:t>
             </a:r>
-            <a:endParaRPr lang="nb-NO" sz="1200" dirty="0"/>
           </a:p>
         </p:txBody>
       </p:sp>
@@ -6293,17 +6146,16 @@
           <a:p>
             <a:pPr algn="ctr"/>
             <a:r>
-              <a:rPr lang="nb-NO" sz="1200" dirty="0" smtClean="0"/>
-              <a:t>Masternode</a:t>
+              <a:rPr lang="nb-NO" sz="1200" dirty="0"/>
+              <a:t>Hypernode</a:t>
             </a:r>
           </a:p>
           <a:p>
             <a:pPr algn="ctr"/>
             <a:r>
-              <a:rPr lang="nb-NO" sz="1200" dirty="0" smtClean="0"/>
+              <a:rPr lang="nb-NO" sz="1200" dirty="0"/>
               <a:t>Testee (B)</a:t>
             </a:r>
-            <a:endParaRPr lang="nb-NO" sz="1200" dirty="0"/>
           </a:p>
         </p:txBody>
       </p:sp>
@@ -6676,7 +6528,7 @@
           <a:lstStyle/>
           <a:p>
             <a:r>
-              <a:rPr lang="nb-NO" sz="1200" dirty="0" smtClean="0"/>
+              <a:rPr lang="nb-NO" sz="1200" dirty="0"/>
               <a:t>Two transactions with results of tests</a:t>
             </a:r>
           </a:p>
@@ -6739,7 +6591,7 @@
               <a:buChar char="•"/>
             </a:pPr>
             <a:r>
-              <a:rPr lang="nb-NO" sz="1200" dirty="0" smtClean="0"/>
+              <a:rPr lang="nb-NO" sz="1200" dirty="0"/>
               <a:t>A broadhash is created for the previous round on the PoS network</a:t>
             </a:r>
           </a:p>
@@ -6749,24 +6601,12 @@
               <a:buChar char="•"/>
             </a:pPr>
             <a:r>
-              <a:rPr lang="nb-NO" sz="1200" dirty="0" smtClean="0"/>
-              <a:t>Each Masternode receives one or more tickets </a:t>
+              <a:rPr lang="nb-NO" sz="1200" dirty="0"/>
+              <a:t>Each Hypernode receives one or more tickets </a:t>
             </a:r>
             <a:r>
               <a:rPr lang="en-US" sz="1200" dirty="0"/>
-              <a:t>depending of its weight (can be </a:t>
-            </a:r>
-            <a:r>
-              <a:rPr lang="en-US" sz="1200" dirty="0" smtClean="0"/>
-              <a:t>collateral/10k </a:t>
-            </a:r>
-            <a:r>
-              <a:rPr lang="en-US" sz="1200" dirty="0"/>
-              <a:t>or more evolved metric</a:t>
-            </a:r>
-            <a:r>
-              <a:rPr lang="en-US" sz="1200" dirty="0" smtClean="0"/>
-              <a:t>)</a:t>
+              <a:t>depending of its weight (can be collateral/10k or more evolved metric)</a:t>
             </a:r>
           </a:p>
           <a:p>
@@ -6775,11 +6615,11 @@
               <a:buChar char="•"/>
             </a:pPr>
             <a:r>
-              <a:rPr lang="en-US" sz="1200" dirty="0" smtClean="0"/>
+              <a:rPr lang="en-US" sz="1200" dirty="0"/>
               <a:t>The jurors are selected based on the distance of the tickets to the </a:t>
             </a:r>
             <a:r>
-              <a:rPr lang="en-US" sz="1200" dirty="0" err="1" smtClean="0"/>
+              <a:rPr lang="en-US" sz="1200" dirty="0" err="1"/>
               <a:t>broadhash</a:t>
             </a:r>
             <a:endParaRPr lang="nb-NO" sz="1200" dirty="0"/>
@@ -6826,8 +6666,8 @@
           <a:p>
             <a:pPr algn="ctr"/>
             <a:r>
-              <a:rPr lang="nb-NO" sz="1200" dirty="0" smtClean="0"/>
-              <a:t>Masternode</a:t>
+              <a:rPr lang="nb-NO" sz="1200" dirty="0"/>
+              <a:t>Hypernode</a:t>
             </a:r>
           </a:p>
           <a:p>
@@ -6879,17 +6719,16 @@
           <a:p>
             <a:pPr algn="ctr"/>
             <a:r>
-              <a:rPr lang="nb-NO" sz="1200" dirty="0" smtClean="0"/>
-              <a:t>Masternode</a:t>
+              <a:rPr lang="nb-NO" sz="1200" dirty="0"/>
+              <a:t>Hypernode</a:t>
             </a:r>
           </a:p>
           <a:p>
             <a:pPr algn="ctr"/>
             <a:r>
-              <a:rPr lang="nb-NO" sz="1200" dirty="0" smtClean="0"/>
+              <a:rPr lang="nb-NO" sz="1200" dirty="0"/>
               <a:t>2</a:t>
             </a:r>
-            <a:endParaRPr lang="nb-NO" sz="1200" dirty="0"/>
           </a:p>
         </p:txBody>
       </p:sp>
@@ -6933,17 +6772,16 @@
           <a:p>
             <a:pPr algn="ctr"/>
             <a:r>
-              <a:rPr lang="nb-NO" sz="1200" dirty="0" smtClean="0"/>
-              <a:t>Masternode</a:t>
+              <a:rPr lang="nb-NO" sz="1200" dirty="0"/>
+              <a:t>Hypernode</a:t>
             </a:r>
           </a:p>
           <a:p>
             <a:pPr algn="ctr"/>
             <a:r>
-              <a:rPr lang="nb-NO" sz="1200" dirty="0" smtClean="0"/>
+              <a:rPr lang="nb-NO" sz="1200" dirty="0"/>
               <a:t>3</a:t>
             </a:r>
-            <a:endParaRPr lang="nb-NO" sz="1200" dirty="0"/>
           </a:p>
         </p:txBody>
       </p:sp>
@@ -7020,8 +6858,8 @@
           <a:p>
             <a:pPr algn="ctr"/>
             <a:r>
-              <a:rPr lang="nb-NO" sz="1200" dirty="0" smtClean="0"/>
-              <a:t>Masternode</a:t>
+              <a:rPr lang="nb-NO" sz="1200" dirty="0"/>
+              <a:t>Hypernode</a:t>
             </a:r>
           </a:p>
           <a:p>
@@ -7073,7 +6911,7 @@
           <a:p>
             <a:pPr algn="ctr"/>
             <a:r>
-              <a:rPr lang="nb-NO" sz="1200" dirty="0" smtClean="0"/>
+              <a:rPr lang="nb-NO" sz="1200" dirty="0"/>
               <a:t>Ticket</a:t>
             </a:r>
           </a:p>
@@ -7126,17 +6964,16 @@
           <a:p>
             <a:pPr algn="ctr"/>
             <a:r>
-              <a:rPr lang="nb-NO" sz="1200" dirty="0" smtClean="0"/>
+              <a:rPr lang="nb-NO" sz="1200" dirty="0"/>
               <a:t>Ticket</a:t>
             </a:r>
           </a:p>
           <a:p>
             <a:pPr algn="ctr"/>
             <a:r>
-              <a:rPr lang="nb-NO" sz="1200" dirty="0" smtClean="0"/>
+              <a:rPr lang="nb-NO" sz="1200" dirty="0"/>
               <a:t>2</a:t>
             </a:r>
-            <a:endParaRPr lang="nb-NO" sz="1200" dirty="0"/>
           </a:p>
         </p:txBody>
       </p:sp>
@@ -7180,17 +7017,16 @@
           <a:p>
             <a:pPr algn="ctr"/>
             <a:r>
-              <a:rPr lang="nb-NO" sz="1200" dirty="0" smtClean="0"/>
+              <a:rPr lang="nb-NO" sz="1200" dirty="0"/>
               <a:t>Ticket</a:t>
             </a:r>
           </a:p>
           <a:p>
             <a:pPr algn="ctr"/>
             <a:r>
-              <a:rPr lang="nb-NO" sz="1200" dirty="0" smtClean="0"/>
+              <a:rPr lang="nb-NO" sz="1200" dirty="0"/>
               <a:t>3</a:t>
             </a:r>
-            <a:endParaRPr lang="nb-NO" sz="1200" dirty="0"/>
           </a:p>
         </p:txBody>
       </p:sp>
@@ -7234,17 +7070,16 @@
           <a:p>
             <a:pPr algn="ctr"/>
             <a:r>
-              <a:rPr lang="nb-NO" sz="1200" dirty="0" smtClean="0"/>
+              <a:rPr lang="nb-NO" sz="1200" dirty="0"/>
               <a:t>Ticket</a:t>
             </a:r>
           </a:p>
           <a:p>
             <a:pPr algn="ctr"/>
             <a:r>
-              <a:rPr lang="nb-NO" sz="1200" dirty="0" smtClean="0"/>
+              <a:rPr lang="nb-NO" sz="1200" dirty="0"/>
               <a:t>4</a:t>
             </a:r>
-            <a:endParaRPr lang="nb-NO" sz="1200" dirty="0"/>
           </a:p>
         </p:txBody>
       </p:sp>
@@ -7288,17 +7123,16 @@
           <a:p>
             <a:pPr algn="ctr"/>
             <a:r>
-              <a:rPr lang="nb-NO" sz="1200" dirty="0" smtClean="0"/>
+              <a:rPr lang="nb-NO" sz="1200" dirty="0"/>
               <a:t>Ticket</a:t>
             </a:r>
           </a:p>
           <a:p>
             <a:pPr algn="ctr"/>
             <a:r>
-              <a:rPr lang="nb-NO" sz="1200" dirty="0" smtClean="0"/>
+              <a:rPr lang="nb-NO" sz="1200" dirty="0"/>
               <a:t>M</a:t>
             </a:r>
-            <a:endParaRPr lang="nb-NO" sz="1200" dirty="0"/>
           </a:p>
         </p:txBody>
       </p:sp>
@@ -7527,10 +7361,9 @@
           <a:p>
             <a:pPr algn="ctr"/>
             <a:r>
-              <a:rPr lang="nb-NO" sz="1200" dirty="0" smtClean="0"/>
+              <a:rPr lang="nb-NO" sz="1200" dirty="0"/>
               <a:t>Sort tickets by distance to broadhash</a:t>
             </a:r>
-            <a:endParaRPr lang="nb-NO" sz="1200" dirty="0"/>
           </a:p>
         </p:txBody>
       </p:sp>
@@ -7574,17 +7407,16 @@
           <a:p>
             <a:pPr algn="ctr"/>
             <a:r>
-              <a:rPr lang="nb-NO" sz="1200" dirty="0" smtClean="0"/>
-              <a:t>Masternode</a:t>
+              <a:rPr lang="nb-NO" sz="1200" dirty="0"/>
+              <a:t>Hypernode</a:t>
             </a:r>
           </a:p>
           <a:p>
             <a:pPr algn="ctr"/>
             <a:r>
-              <a:rPr lang="nb-NO" sz="1200" dirty="0" smtClean="0"/>
+              <a:rPr lang="nb-NO" sz="1200" dirty="0"/>
               <a:t>Juror Slot 1</a:t>
             </a:r>
-            <a:endParaRPr lang="nb-NO" sz="1200" dirty="0"/>
           </a:p>
         </p:txBody>
       </p:sp>
@@ -7628,17 +7460,16 @@
           <a:p>
             <a:pPr algn="ctr"/>
             <a:r>
-              <a:rPr lang="nb-NO" sz="1200" dirty="0" smtClean="0"/>
-              <a:t>Masternode</a:t>
+              <a:rPr lang="nb-NO" sz="1200" dirty="0"/>
+              <a:t>Hypernode</a:t>
             </a:r>
           </a:p>
           <a:p>
             <a:pPr algn="ctr"/>
             <a:r>
-              <a:rPr lang="nb-NO" sz="1200" dirty="0" smtClean="0"/>
+              <a:rPr lang="nb-NO" sz="1200" dirty="0"/>
               <a:t>Juror Slot 2</a:t>
             </a:r>
-            <a:endParaRPr lang="nb-NO" sz="1200" dirty="0"/>
           </a:p>
         </p:txBody>
       </p:sp>
@@ -7682,17 +7513,16 @@
           <a:p>
             <a:pPr algn="ctr"/>
             <a:r>
-              <a:rPr lang="nb-NO" sz="1200" dirty="0" smtClean="0"/>
-              <a:t>Masternode</a:t>
+              <a:rPr lang="nb-NO" sz="1200" dirty="0"/>
+              <a:t>Hypernode</a:t>
             </a:r>
           </a:p>
           <a:p>
             <a:pPr algn="ctr"/>
             <a:r>
-              <a:rPr lang="nb-NO" sz="1200" dirty="0" smtClean="0"/>
+              <a:rPr lang="nb-NO" sz="1200" dirty="0"/>
               <a:t>Juror Slot 3</a:t>
             </a:r>
-            <a:endParaRPr lang="nb-NO" sz="1200" dirty="0"/>
           </a:p>
         </p:txBody>
       </p:sp>
@@ -7736,17 +7566,16 @@
           <a:p>
             <a:pPr algn="ctr"/>
             <a:r>
-              <a:rPr lang="nb-NO" sz="1200" dirty="0" smtClean="0"/>
-              <a:t>Masternode</a:t>
+              <a:rPr lang="nb-NO" sz="1200" dirty="0"/>
+              <a:t>Hypernode</a:t>
             </a:r>
           </a:p>
           <a:p>
             <a:pPr algn="ctr"/>
             <a:r>
-              <a:rPr lang="nb-NO" sz="1200" dirty="0" smtClean="0"/>
+              <a:rPr lang="nb-NO" sz="1200" dirty="0"/>
               <a:t>Juror Slot 4</a:t>
             </a:r>
-            <a:endParaRPr lang="nb-NO" sz="1200" dirty="0"/>
           </a:p>
         </p:txBody>
       </p:sp>
@@ -7790,17 +7619,16 @@
           <a:p>
             <a:pPr algn="ctr"/>
             <a:r>
-              <a:rPr lang="nb-NO" sz="1200" dirty="0" smtClean="0"/>
-              <a:t>Masternode</a:t>
+              <a:rPr lang="nb-NO" sz="1200" dirty="0"/>
+              <a:t>Hypernode</a:t>
             </a:r>
           </a:p>
           <a:p>
             <a:pPr algn="ctr"/>
             <a:r>
-              <a:rPr lang="nb-NO" sz="1200" dirty="0" smtClean="0"/>
+              <a:rPr lang="nb-NO" sz="1200" dirty="0"/>
               <a:t>Juror Slot 5</a:t>
             </a:r>
-            <a:endParaRPr lang="nb-NO" sz="1200" dirty="0"/>
           </a:p>
         </p:txBody>
       </p:sp>
@@ -8176,17 +8004,16 @@
           <a:p>
             <a:pPr algn="ctr"/>
             <a:r>
-              <a:rPr lang="nb-NO" sz="1200" dirty="0" smtClean="0"/>
+              <a:rPr lang="nb-NO" sz="1200" dirty="0"/>
               <a:t>Ticket</a:t>
             </a:r>
           </a:p>
           <a:p>
             <a:pPr algn="ctr"/>
             <a:r>
-              <a:rPr lang="nb-NO" sz="1200" dirty="0" smtClean="0"/>
+              <a:rPr lang="nb-NO" sz="1200" dirty="0"/>
               <a:t>4</a:t>
             </a:r>
-            <a:endParaRPr lang="nb-NO" sz="1200" dirty="0"/>
           </a:p>
         </p:txBody>
       </p:sp>
@@ -8230,7 +8057,7 @@
           <a:p>
             <a:pPr algn="ctr"/>
             <a:r>
-              <a:rPr lang="nb-NO" sz="1200" dirty="0" smtClean="0"/>
+              <a:rPr lang="nb-NO" sz="1200" dirty="0"/>
               <a:t>Ticket</a:t>
             </a:r>
           </a:p>
@@ -8283,17 +8110,16 @@
           <a:p>
             <a:pPr algn="ctr"/>
             <a:r>
-              <a:rPr lang="nb-NO" sz="1200" dirty="0" smtClean="0"/>
+              <a:rPr lang="nb-NO" sz="1200" dirty="0"/>
               <a:t>Ticket</a:t>
             </a:r>
           </a:p>
           <a:p>
             <a:pPr algn="ctr"/>
             <a:r>
-              <a:rPr lang="nb-NO" sz="1200" dirty="0" smtClean="0"/>
+              <a:rPr lang="nb-NO" sz="1200" dirty="0"/>
               <a:t>3</a:t>
             </a:r>
-            <a:endParaRPr lang="nb-NO" sz="1200" dirty="0"/>
           </a:p>
         </p:txBody>
       </p:sp>
@@ -8337,17 +8163,16 @@
           <a:p>
             <a:pPr algn="ctr"/>
             <a:r>
-              <a:rPr lang="nb-NO" sz="1200" dirty="0" smtClean="0"/>
+              <a:rPr lang="nb-NO" sz="1200" dirty="0"/>
               <a:t>Ticket</a:t>
             </a:r>
           </a:p>
           <a:p>
             <a:pPr algn="ctr"/>
             <a:r>
-              <a:rPr lang="nb-NO" sz="1200" dirty="0" smtClean="0"/>
+              <a:rPr lang="nb-NO" sz="1200" dirty="0"/>
               <a:t>M</a:t>
             </a:r>
-            <a:endParaRPr lang="nb-NO" sz="1200" dirty="0"/>
           </a:p>
         </p:txBody>
       </p:sp>
@@ -8391,17 +8216,16 @@
           <a:p>
             <a:pPr algn="ctr"/>
             <a:r>
-              <a:rPr lang="nb-NO" sz="1200" dirty="0" smtClean="0"/>
+              <a:rPr lang="nb-NO" sz="1200" dirty="0"/>
               <a:t>Ticket</a:t>
             </a:r>
           </a:p>
           <a:p>
             <a:pPr algn="ctr"/>
             <a:r>
-              <a:rPr lang="nb-NO" sz="1200" dirty="0" smtClean="0"/>
+              <a:rPr lang="nb-NO" sz="1200" dirty="0"/>
               <a:t>10</a:t>
             </a:r>
-            <a:endParaRPr lang="nb-NO" sz="1200" dirty="0"/>
           </a:p>
         </p:txBody>
       </p:sp>
@@ -8478,7 +8302,7 @@
           <a:p>
             <a:pPr algn="ctr"/>
             <a:r>
-              <a:rPr lang="nb-NO" sz="1200" dirty="0" smtClean="0"/>
+              <a:rPr lang="nb-NO" sz="1200" dirty="0"/>
               <a:t>Ticket</a:t>
             </a:r>
           </a:p>
@@ -8729,10 +8553,9 @@
           <a:p>
             <a:pPr algn="ctr"/>
             <a:r>
-              <a:rPr lang="nb-NO" sz="1200" dirty="0" smtClean="0"/>
+              <a:rPr lang="nb-NO" sz="1200" dirty="0"/>
               <a:t>Select the jurors for the 5 slots in the next round</a:t>
             </a:r>
-            <a:endParaRPr lang="nb-NO" sz="1200" dirty="0"/>
           </a:p>
         </p:txBody>
       </p:sp>
@@ -8941,8 +8764,8 @@
           <a:p>
             <a:pPr algn="ctr"/>
             <a:r>
-              <a:rPr lang="nb-NO" sz="1200" dirty="0" smtClean="0"/>
-              <a:t>Masternode</a:t>
+              <a:rPr lang="nb-NO" sz="1200" dirty="0"/>
+              <a:t>Hypernode</a:t>
             </a:r>
           </a:p>
           <a:p>
@@ -9027,17 +8850,16 @@
           <a:p>
             <a:pPr algn="ctr"/>
             <a:r>
-              <a:rPr lang="nb-NO" sz="1200" dirty="0" smtClean="0"/>
+              <a:rPr lang="nb-NO" sz="1200" dirty="0"/>
               <a:t>Ticket</a:t>
             </a:r>
           </a:p>
           <a:p>
             <a:pPr algn="ctr"/>
             <a:r>
-              <a:rPr lang="nb-NO" sz="1200" dirty="0" smtClean="0"/>
+              <a:rPr lang="nb-NO" sz="1200" dirty="0"/>
               <a:t>10</a:t>
             </a:r>
-            <a:endParaRPr lang="nb-NO" sz="1200" dirty="0"/>
           </a:p>
         </p:txBody>
       </p:sp>
@@ -9209,7 +9031,7 @@
           <p:cNvPr id="5" name="Table 4">
             <a:extLst>
               <a:ext uri="{FF2B5EF4-FFF2-40B4-BE49-F238E27FC236}">
-                <a16:creationId xmlns:a16="http://schemas.microsoft.com/office/drawing/2014/main" xmlns="" id="{2A780205-6AD3-4A25-9810-EC44FD0749F4}"/>
+                <a16:creationId xmlns:a16="http://schemas.microsoft.com/office/drawing/2014/main" id="{2A780205-6AD3-4A25-9810-EC44FD0749F4}"/>
               </a:ext>
             </a:extLst>
           </p:cNvPr>
@@ -9238,175 +9060,175 @@
                 <a:gridCol w="464546">
                   <a:extLst>
                     <a:ext uri="{9D8B030D-6E8A-4147-A177-3AD203B41FA5}">
-                      <a16:colId xmlns:a16="http://schemas.microsoft.com/office/drawing/2014/main" xmlns="" val="1019277772"/>
+                      <a16:colId xmlns:a16="http://schemas.microsoft.com/office/drawing/2014/main" val="1019277772"/>
                     </a:ext>
                   </a:extLst>
                 </a:gridCol>
                 <a:gridCol w="464546">
                   <a:extLst>
                     <a:ext uri="{9D8B030D-6E8A-4147-A177-3AD203B41FA5}">
-                      <a16:colId xmlns:a16="http://schemas.microsoft.com/office/drawing/2014/main" xmlns="" val="904070617"/>
+                      <a16:colId xmlns:a16="http://schemas.microsoft.com/office/drawing/2014/main" val="904070617"/>
                     </a:ext>
                   </a:extLst>
                 </a:gridCol>
                 <a:gridCol w="464546">
                   <a:extLst>
                     <a:ext uri="{9D8B030D-6E8A-4147-A177-3AD203B41FA5}">
-                      <a16:colId xmlns:a16="http://schemas.microsoft.com/office/drawing/2014/main" xmlns="" val="3450995975"/>
+                      <a16:colId xmlns:a16="http://schemas.microsoft.com/office/drawing/2014/main" val="3450995975"/>
                     </a:ext>
                   </a:extLst>
                 </a:gridCol>
                 <a:gridCol w="464546">
                   <a:extLst>
                     <a:ext uri="{9D8B030D-6E8A-4147-A177-3AD203B41FA5}">
-                      <a16:colId xmlns:a16="http://schemas.microsoft.com/office/drawing/2014/main" xmlns="" val="84178246"/>
+                      <a16:colId xmlns:a16="http://schemas.microsoft.com/office/drawing/2014/main" val="84178246"/>
                     </a:ext>
                   </a:extLst>
                 </a:gridCol>
                 <a:gridCol w="464546">
                   <a:extLst>
                     <a:ext uri="{9D8B030D-6E8A-4147-A177-3AD203B41FA5}">
-                      <a16:colId xmlns:a16="http://schemas.microsoft.com/office/drawing/2014/main" xmlns="" val="3444399563"/>
+                      <a16:colId xmlns:a16="http://schemas.microsoft.com/office/drawing/2014/main" val="3444399563"/>
                     </a:ext>
                   </a:extLst>
                 </a:gridCol>
                 <a:gridCol w="464546">
                   <a:extLst>
                     <a:ext uri="{9D8B030D-6E8A-4147-A177-3AD203B41FA5}">
-                      <a16:colId xmlns:a16="http://schemas.microsoft.com/office/drawing/2014/main" xmlns="" val="332534161"/>
+                      <a16:colId xmlns:a16="http://schemas.microsoft.com/office/drawing/2014/main" val="332534161"/>
                     </a:ext>
                   </a:extLst>
                 </a:gridCol>
                 <a:gridCol w="464546">
                   <a:extLst>
                     <a:ext uri="{9D8B030D-6E8A-4147-A177-3AD203B41FA5}">
-                      <a16:colId xmlns:a16="http://schemas.microsoft.com/office/drawing/2014/main" xmlns="" val="2290736699"/>
+                      <a16:colId xmlns:a16="http://schemas.microsoft.com/office/drawing/2014/main" val="2290736699"/>
                     </a:ext>
                   </a:extLst>
                 </a:gridCol>
                 <a:gridCol w="464546">
                   <a:extLst>
                     <a:ext uri="{9D8B030D-6E8A-4147-A177-3AD203B41FA5}">
-                      <a16:colId xmlns:a16="http://schemas.microsoft.com/office/drawing/2014/main" xmlns="" val="19451911"/>
+                      <a16:colId xmlns:a16="http://schemas.microsoft.com/office/drawing/2014/main" val="19451911"/>
                     </a:ext>
                   </a:extLst>
                 </a:gridCol>
                 <a:gridCol w="464546">
                   <a:extLst>
                     <a:ext uri="{9D8B030D-6E8A-4147-A177-3AD203B41FA5}">
-                      <a16:colId xmlns:a16="http://schemas.microsoft.com/office/drawing/2014/main" xmlns="" val="308529571"/>
+                      <a16:colId xmlns:a16="http://schemas.microsoft.com/office/drawing/2014/main" val="308529571"/>
                     </a:ext>
                   </a:extLst>
                 </a:gridCol>
                 <a:gridCol w="464546">
                   <a:extLst>
                     <a:ext uri="{9D8B030D-6E8A-4147-A177-3AD203B41FA5}">
-                      <a16:colId xmlns:a16="http://schemas.microsoft.com/office/drawing/2014/main" xmlns="" val="1626105078"/>
+                      <a16:colId xmlns:a16="http://schemas.microsoft.com/office/drawing/2014/main" val="1626105078"/>
                     </a:ext>
                   </a:extLst>
                 </a:gridCol>
                 <a:gridCol w="464546">
                   <a:extLst>
                     <a:ext uri="{9D8B030D-6E8A-4147-A177-3AD203B41FA5}">
-                      <a16:colId xmlns:a16="http://schemas.microsoft.com/office/drawing/2014/main" xmlns="" val="3796810149"/>
+                      <a16:colId xmlns:a16="http://schemas.microsoft.com/office/drawing/2014/main" val="3796810149"/>
                     </a:ext>
                   </a:extLst>
                 </a:gridCol>
                 <a:gridCol w="464546">
                   <a:extLst>
                     <a:ext uri="{9D8B030D-6E8A-4147-A177-3AD203B41FA5}">
-                      <a16:colId xmlns:a16="http://schemas.microsoft.com/office/drawing/2014/main" xmlns="" val="1772219669"/>
+                      <a16:colId xmlns:a16="http://schemas.microsoft.com/office/drawing/2014/main" val="1772219669"/>
                     </a:ext>
                   </a:extLst>
                 </a:gridCol>
                 <a:gridCol w="464546">
                   <a:extLst>
                     <a:ext uri="{9D8B030D-6E8A-4147-A177-3AD203B41FA5}">
-                      <a16:colId xmlns:a16="http://schemas.microsoft.com/office/drawing/2014/main" xmlns="" val="1327067936"/>
+                      <a16:colId xmlns:a16="http://schemas.microsoft.com/office/drawing/2014/main" val="1327067936"/>
                     </a:ext>
                   </a:extLst>
                 </a:gridCol>
                 <a:gridCol w="464546">
                   <a:extLst>
                     <a:ext uri="{9D8B030D-6E8A-4147-A177-3AD203B41FA5}">
-                      <a16:colId xmlns:a16="http://schemas.microsoft.com/office/drawing/2014/main" xmlns="" val="57842469"/>
+                      <a16:colId xmlns:a16="http://schemas.microsoft.com/office/drawing/2014/main" val="57842469"/>
                     </a:ext>
                   </a:extLst>
                 </a:gridCol>
                 <a:gridCol w="464546">
                   <a:extLst>
                     <a:ext uri="{9D8B030D-6E8A-4147-A177-3AD203B41FA5}">
-                      <a16:colId xmlns:a16="http://schemas.microsoft.com/office/drawing/2014/main" xmlns="" val="2526297131"/>
+                      <a16:colId xmlns:a16="http://schemas.microsoft.com/office/drawing/2014/main" val="2526297131"/>
                     </a:ext>
                   </a:extLst>
                 </a:gridCol>
                 <a:gridCol w="464546">
                   <a:extLst>
                     <a:ext uri="{9D8B030D-6E8A-4147-A177-3AD203B41FA5}">
-                      <a16:colId xmlns:a16="http://schemas.microsoft.com/office/drawing/2014/main" xmlns="" val="4184108719"/>
+                      <a16:colId xmlns:a16="http://schemas.microsoft.com/office/drawing/2014/main" val="4184108719"/>
                     </a:ext>
                   </a:extLst>
                 </a:gridCol>
                 <a:gridCol w="464546">
                   <a:extLst>
                     <a:ext uri="{9D8B030D-6E8A-4147-A177-3AD203B41FA5}">
-                      <a16:colId xmlns:a16="http://schemas.microsoft.com/office/drawing/2014/main" xmlns="" val="2493287182"/>
+                      <a16:colId xmlns:a16="http://schemas.microsoft.com/office/drawing/2014/main" val="2493287182"/>
                     </a:ext>
                   </a:extLst>
                 </a:gridCol>
                 <a:gridCol w="464546">
                   <a:extLst>
                     <a:ext uri="{9D8B030D-6E8A-4147-A177-3AD203B41FA5}">
-                      <a16:colId xmlns:a16="http://schemas.microsoft.com/office/drawing/2014/main" xmlns="" val="4018964974"/>
+                      <a16:colId xmlns:a16="http://schemas.microsoft.com/office/drawing/2014/main" val="4018964974"/>
                     </a:ext>
                   </a:extLst>
                 </a:gridCol>
                 <a:gridCol w="464546">
                   <a:extLst>
                     <a:ext uri="{9D8B030D-6E8A-4147-A177-3AD203B41FA5}">
-                      <a16:colId xmlns:a16="http://schemas.microsoft.com/office/drawing/2014/main" xmlns="" val="3303023726"/>
+                      <a16:colId xmlns:a16="http://schemas.microsoft.com/office/drawing/2014/main" val="3303023726"/>
                     </a:ext>
                   </a:extLst>
                 </a:gridCol>
                 <a:gridCol w="464546">
                   <a:extLst>
                     <a:ext uri="{9D8B030D-6E8A-4147-A177-3AD203B41FA5}">
-                      <a16:colId xmlns:a16="http://schemas.microsoft.com/office/drawing/2014/main" xmlns="" val="1047346888"/>
+                      <a16:colId xmlns:a16="http://schemas.microsoft.com/office/drawing/2014/main" val="1047346888"/>
                     </a:ext>
                   </a:extLst>
                 </a:gridCol>
                 <a:gridCol w="464546">
                   <a:extLst>
                     <a:ext uri="{9D8B030D-6E8A-4147-A177-3AD203B41FA5}">
-                      <a16:colId xmlns:a16="http://schemas.microsoft.com/office/drawing/2014/main" xmlns="" val="3175573251"/>
+                      <a16:colId xmlns:a16="http://schemas.microsoft.com/office/drawing/2014/main" val="3175573251"/>
                     </a:ext>
                   </a:extLst>
                 </a:gridCol>
                 <a:gridCol w="464546">
                   <a:extLst>
                     <a:ext uri="{9D8B030D-6E8A-4147-A177-3AD203B41FA5}">
-                      <a16:colId xmlns:a16="http://schemas.microsoft.com/office/drawing/2014/main" xmlns="" val="4176778861"/>
+                      <a16:colId xmlns:a16="http://schemas.microsoft.com/office/drawing/2014/main" val="4176778861"/>
                     </a:ext>
                   </a:extLst>
                 </a:gridCol>
                 <a:gridCol w="464546">
                   <a:extLst>
                     <a:ext uri="{9D8B030D-6E8A-4147-A177-3AD203B41FA5}">
-                      <a16:colId xmlns:a16="http://schemas.microsoft.com/office/drawing/2014/main" xmlns="" val="1113466877"/>
+                      <a16:colId xmlns:a16="http://schemas.microsoft.com/office/drawing/2014/main" val="1113466877"/>
                     </a:ext>
                   </a:extLst>
                 </a:gridCol>
                 <a:gridCol w="464546">
                   <a:extLst>
                     <a:ext uri="{9D8B030D-6E8A-4147-A177-3AD203B41FA5}">
-                      <a16:colId xmlns:a16="http://schemas.microsoft.com/office/drawing/2014/main" xmlns="" val="446932511"/>
+                      <a16:colId xmlns:a16="http://schemas.microsoft.com/office/drawing/2014/main" val="446932511"/>
                     </a:ext>
                   </a:extLst>
                 </a:gridCol>
                 <a:gridCol w="464546">
                   <a:extLst>
                     <a:ext uri="{9D8B030D-6E8A-4147-A177-3AD203B41FA5}">
-                      <a16:colId xmlns:a16="http://schemas.microsoft.com/office/drawing/2014/main" xmlns="" val="290695333"/>
+                      <a16:colId xmlns:a16="http://schemas.microsoft.com/office/drawing/2014/main" val="290695333"/>
                     </a:ext>
                   </a:extLst>
                 </a:gridCol>
@@ -9419,10 +9241,9 @@
                     <a:p>
                       <a:pPr algn="ctr"/>
                       <a:r>
-                        <a:rPr lang="nb-NO" sz="1100" dirty="0" smtClean="0"/>
+                        <a:rPr lang="nb-NO" sz="1100" dirty="0"/>
                         <a:t>n-24</a:t>
                       </a:r>
-                      <a:endParaRPr lang="nb-NO" sz="1100" dirty="0"/>
                     </a:p>
                   </a:txBody>
                   <a:tcPr>
@@ -9438,10 +9259,9 @@
                     <a:p>
                       <a:pPr algn="ctr"/>
                       <a:r>
-                        <a:rPr lang="nb-NO" sz="1100" dirty="0" smtClean="0"/>
+                        <a:rPr lang="nb-NO" sz="1100" dirty="0"/>
                         <a:t>n-23</a:t>
                       </a:r>
-                      <a:endParaRPr lang="nb-NO" sz="1100" dirty="0"/>
                     </a:p>
                   </a:txBody>
                   <a:tcPr/>
@@ -9453,10 +9273,9 @@
                     <a:p>
                       <a:pPr algn="ctr"/>
                       <a:r>
-                        <a:rPr lang="nb-NO" sz="1100" dirty="0" smtClean="0"/>
+                        <a:rPr lang="nb-NO" sz="1100" dirty="0"/>
                         <a:t>n-22</a:t>
                       </a:r>
-                      <a:endParaRPr lang="nb-NO" sz="1100" dirty="0"/>
                     </a:p>
                   </a:txBody>
                   <a:tcPr/>
@@ -9468,10 +9287,9 @@
                     <a:p>
                       <a:pPr algn="ctr"/>
                       <a:r>
-                        <a:rPr lang="nb-NO" sz="1100" dirty="0" smtClean="0"/>
+                        <a:rPr lang="nb-NO" sz="1100" dirty="0"/>
                         <a:t>n-21</a:t>
                       </a:r>
-                      <a:endParaRPr lang="nb-NO" sz="1100" dirty="0"/>
                     </a:p>
                   </a:txBody>
                   <a:tcPr/>
@@ -9483,10 +9301,9 @@
                     <a:p>
                       <a:pPr algn="ctr"/>
                       <a:r>
-                        <a:rPr lang="nb-NO" sz="1100" dirty="0" smtClean="0"/>
+                        <a:rPr lang="nb-NO" sz="1100" dirty="0"/>
                         <a:t>n-20</a:t>
                       </a:r>
-                      <a:endParaRPr lang="nb-NO" sz="1100" dirty="0"/>
                     </a:p>
                   </a:txBody>
                   <a:tcPr/>
@@ -9498,10 +9315,9 @@
                     <a:p>
                       <a:pPr algn="ctr"/>
                       <a:r>
-                        <a:rPr lang="nb-NO" sz="1100" dirty="0" smtClean="0"/>
+                        <a:rPr lang="nb-NO" sz="1100" dirty="0"/>
                         <a:t>n-19</a:t>
                       </a:r>
-                      <a:endParaRPr lang="nb-NO" sz="1100" dirty="0"/>
                     </a:p>
                   </a:txBody>
                   <a:tcPr/>
@@ -9513,10 +9329,9 @@
                     <a:p>
                       <a:pPr algn="ctr"/>
                       <a:r>
-                        <a:rPr lang="nb-NO" sz="1100" dirty="0" smtClean="0"/>
+                        <a:rPr lang="nb-NO" sz="1100" dirty="0"/>
                         <a:t>n-18</a:t>
                       </a:r>
-                      <a:endParaRPr lang="nb-NO" sz="1100" dirty="0"/>
                     </a:p>
                   </a:txBody>
                   <a:tcPr/>
@@ -9528,10 +9343,9 @@
                     <a:p>
                       <a:pPr algn="ctr"/>
                       <a:r>
-                        <a:rPr lang="nb-NO" sz="1100" dirty="0" smtClean="0"/>
+                        <a:rPr lang="nb-NO" sz="1100" dirty="0"/>
                         <a:t>n-17</a:t>
                       </a:r>
-                      <a:endParaRPr lang="nb-NO" sz="1100" dirty="0"/>
                     </a:p>
                   </a:txBody>
                   <a:tcPr/>
@@ -9543,10 +9357,9 @@
                     <a:p>
                       <a:pPr algn="ctr"/>
                       <a:r>
-                        <a:rPr lang="nb-NO" sz="1100" dirty="0" smtClean="0"/>
+                        <a:rPr lang="nb-NO" sz="1100" dirty="0"/>
                         <a:t>n-16</a:t>
                       </a:r>
-                      <a:endParaRPr lang="nb-NO" sz="1100" dirty="0"/>
                     </a:p>
                   </a:txBody>
                   <a:tcPr/>
@@ -9558,10 +9371,9 @@
                     <a:p>
                       <a:pPr algn="ctr"/>
                       <a:r>
-                        <a:rPr lang="nb-NO" sz="1100" dirty="0" smtClean="0"/>
+                        <a:rPr lang="nb-NO" sz="1100" dirty="0"/>
                         <a:t>n-15</a:t>
                       </a:r>
-                      <a:endParaRPr lang="nb-NO" sz="1100" dirty="0"/>
                     </a:p>
                   </a:txBody>
                   <a:tcPr/>
@@ -9573,10 +9385,9 @@
                     <a:p>
                       <a:pPr algn="ctr"/>
                       <a:r>
-                        <a:rPr lang="nb-NO" sz="1100" dirty="0" smtClean="0"/>
+                        <a:rPr lang="nb-NO" sz="1100" dirty="0"/>
                         <a:t>n-14</a:t>
                       </a:r>
-                      <a:endParaRPr lang="nb-NO" sz="1100" dirty="0"/>
                     </a:p>
                   </a:txBody>
                   <a:tcPr/>
@@ -9588,10 +9399,9 @@
                     <a:p>
                       <a:pPr algn="ctr"/>
                       <a:r>
-                        <a:rPr lang="nb-NO" sz="1100" dirty="0" smtClean="0"/>
+                        <a:rPr lang="nb-NO" sz="1100" dirty="0"/>
                         <a:t>n-13</a:t>
                       </a:r>
-                      <a:endParaRPr lang="nb-NO" sz="1100" dirty="0"/>
                     </a:p>
                   </a:txBody>
                   <a:tcPr/>
@@ -9603,10 +9413,9 @@
                     <a:p>
                       <a:pPr algn="ctr"/>
                       <a:r>
-                        <a:rPr lang="nb-NO" sz="1100" dirty="0" smtClean="0"/>
+                        <a:rPr lang="nb-NO" sz="1100" dirty="0"/>
                         <a:t>n-12</a:t>
                       </a:r>
-                      <a:endParaRPr lang="nb-NO" sz="1100" dirty="0"/>
                     </a:p>
                   </a:txBody>
                   <a:tcPr/>
@@ -9618,10 +9427,9 @@
                     <a:p>
                       <a:pPr algn="ctr"/>
                       <a:r>
-                        <a:rPr lang="nb-NO" sz="1100" dirty="0" smtClean="0"/>
+                        <a:rPr lang="nb-NO" sz="1100" dirty="0"/>
                         <a:t>n-11</a:t>
                       </a:r>
-                      <a:endParaRPr lang="nb-NO" sz="1100" dirty="0"/>
                     </a:p>
                   </a:txBody>
                   <a:tcPr/>
@@ -9633,10 +9441,9 @@
                     <a:p>
                       <a:pPr algn="ctr"/>
                       <a:r>
-                        <a:rPr lang="nb-NO" sz="1100" dirty="0" smtClean="0"/>
+                        <a:rPr lang="nb-NO" sz="1100" dirty="0"/>
                         <a:t>n-10</a:t>
                       </a:r>
-                      <a:endParaRPr lang="nb-NO" sz="1100" dirty="0"/>
                     </a:p>
                   </a:txBody>
                   <a:tcPr/>
@@ -9648,10 +9455,9 @@
                     <a:p>
                       <a:pPr algn="ctr"/>
                       <a:r>
-                        <a:rPr lang="nb-NO" sz="1100" dirty="0" smtClean="0"/>
+                        <a:rPr lang="nb-NO" sz="1100" dirty="0"/>
                         <a:t>n-9</a:t>
                       </a:r>
-                      <a:endParaRPr lang="nb-NO" sz="1100" dirty="0"/>
                     </a:p>
                   </a:txBody>
                   <a:tcPr/>
@@ -9663,10 +9469,9 @@
                     <a:p>
                       <a:pPr algn="ctr"/>
                       <a:r>
-                        <a:rPr lang="nb-NO" sz="1100" dirty="0" smtClean="0"/>
+                        <a:rPr lang="nb-NO" sz="1100" dirty="0"/>
                         <a:t>n-8</a:t>
                       </a:r>
-                      <a:endParaRPr lang="nb-NO" sz="1100" dirty="0"/>
                     </a:p>
                   </a:txBody>
                   <a:tcPr/>
@@ -9678,10 +9483,9 @@
                     <a:p>
                       <a:pPr algn="ctr"/>
                       <a:r>
-                        <a:rPr lang="nb-NO" sz="1100" dirty="0" smtClean="0"/>
+                        <a:rPr lang="nb-NO" sz="1100" dirty="0"/>
                         <a:t>n-7</a:t>
                       </a:r>
-                      <a:endParaRPr lang="nb-NO" sz="1100" dirty="0"/>
                     </a:p>
                   </a:txBody>
                   <a:tcPr/>
@@ -9693,10 +9497,9 @@
                     <a:p>
                       <a:pPr algn="ctr"/>
                       <a:r>
-                        <a:rPr lang="nb-NO" sz="1100" dirty="0" smtClean="0"/>
+                        <a:rPr lang="nb-NO" sz="1100" dirty="0"/>
                         <a:t>n-6</a:t>
                       </a:r>
-                      <a:endParaRPr lang="nb-NO" sz="1100" dirty="0"/>
                     </a:p>
                   </a:txBody>
                   <a:tcPr/>
@@ -9708,10 +9511,9 @@
                     <a:p>
                       <a:pPr algn="ctr"/>
                       <a:r>
-                        <a:rPr lang="nb-NO" sz="1100" dirty="0" smtClean="0"/>
+                        <a:rPr lang="nb-NO" sz="1100" dirty="0"/>
                         <a:t>n-5</a:t>
                       </a:r>
-                      <a:endParaRPr lang="nb-NO" sz="1100" dirty="0"/>
                     </a:p>
                   </a:txBody>
                   <a:tcPr/>
@@ -9723,10 +9525,9 @@
                     <a:p>
                       <a:pPr algn="ctr"/>
                       <a:r>
-                        <a:rPr lang="nb-NO" sz="1100" dirty="0" smtClean="0"/>
+                        <a:rPr lang="nb-NO" sz="1100" dirty="0"/>
                         <a:t>n-4</a:t>
                       </a:r>
-                      <a:endParaRPr lang="nb-NO" sz="1100" dirty="0"/>
                     </a:p>
                   </a:txBody>
                   <a:tcPr/>
@@ -9738,10 +9539,9 @@
                     <a:p>
                       <a:pPr algn="ctr"/>
                       <a:r>
-                        <a:rPr lang="nb-NO" sz="1100" dirty="0" smtClean="0"/>
+                        <a:rPr lang="nb-NO" sz="1100" dirty="0"/>
                         <a:t>n-3</a:t>
                       </a:r>
-                      <a:endParaRPr lang="nb-NO" sz="1100" dirty="0"/>
                     </a:p>
                   </a:txBody>
                   <a:tcPr>
@@ -9757,10 +9557,9 @@
                     <a:p>
                       <a:pPr algn="ctr"/>
                       <a:r>
-                        <a:rPr lang="nb-NO" sz="1100" dirty="0" smtClean="0"/>
+                        <a:rPr lang="nb-NO" sz="1100" dirty="0"/>
                         <a:t>n-2</a:t>
                       </a:r>
-                      <a:endParaRPr lang="nb-NO" sz="1100" dirty="0"/>
                     </a:p>
                   </a:txBody>
                   <a:tcPr>
@@ -9776,10 +9575,9 @@
                     <a:p>
                       <a:pPr algn="ctr"/>
                       <a:r>
-                        <a:rPr lang="nb-NO" sz="1100" dirty="0" smtClean="0"/>
+                        <a:rPr lang="nb-NO" sz="1100" dirty="0"/>
                         <a:t>n-1</a:t>
                       </a:r>
-                      <a:endParaRPr lang="nb-NO" sz="1100" dirty="0"/>
                     </a:p>
                   </a:txBody>
                   <a:tcPr>
@@ -9795,10 +9593,9 @@
                     <a:p>
                       <a:pPr algn="ctr"/>
                       <a:r>
-                        <a:rPr lang="nb-NO" sz="1100" dirty="0" smtClean="0"/>
+                        <a:rPr lang="nb-NO" sz="1100" dirty="0"/>
                         <a:t>n</a:t>
                       </a:r>
-                      <a:endParaRPr lang="nb-NO" sz="1100" dirty="0"/>
                     </a:p>
                   </a:txBody>
                   <a:tcPr>
@@ -9809,7 +9606,7 @@
                 </a:tc>
                 <a:extLst>
                   <a:ext uri="{0D108BD9-81ED-4DB2-BD59-A6C34878D82A}">
-                    <a16:rowId xmlns:a16="http://schemas.microsoft.com/office/drawing/2014/main" xmlns="" val="2941513846"/>
+                    <a16:rowId xmlns:a16="http://schemas.microsoft.com/office/drawing/2014/main" val="2941513846"/>
                   </a:ext>
                 </a:extLst>
               </a:tr>
@@ -9840,7 +9637,7 @@
           <a:lstStyle/>
           <a:p>
             <a:r>
-              <a:rPr lang="nb-NO" sz="1200" dirty="0" smtClean="0"/>
+              <a:rPr lang="nb-NO" sz="1200" dirty="0"/>
               <a:t>PoW chain: Blocktime: 60 seconds</a:t>
             </a:r>
           </a:p>
@@ -9869,7 +9666,7 @@
           <a:lstStyle/>
           <a:p>
             <a:r>
-              <a:rPr lang="nb-NO" sz="1200" dirty="0" smtClean="0"/>
+              <a:rPr lang="nb-NO" sz="1200" dirty="0"/>
               <a:t>PoS chain: Blocktime: 10 minutes</a:t>
             </a:r>
           </a:p>
@@ -9880,7 +9677,7 @@
           <p:cNvPr id="18" name="Table 17">
             <a:extLst>
               <a:ext uri="{FF2B5EF4-FFF2-40B4-BE49-F238E27FC236}">
-                <a16:creationId xmlns:a16="http://schemas.microsoft.com/office/drawing/2014/main" xmlns="" id="{2A780205-6AD3-4A25-9810-EC44FD0749F4}"/>
+                <a16:creationId xmlns:a16="http://schemas.microsoft.com/office/drawing/2014/main" id="{2A780205-6AD3-4A25-9810-EC44FD0749F4}"/>
               </a:ext>
             </a:extLst>
           </p:cNvPr>
@@ -9909,175 +9706,175 @@
                 <a:gridCol w="464546">
                   <a:extLst>
                     <a:ext uri="{9D8B030D-6E8A-4147-A177-3AD203B41FA5}">
-                      <a16:colId xmlns:a16="http://schemas.microsoft.com/office/drawing/2014/main" xmlns="" val="1019277772"/>
+                      <a16:colId xmlns:a16="http://schemas.microsoft.com/office/drawing/2014/main" val="1019277772"/>
                     </a:ext>
                   </a:extLst>
                 </a:gridCol>
                 <a:gridCol w="464546">
                   <a:extLst>
                     <a:ext uri="{9D8B030D-6E8A-4147-A177-3AD203B41FA5}">
-                      <a16:colId xmlns:a16="http://schemas.microsoft.com/office/drawing/2014/main" xmlns="" val="904070617"/>
+                      <a16:colId xmlns:a16="http://schemas.microsoft.com/office/drawing/2014/main" val="904070617"/>
                     </a:ext>
                   </a:extLst>
                 </a:gridCol>
                 <a:gridCol w="464546">
                   <a:extLst>
                     <a:ext uri="{9D8B030D-6E8A-4147-A177-3AD203B41FA5}">
-                      <a16:colId xmlns:a16="http://schemas.microsoft.com/office/drawing/2014/main" xmlns="" val="3450995975"/>
+                      <a16:colId xmlns:a16="http://schemas.microsoft.com/office/drawing/2014/main" val="3450995975"/>
                     </a:ext>
                   </a:extLst>
                 </a:gridCol>
                 <a:gridCol w="464546">
                   <a:extLst>
                     <a:ext uri="{9D8B030D-6E8A-4147-A177-3AD203B41FA5}">
-                      <a16:colId xmlns:a16="http://schemas.microsoft.com/office/drawing/2014/main" xmlns="" val="84178246"/>
+                      <a16:colId xmlns:a16="http://schemas.microsoft.com/office/drawing/2014/main" val="84178246"/>
                     </a:ext>
                   </a:extLst>
                 </a:gridCol>
                 <a:gridCol w="464546">
                   <a:extLst>
                     <a:ext uri="{9D8B030D-6E8A-4147-A177-3AD203B41FA5}">
-                      <a16:colId xmlns:a16="http://schemas.microsoft.com/office/drawing/2014/main" xmlns="" val="3444399563"/>
+                      <a16:colId xmlns:a16="http://schemas.microsoft.com/office/drawing/2014/main" val="3444399563"/>
                     </a:ext>
                   </a:extLst>
                 </a:gridCol>
                 <a:gridCol w="464546">
                   <a:extLst>
                     <a:ext uri="{9D8B030D-6E8A-4147-A177-3AD203B41FA5}">
-                      <a16:colId xmlns:a16="http://schemas.microsoft.com/office/drawing/2014/main" xmlns="" val="332534161"/>
+                      <a16:colId xmlns:a16="http://schemas.microsoft.com/office/drawing/2014/main" val="332534161"/>
                     </a:ext>
                   </a:extLst>
                 </a:gridCol>
                 <a:gridCol w="464546">
                   <a:extLst>
                     <a:ext uri="{9D8B030D-6E8A-4147-A177-3AD203B41FA5}">
-                      <a16:colId xmlns:a16="http://schemas.microsoft.com/office/drawing/2014/main" xmlns="" val="2290736699"/>
+                      <a16:colId xmlns:a16="http://schemas.microsoft.com/office/drawing/2014/main" val="2290736699"/>
                     </a:ext>
                   </a:extLst>
                 </a:gridCol>
                 <a:gridCol w="464546">
                   <a:extLst>
                     <a:ext uri="{9D8B030D-6E8A-4147-A177-3AD203B41FA5}">
-                      <a16:colId xmlns:a16="http://schemas.microsoft.com/office/drawing/2014/main" xmlns="" val="19451911"/>
+                      <a16:colId xmlns:a16="http://schemas.microsoft.com/office/drawing/2014/main" val="19451911"/>
                     </a:ext>
                   </a:extLst>
                 </a:gridCol>
                 <a:gridCol w="464546">
                   <a:extLst>
                     <a:ext uri="{9D8B030D-6E8A-4147-A177-3AD203B41FA5}">
-                      <a16:colId xmlns:a16="http://schemas.microsoft.com/office/drawing/2014/main" xmlns="" val="308529571"/>
+                      <a16:colId xmlns:a16="http://schemas.microsoft.com/office/drawing/2014/main" val="308529571"/>
                     </a:ext>
                   </a:extLst>
                 </a:gridCol>
                 <a:gridCol w="464546">
                   <a:extLst>
                     <a:ext uri="{9D8B030D-6E8A-4147-A177-3AD203B41FA5}">
-                      <a16:colId xmlns:a16="http://schemas.microsoft.com/office/drawing/2014/main" xmlns="" val="1626105078"/>
+                      <a16:colId xmlns:a16="http://schemas.microsoft.com/office/drawing/2014/main" val="1626105078"/>
                     </a:ext>
                   </a:extLst>
                 </a:gridCol>
                 <a:gridCol w="464546">
                   <a:extLst>
                     <a:ext uri="{9D8B030D-6E8A-4147-A177-3AD203B41FA5}">
-                      <a16:colId xmlns:a16="http://schemas.microsoft.com/office/drawing/2014/main" xmlns="" val="3796810149"/>
+                      <a16:colId xmlns:a16="http://schemas.microsoft.com/office/drawing/2014/main" val="3796810149"/>
                     </a:ext>
                   </a:extLst>
                 </a:gridCol>
                 <a:gridCol w="464546">
                   <a:extLst>
                     <a:ext uri="{9D8B030D-6E8A-4147-A177-3AD203B41FA5}">
-                      <a16:colId xmlns:a16="http://schemas.microsoft.com/office/drawing/2014/main" xmlns="" val="1772219669"/>
+                      <a16:colId xmlns:a16="http://schemas.microsoft.com/office/drawing/2014/main" val="1772219669"/>
                     </a:ext>
                   </a:extLst>
                 </a:gridCol>
                 <a:gridCol w="464546">
                   <a:extLst>
                     <a:ext uri="{9D8B030D-6E8A-4147-A177-3AD203B41FA5}">
-                      <a16:colId xmlns:a16="http://schemas.microsoft.com/office/drawing/2014/main" xmlns="" val="1327067936"/>
+                      <a16:colId xmlns:a16="http://schemas.microsoft.com/office/drawing/2014/main" val="1327067936"/>
                     </a:ext>
                   </a:extLst>
                 </a:gridCol>
                 <a:gridCol w="464546">
                   <a:extLst>
                     <a:ext uri="{9D8B030D-6E8A-4147-A177-3AD203B41FA5}">
-                      <a16:colId xmlns:a16="http://schemas.microsoft.com/office/drawing/2014/main" xmlns="" val="57842469"/>
+                      <a16:colId xmlns:a16="http://schemas.microsoft.com/office/drawing/2014/main" val="57842469"/>
                     </a:ext>
                   </a:extLst>
                 </a:gridCol>
                 <a:gridCol w="464546">
                   <a:extLst>
                     <a:ext uri="{9D8B030D-6E8A-4147-A177-3AD203B41FA5}">
-                      <a16:colId xmlns:a16="http://schemas.microsoft.com/office/drawing/2014/main" xmlns="" val="2526297131"/>
+                      <a16:colId xmlns:a16="http://schemas.microsoft.com/office/drawing/2014/main" val="2526297131"/>
                     </a:ext>
                   </a:extLst>
                 </a:gridCol>
                 <a:gridCol w="464546">
                   <a:extLst>
                     <a:ext uri="{9D8B030D-6E8A-4147-A177-3AD203B41FA5}">
-                      <a16:colId xmlns:a16="http://schemas.microsoft.com/office/drawing/2014/main" xmlns="" val="4184108719"/>
+                      <a16:colId xmlns:a16="http://schemas.microsoft.com/office/drawing/2014/main" val="4184108719"/>
                     </a:ext>
                   </a:extLst>
                 </a:gridCol>
                 <a:gridCol w="464546">
                   <a:extLst>
                     <a:ext uri="{9D8B030D-6E8A-4147-A177-3AD203B41FA5}">
-                      <a16:colId xmlns:a16="http://schemas.microsoft.com/office/drawing/2014/main" xmlns="" val="2493287182"/>
+                      <a16:colId xmlns:a16="http://schemas.microsoft.com/office/drawing/2014/main" val="2493287182"/>
                     </a:ext>
                   </a:extLst>
                 </a:gridCol>
                 <a:gridCol w="464546">
                   <a:extLst>
                     <a:ext uri="{9D8B030D-6E8A-4147-A177-3AD203B41FA5}">
-                      <a16:colId xmlns:a16="http://schemas.microsoft.com/office/drawing/2014/main" xmlns="" val="4018964974"/>
+                      <a16:colId xmlns:a16="http://schemas.microsoft.com/office/drawing/2014/main" val="4018964974"/>
                     </a:ext>
                   </a:extLst>
                 </a:gridCol>
                 <a:gridCol w="464546">
                   <a:extLst>
                     <a:ext uri="{9D8B030D-6E8A-4147-A177-3AD203B41FA5}">
-                      <a16:colId xmlns:a16="http://schemas.microsoft.com/office/drawing/2014/main" xmlns="" val="3303023726"/>
+                      <a16:colId xmlns:a16="http://schemas.microsoft.com/office/drawing/2014/main" val="3303023726"/>
                     </a:ext>
                   </a:extLst>
                 </a:gridCol>
                 <a:gridCol w="464546">
                   <a:extLst>
                     <a:ext uri="{9D8B030D-6E8A-4147-A177-3AD203B41FA5}">
-                      <a16:colId xmlns:a16="http://schemas.microsoft.com/office/drawing/2014/main" xmlns="" val="1047346888"/>
+                      <a16:colId xmlns:a16="http://schemas.microsoft.com/office/drawing/2014/main" val="1047346888"/>
                     </a:ext>
                   </a:extLst>
                 </a:gridCol>
                 <a:gridCol w="464546">
                   <a:extLst>
                     <a:ext uri="{9D8B030D-6E8A-4147-A177-3AD203B41FA5}">
-                      <a16:colId xmlns:a16="http://schemas.microsoft.com/office/drawing/2014/main" xmlns="" val="3175573251"/>
+                      <a16:colId xmlns:a16="http://schemas.microsoft.com/office/drawing/2014/main" val="3175573251"/>
                     </a:ext>
                   </a:extLst>
                 </a:gridCol>
                 <a:gridCol w="464546">
                   <a:extLst>
                     <a:ext uri="{9D8B030D-6E8A-4147-A177-3AD203B41FA5}">
-                      <a16:colId xmlns:a16="http://schemas.microsoft.com/office/drawing/2014/main" xmlns="" val="4176778861"/>
+                      <a16:colId xmlns:a16="http://schemas.microsoft.com/office/drawing/2014/main" val="4176778861"/>
                     </a:ext>
                   </a:extLst>
                 </a:gridCol>
                 <a:gridCol w="464546">
                   <a:extLst>
                     <a:ext uri="{9D8B030D-6E8A-4147-A177-3AD203B41FA5}">
-                      <a16:colId xmlns:a16="http://schemas.microsoft.com/office/drawing/2014/main" xmlns="" val="1113466877"/>
+                      <a16:colId xmlns:a16="http://schemas.microsoft.com/office/drawing/2014/main" val="1113466877"/>
                     </a:ext>
                   </a:extLst>
                 </a:gridCol>
                 <a:gridCol w="464546">
                   <a:extLst>
                     <a:ext uri="{9D8B030D-6E8A-4147-A177-3AD203B41FA5}">
-                      <a16:colId xmlns:a16="http://schemas.microsoft.com/office/drawing/2014/main" xmlns="" val="446932511"/>
+                      <a16:colId xmlns:a16="http://schemas.microsoft.com/office/drawing/2014/main" val="446932511"/>
                     </a:ext>
                   </a:extLst>
                 </a:gridCol>
                 <a:gridCol w="464546">
                   <a:extLst>
                     <a:ext uri="{9D8B030D-6E8A-4147-A177-3AD203B41FA5}">
-                      <a16:colId xmlns:a16="http://schemas.microsoft.com/office/drawing/2014/main" xmlns="" val="290695333"/>
+                      <a16:colId xmlns:a16="http://schemas.microsoft.com/office/drawing/2014/main" val="290695333"/>
                     </a:ext>
                   </a:extLst>
                 </a:gridCol>
@@ -10090,10 +9887,9 @@
                     <a:p>
                       <a:pPr algn="ctr"/>
                       <a:r>
-                        <a:rPr lang="nb-NO" dirty="0" smtClean="0"/>
+                        <a:rPr lang="nb-NO" dirty="0"/>
                         <a:t>1</a:t>
                       </a:r>
-                      <a:endParaRPr lang="nb-NO" dirty="0"/>
                     </a:p>
                   </a:txBody>
                   <a:tcPr>
@@ -10109,10 +9905,9 @@
                     <a:p>
                       <a:pPr algn="ctr"/>
                       <a:r>
-                        <a:rPr lang="nb-NO" dirty="0" smtClean="0"/>
+                        <a:rPr lang="nb-NO" dirty="0"/>
                         <a:t>2</a:t>
                       </a:r>
-                      <a:endParaRPr lang="nb-NO" dirty="0"/>
                     </a:p>
                   </a:txBody>
                   <a:tcPr>
@@ -10128,10 +9923,9 @@
                     <a:p>
                       <a:pPr algn="ctr"/>
                       <a:r>
-                        <a:rPr lang="nb-NO" dirty="0" smtClean="0"/>
+                        <a:rPr lang="nb-NO" dirty="0"/>
                         <a:t>3</a:t>
                       </a:r>
-                      <a:endParaRPr lang="nb-NO" dirty="0"/>
                     </a:p>
                   </a:txBody>
                   <a:tcPr>
@@ -10147,10 +9941,9 @@
                     <a:p>
                       <a:pPr algn="ctr"/>
                       <a:r>
-                        <a:rPr lang="nb-NO" dirty="0" smtClean="0"/>
+                        <a:rPr lang="nb-NO" dirty="0"/>
                         <a:t>4</a:t>
                       </a:r>
-                      <a:endParaRPr lang="nb-NO" dirty="0"/>
                     </a:p>
                   </a:txBody>
                   <a:tcPr>
@@ -10166,10 +9959,9 @@
                     <a:p>
                       <a:pPr algn="ctr"/>
                       <a:r>
-                        <a:rPr lang="nb-NO" dirty="0" smtClean="0"/>
+                        <a:rPr lang="nb-NO" dirty="0"/>
                         <a:t>5</a:t>
                       </a:r>
-                      <a:endParaRPr lang="nb-NO" dirty="0"/>
                     </a:p>
                   </a:txBody>
                   <a:tcPr>
@@ -10185,7 +9977,7 @@
                     <a:p>
                       <a:pPr algn="ctr"/>
                       <a:r>
-                        <a:rPr lang="nb-NO" sz="800" dirty="0" smtClean="0"/>
+                        <a:rPr lang="nb-NO" sz="800" dirty="0"/>
                         <a:t>empty</a:t>
                       </a:r>
                       <a:endParaRPr lang="nb-NO" dirty="0"/>
@@ -10204,10 +9996,9 @@
                     <a:p>
                       <a:pPr algn="ctr"/>
                       <a:r>
-                        <a:rPr lang="nb-NO" dirty="0" smtClean="0"/>
+                        <a:rPr lang="nb-NO" dirty="0"/>
                         <a:t>1</a:t>
                       </a:r>
-                      <a:endParaRPr lang="nb-NO" dirty="0"/>
                     </a:p>
                   </a:txBody>
                   <a:tcPr>
@@ -10223,10 +10014,9 @@
                     <a:p>
                       <a:pPr algn="ctr"/>
                       <a:r>
-                        <a:rPr lang="nb-NO" dirty="0" smtClean="0"/>
+                        <a:rPr lang="nb-NO" dirty="0"/>
                         <a:t>2</a:t>
                       </a:r>
-                      <a:endParaRPr lang="nb-NO" dirty="0"/>
                     </a:p>
                   </a:txBody>
                   <a:tcPr>
@@ -10242,10 +10032,9 @@
                     <a:p>
                       <a:pPr algn="ctr"/>
                       <a:r>
-                        <a:rPr lang="nb-NO" dirty="0" smtClean="0"/>
+                        <a:rPr lang="nb-NO" dirty="0"/>
                         <a:t>3</a:t>
                       </a:r>
-                      <a:endParaRPr lang="nb-NO" dirty="0"/>
                     </a:p>
                   </a:txBody>
                   <a:tcPr>
@@ -10261,10 +10050,9 @@
                     <a:p>
                       <a:pPr algn="ctr"/>
                       <a:r>
-                        <a:rPr lang="nb-NO" dirty="0" smtClean="0"/>
+                        <a:rPr lang="nb-NO" dirty="0"/>
                         <a:t>4</a:t>
                       </a:r>
-                      <a:endParaRPr lang="nb-NO" dirty="0"/>
                     </a:p>
                   </a:txBody>
                   <a:tcPr>
@@ -10280,10 +10068,9 @@
                     <a:p>
                       <a:pPr algn="ctr"/>
                       <a:r>
-                        <a:rPr lang="nb-NO" dirty="0" smtClean="0"/>
+                        <a:rPr lang="nb-NO" dirty="0"/>
                         <a:t>5</a:t>
                       </a:r>
-                      <a:endParaRPr lang="nb-NO" dirty="0"/>
                     </a:p>
                   </a:txBody>
                   <a:tcPr>
@@ -10299,7 +10086,7 @@
                     <a:p>
                       <a:pPr algn="ctr"/>
                       <a:r>
-                        <a:rPr lang="nb-NO" sz="800" dirty="0" smtClean="0"/>
+                        <a:rPr lang="nb-NO" sz="800" dirty="0"/>
                         <a:t>empty</a:t>
                       </a:r>
                       <a:endParaRPr lang="nb-NO" dirty="0"/>
@@ -10318,10 +10105,9 @@
                     <a:p>
                       <a:pPr algn="ctr"/>
                       <a:r>
-                        <a:rPr lang="nb-NO" dirty="0" smtClean="0"/>
+                        <a:rPr lang="nb-NO" dirty="0"/>
                         <a:t>1</a:t>
                       </a:r>
-                      <a:endParaRPr lang="nb-NO" dirty="0"/>
                     </a:p>
                   </a:txBody>
                   <a:tcPr>
@@ -10337,10 +10123,9 @@
                     <a:p>
                       <a:pPr algn="ctr"/>
                       <a:r>
-                        <a:rPr lang="nb-NO" dirty="0" smtClean="0"/>
+                        <a:rPr lang="nb-NO" dirty="0"/>
                         <a:t>2</a:t>
                       </a:r>
-                      <a:endParaRPr lang="nb-NO" dirty="0"/>
                     </a:p>
                   </a:txBody>
                   <a:tcPr>
@@ -10356,10 +10141,9 @@
                     <a:p>
                       <a:pPr algn="ctr"/>
                       <a:r>
-                        <a:rPr lang="nb-NO" dirty="0" smtClean="0"/>
+                        <a:rPr lang="nb-NO" dirty="0"/>
                         <a:t>3</a:t>
                       </a:r>
-                      <a:endParaRPr lang="nb-NO" dirty="0"/>
                     </a:p>
                   </a:txBody>
                   <a:tcPr>
@@ -10375,10 +10159,9 @@
                     <a:p>
                       <a:pPr algn="ctr"/>
                       <a:r>
-                        <a:rPr lang="nb-NO" dirty="0" smtClean="0"/>
+                        <a:rPr lang="nb-NO" dirty="0"/>
                         <a:t>4</a:t>
                       </a:r>
-                      <a:endParaRPr lang="nb-NO" dirty="0"/>
                     </a:p>
                   </a:txBody>
                   <a:tcPr>
@@ -10394,10 +10177,9 @@
                     <a:p>
                       <a:pPr algn="ctr"/>
                       <a:r>
-                        <a:rPr lang="nb-NO" dirty="0" smtClean="0"/>
+                        <a:rPr lang="nb-NO" dirty="0"/>
                         <a:t>5</a:t>
                       </a:r>
-                      <a:endParaRPr lang="nb-NO" dirty="0"/>
                     </a:p>
                   </a:txBody>
                   <a:tcPr>
@@ -10413,7 +10195,7 @@
                     <a:p>
                       <a:pPr algn="ctr"/>
                       <a:r>
-                        <a:rPr lang="nb-NO" sz="800" dirty="0" smtClean="0"/>
+                        <a:rPr lang="nb-NO" sz="800" dirty="0"/>
                         <a:t>empty</a:t>
                       </a:r>
                       <a:endParaRPr lang="nb-NO" dirty="0"/>
@@ -10432,10 +10214,9 @@
                     <a:p>
                       <a:pPr algn="ctr"/>
                       <a:r>
-                        <a:rPr lang="nb-NO" dirty="0" smtClean="0"/>
+                        <a:rPr lang="nb-NO" dirty="0"/>
                         <a:t>1</a:t>
                       </a:r>
-                      <a:endParaRPr lang="nb-NO" dirty="0"/>
                     </a:p>
                   </a:txBody>
                   <a:tcPr>
@@ -10451,10 +10232,9 @@
                     <a:p>
                       <a:pPr algn="ctr"/>
                       <a:r>
-                        <a:rPr lang="nb-NO" dirty="0" smtClean="0"/>
+                        <a:rPr lang="nb-NO" dirty="0"/>
                         <a:t>2</a:t>
                       </a:r>
-                      <a:endParaRPr lang="nb-NO" dirty="0"/>
                     </a:p>
                   </a:txBody>
                   <a:tcPr>
@@ -10470,10 +10250,9 @@
                     <a:p>
                       <a:pPr algn="ctr"/>
                       <a:r>
-                        <a:rPr lang="nb-NO" dirty="0" smtClean="0"/>
+                        <a:rPr lang="nb-NO" dirty="0"/>
                         <a:t>3</a:t>
                       </a:r>
-                      <a:endParaRPr lang="nb-NO" dirty="0"/>
                     </a:p>
                   </a:txBody>
                   <a:tcPr>
@@ -10489,10 +10268,9 @@
                     <a:p>
                       <a:pPr algn="ctr"/>
                       <a:r>
-                        <a:rPr lang="nb-NO" dirty="0" smtClean="0"/>
+                        <a:rPr lang="nb-NO" dirty="0"/>
                         <a:t>4</a:t>
                       </a:r>
-                      <a:endParaRPr lang="nb-NO" dirty="0"/>
                     </a:p>
                   </a:txBody>
                   <a:tcPr>
@@ -10508,10 +10286,9 @@
                     <a:p>
                       <a:pPr algn="ctr"/>
                       <a:r>
-                        <a:rPr lang="nb-NO" dirty="0" smtClean="0"/>
+                        <a:rPr lang="nb-NO" dirty="0"/>
                         <a:t>5</a:t>
                       </a:r>
-                      <a:endParaRPr lang="nb-NO" dirty="0"/>
                     </a:p>
                   </a:txBody>
                   <a:tcPr>
@@ -10527,7 +10304,7 @@
                     <a:p>
                       <a:pPr algn="ctr"/>
                       <a:r>
-                        <a:rPr lang="nb-NO" sz="800" dirty="0" smtClean="0"/>
+                        <a:rPr lang="nb-NO" sz="800" dirty="0"/>
                         <a:t>empty</a:t>
                       </a:r>
                       <a:endParaRPr lang="nb-NO" dirty="0"/>
@@ -10556,7 +10333,7 @@
                 </a:tc>
                 <a:extLst>
                   <a:ext uri="{0D108BD9-81ED-4DB2-BD59-A6C34878D82A}">
-                    <a16:rowId xmlns:a16="http://schemas.microsoft.com/office/drawing/2014/main" xmlns="" val="2941513846"/>
+                    <a16:rowId xmlns:a16="http://schemas.microsoft.com/office/drawing/2014/main" val="2941513846"/>
                   </a:ext>
                 </a:extLst>
               </a:tr>
@@ -10569,7 +10346,7 @@
           <p:cNvPr id="19" name="Picture 18">
             <a:extLst>
               <a:ext uri="{FF2B5EF4-FFF2-40B4-BE49-F238E27FC236}">
-                <a16:creationId xmlns:a16="http://schemas.microsoft.com/office/drawing/2014/main" xmlns="" id="{590133A9-43B3-4ACA-8B6A-AC7C02124269}"/>
+                <a16:creationId xmlns:a16="http://schemas.microsoft.com/office/drawing/2014/main" id="{590133A9-43B3-4ACA-8B6A-AC7C02124269}"/>
               </a:ext>
             </a:extLst>
           </p:cNvPr>
@@ -10617,10 +10394,9 @@
           <a:lstStyle/>
           <a:p>
             <a:r>
-              <a:rPr lang="nb-NO" dirty="0" smtClean="0"/>
+              <a:rPr lang="nb-NO" dirty="0"/>
               <a:t>Round k-3</a:t>
             </a:r>
-            <a:endParaRPr lang="nb-NO" dirty="0"/>
           </a:p>
         </p:txBody>
       </p:sp>
@@ -10713,7 +10489,7 @@
           <a:lstStyle/>
           <a:p>
             <a:r>
-              <a:rPr lang="nb-NO" sz="1200" dirty="0" smtClean="0"/>
+              <a:rPr lang="nb-NO" sz="1200" dirty="0"/>
               <a:t>Slot numbers in a round</a:t>
             </a:r>
           </a:p>
@@ -10759,8 +10535,8 @@
           <a:p>
             <a:pPr algn="ctr"/>
             <a:r>
-              <a:rPr lang="nb-NO" sz="1200" dirty="0" smtClean="0"/>
-              <a:t>Masternode</a:t>
+              <a:rPr lang="nb-NO" sz="1200" dirty="0"/>
+              <a:t>Hypernode</a:t>
             </a:r>
           </a:p>
           <a:p>
@@ -10812,17 +10588,16 @@
           <a:p>
             <a:pPr algn="ctr"/>
             <a:r>
-              <a:rPr lang="nb-NO" sz="1200" dirty="0" smtClean="0"/>
-              <a:t>Masternode</a:t>
+              <a:rPr lang="nb-NO" sz="1200" dirty="0"/>
+              <a:t>Hypernode</a:t>
             </a:r>
           </a:p>
           <a:p>
             <a:pPr algn="ctr"/>
             <a:r>
-              <a:rPr lang="nb-NO" sz="1200" dirty="0" smtClean="0"/>
+              <a:rPr lang="nb-NO" sz="1200" dirty="0"/>
               <a:t>2</a:t>
             </a:r>
-            <a:endParaRPr lang="nb-NO" sz="1200" dirty="0"/>
           </a:p>
         </p:txBody>
       </p:sp>
@@ -10866,17 +10641,16 @@
           <a:p>
             <a:pPr algn="ctr"/>
             <a:r>
-              <a:rPr lang="nb-NO" sz="1200" dirty="0" smtClean="0"/>
-              <a:t>Masternode</a:t>
+              <a:rPr lang="nb-NO" sz="1200" dirty="0"/>
+              <a:t>Hypernode</a:t>
             </a:r>
           </a:p>
           <a:p>
             <a:pPr algn="ctr"/>
             <a:r>
-              <a:rPr lang="nb-NO" sz="1200" dirty="0" smtClean="0"/>
+              <a:rPr lang="nb-NO" sz="1200" dirty="0"/>
               <a:t>3</a:t>
             </a:r>
-            <a:endParaRPr lang="nb-NO" sz="1200" dirty="0"/>
           </a:p>
         </p:txBody>
       </p:sp>
@@ -10920,17 +10694,16 @@
           <a:p>
             <a:pPr algn="ctr"/>
             <a:r>
-              <a:rPr lang="nb-NO" sz="1200" dirty="0" smtClean="0"/>
-              <a:t>Masternode</a:t>
+              <a:rPr lang="nb-NO" sz="1200" dirty="0"/>
+              <a:t>Hypernode</a:t>
             </a:r>
           </a:p>
           <a:p>
             <a:pPr algn="ctr"/>
             <a:r>
-              <a:rPr lang="nb-NO" sz="1200" dirty="0" smtClean="0"/>
+              <a:rPr lang="nb-NO" sz="1200" dirty="0"/>
               <a:t>4</a:t>
             </a:r>
-            <a:endParaRPr lang="nb-NO" sz="1200" dirty="0"/>
           </a:p>
         </p:txBody>
       </p:sp>
@@ -10974,17 +10747,16 @@
           <a:p>
             <a:pPr algn="ctr"/>
             <a:r>
-              <a:rPr lang="nb-NO" sz="1200" dirty="0" smtClean="0"/>
-              <a:t>Masternode</a:t>
+              <a:rPr lang="nb-NO" sz="1200" dirty="0"/>
+              <a:t>Hypernode</a:t>
             </a:r>
           </a:p>
           <a:p>
             <a:pPr algn="ctr"/>
             <a:r>
-              <a:rPr lang="nb-NO" sz="1200" dirty="0" smtClean="0"/>
+              <a:rPr lang="nb-NO" sz="1200" dirty="0"/>
               <a:t>5</a:t>
             </a:r>
-            <a:endParaRPr lang="nb-NO" sz="1200" dirty="0"/>
           </a:p>
         </p:txBody>
       </p:sp>
@@ -11028,17 +10800,16 @@
           <a:p>
             <a:pPr algn="ctr"/>
             <a:r>
-              <a:rPr lang="nb-NO" sz="1200" dirty="0" smtClean="0"/>
-              <a:t>Masternode</a:t>
+              <a:rPr lang="nb-NO" sz="1200" dirty="0"/>
+              <a:t>Hypernode</a:t>
             </a:r>
           </a:p>
           <a:p>
             <a:pPr algn="ctr"/>
             <a:r>
-              <a:rPr lang="nb-NO" sz="1200" dirty="0" smtClean="0"/>
+              <a:rPr lang="nb-NO" sz="1200" dirty="0"/>
               <a:t>6</a:t>
             </a:r>
-            <a:endParaRPr lang="nb-NO" sz="1200" dirty="0"/>
           </a:p>
         </p:txBody>
       </p:sp>
@@ -11082,8 +10853,8 @@
           <a:p>
             <a:pPr algn="ctr"/>
             <a:r>
-              <a:rPr lang="nb-NO" sz="1200" dirty="0" smtClean="0"/>
-              <a:t>Masternode</a:t>
+              <a:rPr lang="nb-NO" sz="1200" dirty="0"/>
+              <a:t>Hypernode</a:t>
             </a:r>
           </a:p>
           <a:p>
@@ -11217,10 +10988,9 @@
           <a:p>
             <a:pPr algn="ctr"/>
             <a:r>
-              <a:rPr lang="nb-NO" sz="1200" dirty="0" smtClean="0"/>
+              <a:rPr lang="nb-NO" sz="1200" dirty="0"/>
               <a:t>Regular Node</a:t>
             </a:r>
-            <a:endParaRPr lang="nb-NO" sz="1200" dirty="0"/>
           </a:p>
         </p:txBody>
       </p:sp>
@@ -11264,10 +11034,9 @@
           <a:p>
             <a:pPr algn="ctr"/>
             <a:r>
-              <a:rPr lang="nb-NO" sz="1200" dirty="0" smtClean="0"/>
+              <a:rPr lang="nb-NO" sz="1200" dirty="0"/>
               <a:t>Regular Node</a:t>
             </a:r>
-            <a:endParaRPr lang="nb-NO" sz="1200" dirty="0"/>
           </a:p>
         </p:txBody>
       </p:sp>
@@ -11311,10 +11080,9 @@
           <a:p>
             <a:pPr algn="ctr"/>
             <a:r>
-              <a:rPr lang="nb-NO" sz="1200" dirty="0" smtClean="0"/>
+              <a:rPr lang="nb-NO" sz="1200" dirty="0"/>
               <a:t>Regular Node</a:t>
             </a:r>
-            <a:endParaRPr lang="nb-NO" sz="1200" dirty="0"/>
           </a:p>
         </p:txBody>
       </p:sp>
@@ -11358,10 +11126,9 @@
           <a:p>
             <a:pPr algn="ctr"/>
             <a:r>
-              <a:rPr lang="nb-NO" sz="1200" dirty="0" smtClean="0"/>
+              <a:rPr lang="nb-NO" sz="1200" dirty="0"/>
               <a:t>Regular Node</a:t>
             </a:r>
-            <a:endParaRPr lang="nb-NO" sz="1200" dirty="0"/>
           </a:p>
         </p:txBody>
       </p:sp>
@@ -11405,10 +11172,9 @@
           <a:p>
             <a:pPr algn="ctr"/>
             <a:r>
-              <a:rPr lang="nb-NO" sz="1200" dirty="0" smtClean="0"/>
+              <a:rPr lang="nb-NO" sz="1200" dirty="0"/>
               <a:t>Regular Node</a:t>
             </a:r>
-            <a:endParaRPr lang="nb-NO" sz="1200" dirty="0"/>
           </a:p>
         </p:txBody>
       </p:sp>
@@ -11452,10 +11218,9 @@
           <a:p>
             <a:pPr algn="ctr"/>
             <a:r>
-              <a:rPr lang="nb-NO" sz="1200" dirty="0" smtClean="0"/>
+              <a:rPr lang="nb-NO" sz="1200" dirty="0"/>
               <a:t>Regular Node</a:t>
             </a:r>
-            <a:endParaRPr lang="nb-NO" sz="1200" dirty="0"/>
           </a:p>
         </p:txBody>
       </p:sp>
@@ -11499,10 +11264,9 @@
           <a:p>
             <a:pPr algn="ctr"/>
             <a:r>
-              <a:rPr lang="nb-NO" sz="1200" dirty="0" smtClean="0"/>
+              <a:rPr lang="nb-NO" sz="1200" dirty="0"/>
               <a:t>Regular Node</a:t>
             </a:r>
-            <a:endParaRPr lang="nb-NO" sz="1200" dirty="0"/>
           </a:p>
         </p:txBody>
       </p:sp>
@@ -11546,10 +11310,9 @@
           <a:p>
             <a:pPr algn="ctr"/>
             <a:r>
-              <a:rPr lang="nb-NO" sz="1200" dirty="0" smtClean="0"/>
+              <a:rPr lang="nb-NO" sz="1200" dirty="0"/>
               <a:t>Regular Node</a:t>
             </a:r>
-            <a:endParaRPr lang="nb-NO" sz="1200" dirty="0"/>
           </a:p>
         </p:txBody>
       </p:sp>
@@ -11593,10 +11356,9 @@
           <a:p>
             <a:pPr algn="ctr"/>
             <a:r>
-              <a:rPr lang="nb-NO" sz="1200" dirty="0" smtClean="0"/>
+              <a:rPr lang="nb-NO" sz="1200" dirty="0"/>
               <a:t>Regular Node</a:t>
             </a:r>
-            <a:endParaRPr lang="nb-NO" sz="1200" dirty="0"/>
           </a:p>
         </p:txBody>
       </p:sp>
@@ -11640,10 +11402,9 @@
           <a:p>
             <a:pPr algn="ctr"/>
             <a:r>
-              <a:rPr lang="nb-NO" sz="1200" dirty="0" smtClean="0"/>
+              <a:rPr lang="nb-NO" sz="1200" dirty="0"/>
               <a:t>Regular Node</a:t>
             </a:r>
-            <a:endParaRPr lang="nb-NO" sz="1200" dirty="0"/>
           </a:p>
         </p:txBody>
       </p:sp>
@@ -11687,10 +11448,9 @@
           <a:p>
             <a:pPr algn="ctr"/>
             <a:r>
-              <a:rPr lang="nb-NO" sz="1200" dirty="0" smtClean="0"/>
+              <a:rPr lang="nb-NO" sz="1200" dirty="0"/>
               <a:t>Regular Node</a:t>
             </a:r>
-            <a:endParaRPr lang="nb-NO" sz="1200" dirty="0"/>
           </a:p>
         </p:txBody>
       </p:sp>
@@ -11734,10 +11494,9 @@
           <a:p>
             <a:pPr algn="ctr"/>
             <a:r>
-              <a:rPr lang="nb-NO" sz="1200" dirty="0" smtClean="0"/>
+              <a:rPr lang="nb-NO" sz="1200" dirty="0"/>
               <a:t>Regular Node</a:t>
             </a:r>
-            <a:endParaRPr lang="nb-NO" sz="1200" dirty="0"/>
           </a:p>
         </p:txBody>
       </p:sp>
@@ -11781,10 +11540,9 @@
           <a:p>
             <a:pPr algn="ctr"/>
             <a:r>
-              <a:rPr lang="nb-NO" sz="1200" dirty="0" smtClean="0"/>
+              <a:rPr lang="nb-NO" sz="1200" dirty="0"/>
               <a:t>Regular Node</a:t>
             </a:r>
-            <a:endParaRPr lang="nb-NO" sz="1200" dirty="0"/>
           </a:p>
         </p:txBody>
       </p:sp>
@@ -11828,10 +11586,9 @@
           <a:p>
             <a:pPr algn="ctr"/>
             <a:r>
-              <a:rPr lang="nb-NO" sz="1200" dirty="0" smtClean="0"/>
+              <a:rPr lang="nb-NO" sz="1200" dirty="0"/>
               <a:t>Regular Node</a:t>
             </a:r>
-            <a:endParaRPr lang="nb-NO" sz="1200" dirty="0"/>
           </a:p>
         </p:txBody>
       </p:sp>
@@ -11875,10 +11632,9 @@
           <a:p>
             <a:pPr algn="ctr"/>
             <a:r>
-              <a:rPr lang="nb-NO" sz="1200" dirty="0" smtClean="0"/>
+              <a:rPr lang="nb-NO" sz="1200" dirty="0"/>
               <a:t>Regular Node</a:t>
             </a:r>
-            <a:endParaRPr lang="nb-NO" sz="1200" dirty="0"/>
           </a:p>
         </p:txBody>
       </p:sp>
@@ -11924,7 +11680,7 @@
           <p:cNvPr id="70" name="Picture 69">
             <a:extLst>
               <a:ext uri="{FF2B5EF4-FFF2-40B4-BE49-F238E27FC236}">
-                <a16:creationId xmlns:a16="http://schemas.microsoft.com/office/drawing/2014/main" xmlns="" id="{590133A9-43B3-4ACA-8B6A-AC7C02124269}"/>
+                <a16:creationId xmlns:a16="http://schemas.microsoft.com/office/drawing/2014/main" id="{590133A9-43B3-4ACA-8B6A-AC7C02124269}"/>
               </a:ext>
             </a:extLst>
           </p:cNvPr>
@@ -12008,28 +11764,23 @@
           <a:lstStyle/>
           <a:p>
             <a:r>
-              <a:rPr lang="nb-NO" sz="1200" b="1" dirty="0" smtClean="0">
+              <a:rPr lang="nb-NO" sz="1200" b="1" dirty="0">
                 <a:solidFill>
                   <a:srgbClr val="00B050"/>
                 </a:solidFill>
               </a:rPr>
-              <a:t>Accept from MN approved peers</a:t>
-            </a:r>
-          </a:p>
-          <a:p>
-            <a:r>
-              <a:rPr lang="nb-NO" sz="1200" b="1" dirty="0" smtClean="0">
+              <a:t>Accept from HN approved peers</a:t>
+            </a:r>
+          </a:p>
+          <a:p>
+            <a:r>
+              <a:rPr lang="nb-NO" sz="1200" b="1" dirty="0">
                 <a:solidFill>
                   <a:srgbClr val="FF0000"/>
                 </a:solidFill>
               </a:rPr>
-              <a:t>Reject from MN not approved peers</a:t>
-            </a:r>
-            <a:endParaRPr lang="nb-NO" sz="1200" b="1" dirty="0">
-              <a:solidFill>
-                <a:srgbClr val="FF0000"/>
-              </a:solidFill>
-            </a:endParaRPr>
+              <a:t>Reject from HN not approved peers</a:t>
+            </a:r>
           </a:p>
         </p:txBody>
       </p:sp>
@@ -12056,10 +11807,9 @@
           <a:lstStyle/>
           <a:p>
             <a:r>
-              <a:rPr lang="nb-NO" sz="1200" dirty="0" smtClean="0"/>
+              <a:rPr lang="nb-NO" sz="1200" dirty="0"/>
               <a:t>Request / Response</a:t>
             </a:r>
-            <a:endParaRPr lang="nb-NO" sz="1200" dirty="0"/>
           </a:p>
         </p:txBody>
       </p:sp>
@@ -12160,22 +11910,21 @@
           <a:lstStyle/>
           <a:p>
             <a:r>
-              <a:rPr lang="nb-NO" sz="1200" dirty="0" smtClean="0"/>
+              <a:rPr lang="nb-NO" sz="1200" dirty="0"/>
               <a:t>Node quality/</a:t>
             </a:r>
           </a:p>
           <a:p>
             <a:r>
-              <a:rPr lang="nb-NO" sz="1200" dirty="0" smtClean="0"/>
+              <a:rPr lang="nb-NO" sz="1200" dirty="0"/>
               <a:t>performance</a:t>
             </a:r>
           </a:p>
           <a:p>
             <a:r>
-              <a:rPr lang="nb-NO" sz="1200" dirty="0" smtClean="0"/>
+              <a:rPr lang="nb-NO" sz="1200" dirty="0"/>
               <a:t>check</a:t>
             </a:r>
-            <a:endParaRPr lang="nb-NO" sz="1200" dirty="0"/>
           </a:p>
         </p:txBody>
       </p:sp>
@@ -12424,10 +12173,9 @@
           <a:lstStyle/>
           <a:p>
             <a:r>
-              <a:rPr lang="nb-NO" sz="1200" dirty="0" smtClean="0"/>
+              <a:rPr lang="nb-NO" sz="1200" dirty="0"/>
               <a:t>Request / Response</a:t>
             </a:r>
-            <a:endParaRPr lang="nb-NO" sz="1200" dirty="0"/>
           </a:p>
         </p:txBody>
       </p:sp>
@@ -12547,7 +12295,7 @@
           <p:cNvPr id="83" name="Picture 82">
             <a:extLst>
               <a:ext uri="{FF2B5EF4-FFF2-40B4-BE49-F238E27FC236}">
-                <a16:creationId xmlns:a16="http://schemas.microsoft.com/office/drawing/2014/main" xmlns="" id="{590133A9-43B3-4ACA-8B6A-AC7C02124269}"/>
+                <a16:creationId xmlns:a16="http://schemas.microsoft.com/office/drawing/2014/main" id="{590133A9-43B3-4ACA-8B6A-AC7C02124269}"/>
               </a:ext>
             </a:extLst>
           </p:cNvPr>
@@ -12595,10 +12343,9 @@
           <a:lstStyle/>
           <a:p>
             <a:r>
-              <a:rPr lang="nb-NO" dirty="0" smtClean="0"/>
+              <a:rPr lang="nb-NO" dirty="0"/>
               <a:t>Round k-2</a:t>
             </a:r>
-            <a:endParaRPr lang="nb-NO" dirty="0"/>
           </a:p>
         </p:txBody>
       </p:sp>
@@ -12607,7 +12354,7 @@
           <p:cNvPr id="85" name="Picture 84">
             <a:extLst>
               <a:ext uri="{FF2B5EF4-FFF2-40B4-BE49-F238E27FC236}">
-                <a16:creationId xmlns:a16="http://schemas.microsoft.com/office/drawing/2014/main" xmlns="" id="{590133A9-43B3-4ACA-8B6A-AC7C02124269}"/>
+                <a16:creationId xmlns:a16="http://schemas.microsoft.com/office/drawing/2014/main" id="{590133A9-43B3-4ACA-8B6A-AC7C02124269}"/>
               </a:ext>
             </a:extLst>
           </p:cNvPr>
@@ -12655,10 +12402,9 @@
           <a:lstStyle/>
           <a:p>
             <a:r>
-              <a:rPr lang="nb-NO" dirty="0" smtClean="0"/>
+              <a:rPr lang="nb-NO" dirty="0"/>
               <a:t>Round k-1</a:t>
             </a:r>
-            <a:endParaRPr lang="nb-NO" dirty="0"/>
           </a:p>
         </p:txBody>
       </p:sp>
@@ -12667,7 +12413,7 @@
           <p:cNvPr id="87" name="Picture 86">
             <a:extLst>
               <a:ext uri="{FF2B5EF4-FFF2-40B4-BE49-F238E27FC236}">
-                <a16:creationId xmlns:a16="http://schemas.microsoft.com/office/drawing/2014/main" xmlns="" id="{590133A9-43B3-4ACA-8B6A-AC7C02124269}"/>
+                <a16:creationId xmlns:a16="http://schemas.microsoft.com/office/drawing/2014/main" id="{590133A9-43B3-4ACA-8B6A-AC7C02124269}"/>
               </a:ext>
             </a:extLst>
           </p:cNvPr>
@@ -12715,10 +12461,9 @@
           <a:lstStyle/>
           <a:p>
             <a:r>
-              <a:rPr lang="nb-NO" dirty="0" smtClean="0"/>
+              <a:rPr lang="nb-NO" dirty="0"/>
               <a:t>Round k</a:t>
             </a:r>
-            <a:endParaRPr lang="nb-NO" dirty="0"/>
           </a:p>
         </p:txBody>
       </p:sp>

</xml_diff>